<commit_message>
Density jest brane juz z pythona. Problemem beda jednak swiatla + odkurzyc troche kod
</commit_message>
<xml_diff>
--- a/obrazy.pptx
+++ b/obrazy.pptx
@@ -319,7 +319,7 @@
           <a:p>
             <a:fld id="{B52AA6F2-AEE1-4FE6-B3E2-3509488F5D07}" type="datetimeFigureOut">
               <a:rPr lang="pl-PL" smtClean="0"/>
-              <a:t>2019-04-12</a:t>
+              <a:t>14.04.2019</a:t>
             </a:fld>
             <a:endParaRPr lang="pl-PL"/>
           </a:p>
@@ -489,7 +489,7 @@
           <a:p>
             <a:fld id="{B52AA6F2-AEE1-4FE6-B3E2-3509488F5D07}" type="datetimeFigureOut">
               <a:rPr lang="pl-PL" smtClean="0"/>
-              <a:t>2019-04-12</a:t>
+              <a:t>14.04.2019</a:t>
             </a:fld>
             <a:endParaRPr lang="pl-PL"/>
           </a:p>
@@ -669,7 +669,7 @@
           <a:p>
             <a:fld id="{B52AA6F2-AEE1-4FE6-B3E2-3509488F5D07}" type="datetimeFigureOut">
               <a:rPr lang="pl-PL" smtClean="0"/>
-              <a:t>2019-04-12</a:t>
+              <a:t>14.04.2019</a:t>
             </a:fld>
             <a:endParaRPr lang="pl-PL"/>
           </a:p>
@@ -839,7 +839,7 @@
           <a:p>
             <a:fld id="{B52AA6F2-AEE1-4FE6-B3E2-3509488F5D07}" type="datetimeFigureOut">
               <a:rPr lang="pl-PL" smtClean="0"/>
-              <a:t>2019-04-12</a:t>
+              <a:t>14.04.2019</a:t>
             </a:fld>
             <a:endParaRPr lang="pl-PL"/>
           </a:p>
@@ -1085,7 +1085,7 @@
           <a:p>
             <a:fld id="{B52AA6F2-AEE1-4FE6-B3E2-3509488F5D07}" type="datetimeFigureOut">
               <a:rPr lang="pl-PL" smtClean="0"/>
-              <a:t>2019-04-12</a:t>
+              <a:t>14.04.2019</a:t>
             </a:fld>
             <a:endParaRPr lang="pl-PL"/>
           </a:p>
@@ -1373,7 +1373,7 @@
           <a:p>
             <a:fld id="{B52AA6F2-AEE1-4FE6-B3E2-3509488F5D07}" type="datetimeFigureOut">
               <a:rPr lang="pl-PL" smtClean="0"/>
-              <a:t>2019-04-12</a:t>
+              <a:t>14.04.2019</a:t>
             </a:fld>
             <a:endParaRPr lang="pl-PL"/>
           </a:p>
@@ -1795,7 +1795,7 @@
           <a:p>
             <a:fld id="{B52AA6F2-AEE1-4FE6-B3E2-3509488F5D07}" type="datetimeFigureOut">
               <a:rPr lang="pl-PL" smtClean="0"/>
-              <a:t>2019-04-12</a:t>
+              <a:t>14.04.2019</a:t>
             </a:fld>
             <a:endParaRPr lang="pl-PL"/>
           </a:p>
@@ -1913,7 +1913,7 @@
           <a:p>
             <a:fld id="{B52AA6F2-AEE1-4FE6-B3E2-3509488F5D07}" type="datetimeFigureOut">
               <a:rPr lang="pl-PL" smtClean="0"/>
-              <a:t>2019-04-12</a:t>
+              <a:t>14.04.2019</a:t>
             </a:fld>
             <a:endParaRPr lang="pl-PL"/>
           </a:p>
@@ -2008,7 +2008,7 @@
           <a:p>
             <a:fld id="{B52AA6F2-AEE1-4FE6-B3E2-3509488F5D07}" type="datetimeFigureOut">
               <a:rPr lang="pl-PL" smtClean="0"/>
-              <a:t>2019-04-12</a:t>
+              <a:t>14.04.2019</a:t>
             </a:fld>
             <a:endParaRPr lang="pl-PL"/>
           </a:p>
@@ -2285,7 +2285,7 @@
           <a:p>
             <a:fld id="{B52AA6F2-AEE1-4FE6-B3E2-3509488F5D07}" type="datetimeFigureOut">
               <a:rPr lang="pl-PL" smtClean="0"/>
-              <a:t>2019-04-12</a:t>
+              <a:t>14.04.2019</a:t>
             </a:fld>
             <a:endParaRPr lang="pl-PL"/>
           </a:p>
@@ -2538,7 +2538,7 @@
           <a:p>
             <a:fld id="{B52AA6F2-AEE1-4FE6-B3E2-3509488F5D07}" type="datetimeFigureOut">
               <a:rPr lang="pl-PL" smtClean="0"/>
-              <a:t>2019-04-12</a:t>
+              <a:t>14.04.2019</a:t>
             </a:fld>
             <a:endParaRPr lang="pl-PL"/>
           </a:p>
@@ -2751,7 +2751,7 @@
           <a:p>
             <a:fld id="{B52AA6F2-AEE1-4FE6-B3E2-3509488F5D07}" type="datetimeFigureOut">
               <a:rPr lang="pl-PL" smtClean="0"/>
-              <a:t>2019-04-12</a:t>
+              <a:t>14.04.2019</a:t>
             </a:fld>
             <a:endParaRPr lang="pl-PL"/>
           </a:p>
@@ -38299,6 +38299,238 @@
           </a:p>
         </p:txBody>
       </p:sp>
+      <p:sp>
+        <p:nvSpPr>
+          <p:cNvPr id="38" name="Up Arrow 46"/>
+          <p:cNvSpPr>
+            <a:spLocks/>
+          </p:cNvSpPr>
+          <p:nvPr/>
+        </p:nvSpPr>
+        <p:spPr>
+          <a:xfrm rot="6300000">
+            <a:off x="8325840" y="3210767"/>
+            <a:ext cx="198453" cy="432048"/>
+          </a:xfrm>
+          <a:prstGeom prst="upArrow">
+            <a:avLst>
+              <a:gd name="adj1" fmla="val 31999"/>
+              <a:gd name="adj2" fmla="val 68312"/>
+            </a:avLst>
+          </a:prstGeom>
+          <a:solidFill>
+            <a:srgbClr val="7030A0"/>
+          </a:solidFill>
+          <a:ln>
+            <a:solidFill>
+              <a:schemeClr val="accent3">
+                <a:lumMod val="50000"/>
+              </a:schemeClr>
+            </a:solidFill>
+          </a:ln>
+        </p:spPr>
+        <p:style>
+          <a:lnRef idx="2">
+            <a:schemeClr val="accent3">
+              <a:shade val="50000"/>
+            </a:schemeClr>
+          </a:lnRef>
+          <a:fillRef idx="1">
+            <a:schemeClr val="accent3"/>
+          </a:fillRef>
+          <a:effectRef idx="0">
+            <a:schemeClr val="accent3"/>
+          </a:effectRef>
+          <a:fontRef idx="minor">
+            <a:schemeClr val="lt1"/>
+          </a:fontRef>
+        </p:style>
+        <p:txBody>
+          <a:bodyPr rtlCol="0" anchor="ctr"/>
+          <a:lstStyle/>
+          <a:p>
+            <a:pPr algn="ctr"/>
+            <a:endParaRPr lang="pl-PL"/>
+          </a:p>
+        </p:txBody>
+      </p:sp>
+      <p:sp>
+        <p:nvSpPr>
+          <p:cNvPr id="39" name="Up Arrow 46"/>
+          <p:cNvSpPr>
+            <a:spLocks/>
+          </p:cNvSpPr>
+          <p:nvPr/>
+        </p:nvSpPr>
+        <p:spPr>
+          <a:xfrm rot="15300000" flipV="1">
+            <a:off x="8144774" y="3641880"/>
+            <a:ext cx="296852" cy="646271"/>
+          </a:xfrm>
+          <a:prstGeom prst="upArrow">
+            <a:avLst>
+              <a:gd name="adj1" fmla="val 31999"/>
+              <a:gd name="adj2" fmla="val 68312"/>
+            </a:avLst>
+          </a:prstGeom>
+          <a:solidFill>
+            <a:srgbClr val="7030A0"/>
+          </a:solidFill>
+          <a:ln>
+            <a:solidFill>
+              <a:schemeClr val="accent3">
+                <a:lumMod val="50000"/>
+              </a:schemeClr>
+            </a:solidFill>
+          </a:ln>
+        </p:spPr>
+        <p:style>
+          <a:lnRef idx="2">
+            <a:schemeClr val="accent3">
+              <a:shade val="50000"/>
+            </a:schemeClr>
+          </a:lnRef>
+          <a:fillRef idx="1">
+            <a:schemeClr val="accent3"/>
+          </a:fillRef>
+          <a:effectRef idx="0">
+            <a:schemeClr val="accent3"/>
+          </a:effectRef>
+          <a:fontRef idx="minor">
+            <a:schemeClr val="lt1"/>
+          </a:fontRef>
+        </p:style>
+        <p:txBody>
+          <a:bodyPr rtlCol="0" anchor="ctr"/>
+          <a:lstStyle/>
+          <a:p>
+            <a:pPr algn="ctr"/>
+            <a:endParaRPr lang="pl-PL"/>
+          </a:p>
+        </p:txBody>
+      </p:sp>
+      <p:sp>
+        <p:nvSpPr>
+          <p:cNvPr id="40" name="Bent Arrow 45"/>
+          <p:cNvSpPr>
+            <a:spLocks/>
+          </p:cNvSpPr>
+          <p:nvPr/>
+        </p:nvSpPr>
+        <p:spPr>
+          <a:xfrm rot="5400000" flipH="1">
+            <a:off x="6444208" y="89692"/>
+            <a:ext cx="432048" cy="576064"/>
+          </a:xfrm>
+          <a:prstGeom prst="bentArrow">
+            <a:avLst>
+              <a:gd name="adj1" fmla="val 25000"/>
+              <a:gd name="adj2" fmla="val 27645"/>
+              <a:gd name="adj3" fmla="val 50000"/>
+              <a:gd name="adj4" fmla="val 43750"/>
+            </a:avLst>
+          </a:prstGeom>
+          <a:solidFill>
+            <a:srgbClr val="7030A0"/>
+          </a:solidFill>
+          <a:ln>
+            <a:solidFill>
+              <a:schemeClr val="accent3">
+                <a:lumMod val="50000"/>
+              </a:schemeClr>
+            </a:solidFill>
+          </a:ln>
+        </p:spPr>
+        <p:style>
+          <a:lnRef idx="2">
+            <a:schemeClr val="accent3">
+              <a:shade val="50000"/>
+            </a:schemeClr>
+          </a:lnRef>
+          <a:fillRef idx="1">
+            <a:schemeClr val="accent3"/>
+          </a:fillRef>
+          <a:effectRef idx="0">
+            <a:schemeClr val="accent3"/>
+          </a:effectRef>
+          <a:fontRef idx="minor">
+            <a:schemeClr val="lt1"/>
+          </a:fontRef>
+        </p:style>
+        <p:txBody>
+          <a:bodyPr rtlCol="0" anchor="ctr"/>
+          <a:lstStyle/>
+          <a:p>
+            <a:pPr algn="ctr"/>
+            <a:endParaRPr lang="pl-PL">
+              <a:solidFill>
+                <a:schemeClr val="tx1"/>
+              </a:solidFill>
+            </a:endParaRPr>
+          </a:p>
+        </p:txBody>
+      </p:sp>
+      <p:sp>
+        <p:nvSpPr>
+          <p:cNvPr id="41" name="Bent Arrow 45"/>
+          <p:cNvSpPr>
+            <a:spLocks/>
+          </p:cNvSpPr>
+          <p:nvPr/>
+        </p:nvSpPr>
+        <p:spPr>
+          <a:xfrm rot="16200000" flipH="1" flipV="1">
+            <a:off x="6437490" y="998375"/>
+            <a:ext cx="432048" cy="576064"/>
+          </a:xfrm>
+          <a:prstGeom prst="bentArrow">
+            <a:avLst>
+              <a:gd name="adj1" fmla="val 25000"/>
+              <a:gd name="adj2" fmla="val 27645"/>
+              <a:gd name="adj3" fmla="val 50000"/>
+              <a:gd name="adj4" fmla="val 43750"/>
+            </a:avLst>
+          </a:prstGeom>
+          <a:solidFill>
+            <a:srgbClr val="7030A0"/>
+          </a:solidFill>
+          <a:ln>
+            <a:solidFill>
+              <a:schemeClr val="accent3">
+                <a:lumMod val="50000"/>
+              </a:schemeClr>
+            </a:solidFill>
+          </a:ln>
+        </p:spPr>
+        <p:style>
+          <a:lnRef idx="2">
+            <a:schemeClr val="accent3">
+              <a:shade val="50000"/>
+            </a:schemeClr>
+          </a:lnRef>
+          <a:fillRef idx="1">
+            <a:schemeClr val="accent3"/>
+          </a:fillRef>
+          <a:effectRef idx="0">
+            <a:schemeClr val="accent3"/>
+          </a:effectRef>
+          <a:fontRef idx="minor">
+            <a:schemeClr val="lt1"/>
+          </a:fontRef>
+        </p:style>
+        <p:txBody>
+          <a:bodyPr rtlCol="0" anchor="ctr"/>
+          <a:lstStyle/>
+          <a:p>
+            <a:pPr algn="ctr"/>
+            <a:endParaRPr lang="pl-PL">
+              <a:solidFill>
+                <a:schemeClr val="tx1"/>
+              </a:solidFill>
+            </a:endParaRPr>
+          </a:p>
+        </p:txBody>
+      </p:sp>
     </p:spTree>
     <p:extLst>
       <p:ext uri="{BB962C8B-B14F-4D97-AF65-F5344CB8AC3E}">

</xml_diff>

<commit_message>
dzialaja strzalki ale mocny refaktor potrzebny
</commit_message>
<xml_diff>
--- a/obrazy.pptx
+++ b/obrazy.pptx
@@ -38531,6 +38531,226 @@
           </a:p>
         </p:txBody>
       </p:sp>
+      <p:sp>
+        <p:nvSpPr>
+          <p:cNvPr id="42" name="Up Arrow 46"/>
+          <p:cNvSpPr>
+            <a:spLocks/>
+          </p:cNvSpPr>
+          <p:nvPr/>
+        </p:nvSpPr>
+        <p:spPr>
+          <a:xfrm rot="15300000" flipV="1">
+            <a:off x="6574315" y="4330321"/>
+            <a:ext cx="296852" cy="646271"/>
+          </a:xfrm>
+          <a:prstGeom prst="upArrow">
+            <a:avLst>
+              <a:gd name="adj1" fmla="val 31999"/>
+              <a:gd name="adj2" fmla="val 68312"/>
+            </a:avLst>
+          </a:prstGeom>
+          <a:solidFill>
+            <a:srgbClr val="00B050"/>
+          </a:solidFill>
+          <a:ln>
+            <a:solidFill>
+              <a:schemeClr val="accent3">
+                <a:lumMod val="50000"/>
+              </a:schemeClr>
+            </a:solidFill>
+          </a:ln>
+        </p:spPr>
+        <p:style>
+          <a:lnRef idx="2">
+            <a:schemeClr val="accent3">
+              <a:shade val="50000"/>
+            </a:schemeClr>
+          </a:lnRef>
+          <a:fillRef idx="1">
+            <a:schemeClr val="accent3"/>
+          </a:fillRef>
+          <a:effectRef idx="0">
+            <a:schemeClr val="accent3"/>
+          </a:effectRef>
+          <a:fontRef idx="minor">
+            <a:schemeClr val="lt1"/>
+          </a:fontRef>
+        </p:style>
+        <p:txBody>
+          <a:bodyPr rtlCol="0" anchor="ctr"/>
+          <a:lstStyle/>
+          <a:p>
+            <a:pPr algn="ctr"/>
+            <a:endParaRPr lang="pl-PL"/>
+          </a:p>
+        </p:txBody>
+      </p:sp>
+      <p:sp>
+        <p:nvSpPr>
+          <p:cNvPr id="43" name="Up Arrow 46"/>
+          <p:cNvSpPr>
+            <a:spLocks/>
+          </p:cNvSpPr>
+          <p:nvPr/>
+        </p:nvSpPr>
+        <p:spPr>
+          <a:xfrm rot="6300000">
+            <a:off x="6623514" y="5048424"/>
+            <a:ext cx="198453" cy="432048"/>
+          </a:xfrm>
+          <a:prstGeom prst="upArrow">
+            <a:avLst>
+              <a:gd name="adj1" fmla="val 31999"/>
+              <a:gd name="adj2" fmla="val 68312"/>
+            </a:avLst>
+          </a:prstGeom>
+          <a:solidFill>
+            <a:srgbClr val="00B050"/>
+          </a:solidFill>
+          <a:ln>
+            <a:solidFill>
+              <a:schemeClr val="accent3">
+                <a:lumMod val="50000"/>
+              </a:schemeClr>
+            </a:solidFill>
+          </a:ln>
+        </p:spPr>
+        <p:style>
+          <a:lnRef idx="2">
+            <a:schemeClr val="accent3">
+              <a:shade val="50000"/>
+            </a:schemeClr>
+          </a:lnRef>
+          <a:fillRef idx="1">
+            <a:schemeClr val="accent3"/>
+          </a:fillRef>
+          <a:effectRef idx="0">
+            <a:schemeClr val="accent3"/>
+          </a:effectRef>
+          <a:fontRef idx="minor">
+            <a:schemeClr val="lt1"/>
+          </a:fontRef>
+        </p:style>
+        <p:txBody>
+          <a:bodyPr rtlCol="0" anchor="ctr"/>
+          <a:lstStyle/>
+          <a:p>
+            <a:pPr algn="ctr"/>
+            <a:endParaRPr lang="pl-PL"/>
+          </a:p>
+        </p:txBody>
+      </p:sp>
+      <p:sp>
+        <p:nvSpPr>
+          <p:cNvPr id="44" name="Up Arrow 46"/>
+          <p:cNvSpPr>
+            <a:spLocks/>
+          </p:cNvSpPr>
+          <p:nvPr/>
+        </p:nvSpPr>
+        <p:spPr>
+          <a:xfrm rot="15300000" flipV="1">
+            <a:off x="6678758" y="3170218"/>
+            <a:ext cx="296852" cy="646271"/>
+          </a:xfrm>
+          <a:prstGeom prst="upArrow">
+            <a:avLst>
+              <a:gd name="adj1" fmla="val 31999"/>
+              <a:gd name="adj2" fmla="val 68312"/>
+            </a:avLst>
+          </a:prstGeom>
+          <a:solidFill>
+            <a:srgbClr val="FF0000"/>
+          </a:solidFill>
+          <a:ln>
+            <a:solidFill>
+              <a:schemeClr val="accent3">
+                <a:lumMod val="50000"/>
+              </a:schemeClr>
+            </a:solidFill>
+          </a:ln>
+        </p:spPr>
+        <p:style>
+          <a:lnRef idx="2">
+            <a:schemeClr val="accent3">
+              <a:shade val="50000"/>
+            </a:schemeClr>
+          </a:lnRef>
+          <a:fillRef idx="1">
+            <a:schemeClr val="accent3"/>
+          </a:fillRef>
+          <a:effectRef idx="0">
+            <a:schemeClr val="accent3"/>
+          </a:effectRef>
+          <a:fontRef idx="minor">
+            <a:schemeClr val="lt1"/>
+          </a:fontRef>
+        </p:style>
+        <p:txBody>
+          <a:bodyPr rtlCol="0" anchor="ctr"/>
+          <a:lstStyle/>
+          <a:p>
+            <a:pPr algn="ctr"/>
+            <a:endParaRPr lang="pl-PL"/>
+          </a:p>
+        </p:txBody>
+      </p:sp>
+      <p:sp>
+        <p:nvSpPr>
+          <p:cNvPr id="45" name="Up Arrow 46"/>
+          <p:cNvSpPr>
+            <a:spLocks/>
+          </p:cNvSpPr>
+          <p:nvPr/>
+        </p:nvSpPr>
+        <p:spPr>
+          <a:xfrm rot="6300000">
+            <a:off x="6727957" y="3888321"/>
+            <a:ext cx="198453" cy="432048"/>
+          </a:xfrm>
+          <a:prstGeom prst="upArrow">
+            <a:avLst>
+              <a:gd name="adj1" fmla="val 31999"/>
+              <a:gd name="adj2" fmla="val 68312"/>
+            </a:avLst>
+          </a:prstGeom>
+          <a:solidFill>
+            <a:srgbClr val="FF0000"/>
+          </a:solidFill>
+          <a:ln>
+            <a:solidFill>
+              <a:schemeClr val="accent3">
+                <a:lumMod val="50000"/>
+              </a:schemeClr>
+            </a:solidFill>
+          </a:ln>
+        </p:spPr>
+        <p:style>
+          <a:lnRef idx="2">
+            <a:schemeClr val="accent3">
+              <a:shade val="50000"/>
+            </a:schemeClr>
+          </a:lnRef>
+          <a:fillRef idx="1">
+            <a:schemeClr val="accent3"/>
+          </a:fillRef>
+          <a:effectRef idx="0">
+            <a:schemeClr val="accent3"/>
+          </a:effectRef>
+          <a:fontRef idx="minor">
+            <a:schemeClr val="lt1"/>
+          </a:fontRef>
+        </p:style>
+        <p:txBody>
+          <a:bodyPr rtlCol="0" anchor="ctr"/>
+          <a:lstStyle/>
+          <a:p>
+            <a:pPr algn="ctr"/>
+            <a:endParaRPr lang="pl-PL"/>
+          </a:p>
+        </p:txBody>
+      </p:sp>
     </p:spTree>
     <p:extLst>
       <p:ext uri="{BB962C8B-B14F-4D97-AF65-F5344CB8AC3E}">

</xml_diff>

<commit_message>
env_4 - wszystkie strzalki dodane. TODO - moc je obracac tak bedzie milion razy latwiej
</commit_message>
<xml_diff>
--- a/obrazy.pptx
+++ b/obrazy.pptx
@@ -320,7 +320,7 @@
           <a:p>
             <a:fld id="{B52AA6F2-AEE1-4FE6-B3E2-3509488F5D07}" type="datetimeFigureOut">
               <a:rPr lang="pl-PL" smtClean="0"/>
-              <a:t>2019-04-24</a:t>
+              <a:t>2019-04-25</a:t>
             </a:fld>
             <a:endParaRPr lang="pl-PL"/>
           </a:p>
@@ -490,7 +490,7 @@
           <a:p>
             <a:fld id="{B52AA6F2-AEE1-4FE6-B3E2-3509488F5D07}" type="datetimeFigureOut">
               <a:rPr lang="pl-PL" smtClean="0"/>
-              <a:t>2019-04-24</a:t>
+              <a:t>2019-04-25</a:t>
             </a:fld>
             <a:endParaRPr lang="pl-PL"/>
           </a:p>
@@ -670,7 +670,7 @@
           <a:p>
             <a:fld id="{B52AA6F2-AEE1-4FE6-B3E2-3509488F5D07}" type="datetimeFigureOut">
               <a:rPr lang="pl-PL" smtClean="0"/>
-              <a:t>2019-04-24</a:t>
+              <a:t>2019-04-25</a:t>
             </a:fld>
             <a:endParaRPr lang="pl-PL"/>
           </a:p>
@@ -840,7 +840,7 @@
           <a:p>
             <a:fld id="{B52AA6F2-AEE1-4FE6-B3E2-3509488F5D07}" type="datetimeFigureOut">
               <a:rPr lang="pl-PL" smtClean="0"/>
-              <a:t>2019-04-24</a:t>
+              <a:t>2019-04-25</a:t>
             </a:fld>
             <a:endParaRPr lang="pl-PL"/>
           </a:p>
@@ -1086,7 +1086,7 @@
           <a:p>
             <a:fld id="{B52AA6F2-AEE1-4FE6-B3E2-3509488F5D07}" type="datetimeFigureOut">
               <a:rPr lang="pl-PL" smtClean="0"/>
-              <a:t>2019-04-24</a:t>
+              <a:t>2019-04-25</a:t>
             </a:fld>
             <a:endParaRPr lang="pl-PL"/>
           </a:p>
@@ -1374,7 +1374,7 @@
           <a:p>
             <a:fld id="{B52AA6F2-AEE1-4FE6-B3E2-3509488F5D07}" type="datetimeFigureOut">
               <a:rPr lang="pl-PL" smtClean="0"/>
-              <a:t>2019-04-24</a:t>
+              <a:t>2019-04-25</a:t>
             </a:fld>
             <a:endParaRPr lang="pl-PL"/>
           </a:p>
@@ -1796,7 +1796,7 @@
           <a:p>
             <a:fld id="{B52AA6F2-AEE1-4FE6-B3E2-3509488F5D07}" type="datetimeFigureOut">
               <a:rPr lang="pl-PL" smtClean="0"/>
-              <a:t>2019-04-24</a:t>
+              <a:t>2019-04-25</a:t>
             </a:fld>
             <a:endParaRPr lang="pl-PL"/>
           </a:p>
@@ -1914,7 +1914,7 @@
           <a:p>
             <a:fld id="{B52AA6F2-AEE1-4FE6-B3E2-3509488F5D07}" type="datetimeFigureOut">
               <a:rPr lang="pl-PL" smtClean="0"/>
-              <a:t>2019-04-24</a:t>
+              <a:t>2019-04-25</a:t>
             </a:fld>
             <a:endParaRPr lang="pl-PL"/>
           </a:p>
@@ -2009,7 +2009,7 @@
           <a:p>
             <a:fld id="{B52AA6F2-AEE1-4FE6-B3E2-3509488F5D07}" type="datetimeFigureOut">
               <a:rPr lang="pl-PL" smtClean="0"/>
-              <a:t>2019-04-24</a:t>
+              <a:t>2019-04-25</a:t>
             </a:fld>
             <a:endParaRPr lang="pl-PL"/>
           </a:p>
@@ -2286,7 +2286,7 @@
           <a:p>
             <a:fld id="{B52AA6F2-AEE1-4FE6-B3E2-3509488F5D07}" type="datetimeFigureOut">
               <a:rPr lang="pl-PL" smtClean="0"/>
-              <a:t>2019-04-24</a:t>
+              <a:t>2019-04-25</a:t>
             </a:fld>
             <a:endParaRPr lang="pl-PL"/>
           </a:p>
@@ -2539,7 +2539,7 @@
           <a:p>
             <a:fld id="{B52AA6F2-AEE1-4FE6-B3E2-3509488F5D07}" type="datetimeFigureOut">
               <a:rPr lang="pl-PL" smtClean="0"/>
-              <a:t>2019-04-24</a:t>
+              <a:t>2019-04-25</a:t>
             </a:fld>
             <a:endParaRPr lang="pl-PL"/>
           </a:p>
@@ -2752,7 +2752,7 @@
           <a:p>
             <a:fld id="{B52AA6F2-AEE1-4FE6-B3E2-3509488F5D07}" type="datetimeFigureOut">
               <a:rPr lang="pl-PL" smtClean="0"/>
-              <a:t>2019-04-24</a:t>
+              <a:t>2019-04-25</a:t>
             </a:fld>
             <a:endParaRPr lang="pl-PL"/>
           </a:p>
@@ -39644,6 +39644,116 @@
           </a:p>
         </p:txBody>
       </p:sp>
+      <p:sp>
+        <p:nvSpPr>
+          <p:cNvPr id="48" name="Up Arrow 46"/>
+          <p:cNvSpPr>
+            <a:spLocks/>
+          </p:cNvSpPr>
+          <p:nvPr/>
+        </p:nvSpPr>
+        <p:spPr>
+          <a:xfrm rot="12960000" flipV="1">
+            <a:off x="8237825" y="1153699"/>
+            <a:ext cx="296852" cy="646271"/>
+          </a:xfrm>
+          <a:prstGeom prst="upArrow">
+            <a:avLst>
+              <a:gd name="adj1" fmla="val 31999"/>
+              <a:gd name="adj2" fmla="val 68312"/>
+            </a:avLst>
+          </a:prstGeom>
+          <a:solidFill>
+            <a:srgbClr val="7030A0"/>
+          </a:solidFill>
+          <a:ln>
+            <a:solidFill>
+              <a:schemeClr val="accent3">
+                <a:lumMod val="50000"/>
+              </a:schemeClr>
+            </a:solidFill>
+          </a:ln>
+        </p:spPr>
+        <p:style>
+          <a:lnRef idx="2">
+            <a:schemeClr val="accent3">
+              <a:shade val="50000"/>
+            </a:schemeClr>
+          </a:lnRef>
+          <a:fillRef idx="1">
+            <a:schemeClr val="accent3"/>
+          </a:fillRef>
+          <a:effectRef idx="0">
+            <a:schemeClr val="accent3"/>
+          </a:effectRef>
+          <a:fontRef idx="minor">
+            <a:schemeClr val="lt1"/>
+          </a:fontRef>
+        </p:style>
+        <p:txBody>
+          <a:bodyPr rtlCol="0" anchor="ctr"/>
+          <a:lstStyle/>
+          <a:p>
+            <a:pPr algn="ctr"/>
+            <a:endParaRPr lang="pl-PL"/>
+          </a:p>
+        </p:txBody>
+      </p:sp>
+      <p:sp>
+        <p:nvSpPr>
+          <p:cNvPr id="49" name="Up Arrow 46"/>
+          <p:cNvSpPr>
+            <a:spLocks/>
+          </p:cNvSpPr>
+          <p:nvPr/>
+        </p:nvSpPr>
+        <p:spPr>
+          <a:xfrm rot="1440000" flipV="1">
+            <a:off x="7834760" y="4744405"/>
+            <a:ext cx="296852" cy="646271"/>
+          </a:xfrm>
+          <a:prstGeom prst="upArrow">
+            <a:avLst>
+              <a:gd name="adj1" fmla="val 31999"/>
+              <a:gd name="adj2" fmla="val 68312"/>
+            </a:avLst>
+          </a:prstGeom>
+          <a:solidFill>
+            <a:srgbClr val="7030A0"/>
+          </a:solidFill>
+          <a:ln>
+            <a:solidFill>
+              <a:schemeClr val="accent3">
+                <a:lumMod val="50000"/>
+              </a:schemeClr>
+            </a:solidFill>
+          </a:ln>
+        </p:spPr>
+        <p:style>
+          <a:lnRef idx="2">
+            <a:schemeClr val="accent3">
+              <a:shade val="50000"/>
+            </a:schemeClr>
+          </a:lnRef>
+          <a:fillRef idx="1">
+            <a:schemeClr val="accent3"/>
+          </a:fillRef>
+          <a:effectRef idx="0">
+            <a:schemeClr val="accent3"/>
+          </a:effectRef>
+          <a:fontRef idx="minor">
+            <a:schemeClr val="lt1"/>
+          </a:fontRef>
+        </p:style>
+        <p:txBody>
+          <a:bodyPr rtlCol="0" anchor="ctr"/>
+          <a:lstStyle/>
+          <a:p>
+            <a:pPr algn="ctr"/>
+            <a:endParaRPr lang="pl-PL"/>
+          </a:p>
+        </p:txBody>
+      </p:sp>
     </p:spTree>
     <p:extLst>
       <p:ext uri="{BB962C8B-B14F-4D97-AF65-F5344CB8AC3E}">

</xml_diff>

<commit_message>
env4 dodane from  i to w net4
</commit_message>
<xml_diff>
--- a/obrazy.pptx
+++ b/obrazy.pptx
@@ -138,7 +138,7 @@
   </p:defaultTextStyle>
   <p:extLst>
     <p:ext uri="{EFAFB233-063F-42B5-8137-9DF3F51BA10A}">
-      <p15:sldGuideLst xmlns:p15="http://schemas.microsoft.com/office/powerpoint/2012/main" xmlns="">
+      <p15:sldGuideLst xmlns="" xmlns:p15="http://schemas.microsoft.com/office/powerpoint/2012/main">
         <p15:guide id="1" orient="horz" pos="2160">
           <p15:clr>
             <a:srgbClr val="A4A3A4"/>
@@ -336,7 +336,7 @@
           <a:p>
             <a:fld id="{B52AA6F2-AEE1-4FE6-B3E2-3509488F5D07}" type="datetimeFigureOut">
               <a:rPr lang="pl-PL" smtClean="0"/>
-              <a:t>2019-04-26</a:t>
+              <a:t>01.05.2019</a:t>
             </a:fld>
             <a:endParaRPr lang="pl-PL"/>
           </a:p>
@@ -506,7 +506,7 @@
           <a:p>
             <a:fld id="{B52AA6F2-AEE1-4FE6-B3E2-3509488F5D07}" type="datetimeFigureOut">
               <a:rPr lang="pl-PL" smtClean="0"/>
-              <a:t>2019-04-26</a:t>
+              <a:t>01.05.2019</a:t>
             </a:fld>
             <a:endParaRPr lang="pl-PL"/>
           </a:p>
@@ -686,7 +686,7 @@
           <a:p>
             <a:fld id="{B52AA6F2-AEE1-4FE6-B3E2-3509488F5D07}" type="datetimeFigureOut">
               <a:rPr lang="pl-PL" smtClean="0"/>
-              <a:t>2019-04-26</a:t>
+              <a:t>01.05.2019</a:t>
             </a:fld>
             <a:endParaRPr lang="pl-PL"/>
           </a:p>
@@ -856,7 +856,7 @@
           <a:p>
             <a:fld id="{B52AA6F2-AEE1-4FE6-B3E2-3509488F5D07}" type="datetimeFigureOut">
               <a:rPr lang="pl-PL" smtClean="0"/>
-              <a:t>2019-04-26</a:t>
+              <a:t>01.05.2019</a:t>
             </a:fld>
             <a:endParaRPr lang="pl-PL"/>
           </a:p>
@@ -1102,7 +1102,7 @@
           <a:p>
             <a:fld id="{B52AA6F2-AEE1-4FE6-B3E2-3509488F5D07}" type="datetimeFigureOut">
               <a:rPr lang="pl-PL" smtClean="0"/>
-              <a:t>2019-04-26</a:t>
+              <a:t>01.05.2019</a:t>
             </a:fld>
             <a:endParaRPr lang="pl-PL"/>
           </a:p>
@@ -1390,7 +1390,7 @@
           <a:p>
             <a:fld id="{B52AA6F2-AEE1-4FE6-B3E2-3509488F5D07}" type="datetimeFigureOut">
               <a:rPr lang="pl-PL" smtClean="0"/>
-              <a:t>2019-04-26</a:t>
+              <a:t>01.05.2019</a:t>
             </a:fld>
             <a:endParaRPr lang="pl-PL"/>
           </a:p>
@@ -1812,7 +1812,7 @@
           <a:p>
             <a:fld id="{B52AA6F2-AEE1-4FE6-B3E2-3509488F5D07}" type="datetimeFigureOut">
               <a:rPr lang="pl-PL" smtClean="0"/>
-              <a:t>2019-04-26</a:t>
+              <a:t>01.05.2019</a:t>
             </a:fld>
             <a:endParaRPr lang="pl-PL"/>
           </a:p>
@@ -1930,7 +1930,7 @@
           <a:p>
             <a:fld id="{B52AA6F2-AEE1-4FE6-B3E2-3509488F5D07}" type="datetimeFigureOut">
               <a:rPr lang="pl-PL" smtClean="0"/>
-              <a:t>2019-04-26</a:t>
+              <a:t>01.05.2019</a:t>
             </a:fld>
             <a:endParaRPr lang="pl-PL"/>
           </a:p>
@@ -2025,7 +2025,7 @@
           <a:p>
             <a:fld id="{B52AA6F2-AEE1-4FE6-B3E2-3509488F5D07}" type="datetimeFigureOut">
               <a:rPr lang="pl-PL" smtClean="0"/>
-              <a:t>2019-04-26</a:t>
+              <a:t>01.05.2019</a:t>
             </a:fld>
             <a:endParaRPr lang="pl-PL"/>
           </a:p>
@@ -2302,7 +2302,7 @@
           <a:p>
             <a:fld id="{B52AA6F2-AEE1-4FE6-B3E2-3509488F5D07}" type="datetimeFigureOut">
               <a:rPr lang="pl-PL" smtClean="0"/>
-              <a:t>2019-04-26</a:t>
+              <a:t>01.05.2019</a:t>
             </a:fld>
             <a:endParaRPr lang="pl-PL"/>
           </a:p>
@@ -2555,7 +2555,7 @@
           <a:p>
             <a:fld id="{B52AA6F2-AEE1-4FE6-B3E2-3509488F5D07}" type="datetimeFigureOut">
               <a:rPr lang="pl-PL" smtClean="0"/>
-              <a:t>2019-04-26</a:t>
+              <a:t>01.05.2019</a:t>
             </a:fld>
             <a:endParaRPr lang="pl-PL"/>
           </a:p>
@@ -2768,7 +2768,7 @@
           <a:p>
             <a:fld id="{B52AA6F2-AEE1-4FE6-B3E2-3509488F5D07}" type="datetimeFigureOut">
               <a:rPr lang="pl-PL" smtClean="0"/>
-              <a:t>2019-04-26</a:t>
+              <a:t>01.05.2019</a:t>
             </a:fld>
             <a:endParaRPr lang="pl-PL"/>
           </a:p>

</xml_diff>

<commit_message>
Podrobiony env_11 i poczatek samej pracy. Teraz bedzie duzo zmian od rozdzialu wprowadzenie sygnalizacji swietlnej - bardzo gruntownych
</commit_message>
<xml_diff>
--- a/obrazy.pptx
+++ b/obrazy.pptx
@@ -21,25 +21,26 @@
     <p:sldId id="258" r:id="rId15"/>
     <p:sldId id="262" r:id="rId16"/>
     <p:sldId id="263" r:id="rId17"/>
-    <p:sldId id="259" r:id="rId18"/>
-    <p:sldId id="264" r:id="rId19"/>
-    <p:sldId id="265" r:id="rId20"/>
-    <p:sldId id="266" r:id="rId21"/>
-    <p:sldId id="267" r:id="rId22"/>
-    <p:sldId id="270" r:id="rId23"/>
-    <p:sldId id="268" r:id="rId24"/>
-    <p:sldId id="272" r:id="rId25"/>
-    <p:sldId id="273" r:id="rId26"/>
-    <p:sldId id="274" r:id="rId27"/>
-    <p:sldId id="275" r:id="rId28"/>
-    <p:sldId id="276" r:id="rId29"/>
-    <p:sldId id="278" r:id="rId30"/>
-    <p:sldId id="280" r:id="rId31"/>
-    <p:sldId id="281" r:id="rId32"/>
-    <p:sldId id="282" r:id="rId33"/>
-    <p:sldId id="283" r:id="rId34"/>
-    <p:sldId id="284" r:id="rId35"/>
-    <p:sldId id="285" r:id="rId36"/>
+    <p:sldId id="295" r:id="rId18"/>
+    <p:sldId id="259" r:id="rId19"/>
+    <p:sldId id="264" r:id="rId20"/>
+    <p:sldId id="265" r:id="rId21"/>
+    <p:sldId id="266" r:id="rId22"/>
+    <p:sldId id="267" r:id="rId23"/>
+    <p:sldId id="270" r:id="rId24"/>
+    <p:sldId id="268" r:id="rId25"/>
+    <p:sldId id="272" r:id="rId26"/>
+    <p:sldId id="273" r:id="rId27"/>
+    <p:sldId id="274" r:id="rId28"/>
+    <p:sldId id="275" r:id="rId29"/>
+    <p:sldId id="276" r:id="rId30"/>
+    <p:sldId id="278" r:id="rId31"/>
+    <p:sldId id="280" r:id="rId32"/>
+    <p:sldId id="281" r:id="rId33"/>
+    <p:sldId id="282" r:id="rId34"/>
+    <p:sldId id="283" r:id="rId35"/>
+    <p:sldId id="284" r:id="rId36"/>
+    <p:sldId id="285" r:id="rId37"/>
   </p:sldIdLst>
   <p:sldSz cx="9144000" cy="6858000" type="screen4x3"/>
   <p:notesSz cx="6858000" cy="9144000"/>
@@ -140,7 +141,7 @@
   </p:defaultTextStyle>
   <p:extLst>
     <p:ext uri="{EFAFB233-063F-42B5-8137-9DF3F51BA10A}">
-      <p15:sldGuideLst xmlns:p15="http://schemas.microsoft.com/office/powerpoint/2012/main" xmlns="">
+      <p15:sldGuideLst xmlns="" xmlns:p15="http://schemas.microsoft.com/office/powerpoint/2012/main">
         <p15:guide id="1" orient="horz" pos="2160">
           <p15:clr>
             <a:srgbClr val="A4A3A4"/>
@@ -338,7 +339,7 @@
           <a:p>
             <a:fld id="{B52AA6F2-AEE1-4FE6-B3E2-3509488F5D07}" type="datetimeFigureOut">
               <a:rPr lang="pl-PL" smtClean="0"/>
-              <a:t>26.06.2019</a:t>
+              <a:t>05.07.2019</a:t>
             </a:fld>
             <a:endParaRPr lang="pl-PL"/>
           </a:p>
@@ -508,7 +509,7 @@
           <a:p>
             <a:fld id="{B52AA6F2-AEE1-4FE6-B3E2-3509488F5D07}" type="datetimeFigureOut">
               <a:rPr lang="pl-PL" smtClean="0"/>
-              <a:t>26.06.2019</a:t>
+              <a:t>05.07.2019</a:t>
             </a:fld>
             <a:endParaRPr lang="pl-PL"/>
           </a:p>
@@ -688,7 +689,7 @@
           <a:p>
             <a:fld id="{B52AA6F2-AEE1-4FE6-B3E2-3509488F5D07}" type="datetimeFigureOut">
               <a:rPr lang="pl-PL" smtClean="0"/>
-              <a:t>26.06.2019</a:t>
+              <a:t>05.07.2019</a:t>
             </a:fld>
             <a:endParaRPr lang="pl-PL"/>
           </a:p>
@@ -858,7 +859,7 @@
           <a:p>
             <a:fld id="{B52AA6F2-AEE1-4FE6-B3E2-3509488F5D07}" type="datetimeFigureOut">
               <a:rPr lang="pl-PL" smtClean="0"/>
-              <a:t>26.06.2019</a:t>
+              <a:t>05.07.2019</a:t>
             </a:fld>
             <a:endParaRPr lang="pl-PL"/>
           </a:p>
@@ -1104,7 +1105,7 @@
           <a:p>
             <a:fld id="{B52AA6F2-AEE1-4FE6-B3E2-3509488F5D07}" type="datetimeFigureOut">
               <a:rPr lang="pl-PL" smtClean="0"/>
-              <a:t>26.06.2019</a:t>
+              <a:t>05.07.2019</a:t>
             </a:fld>
             <a:endParaRPr lang="pl-PL"/>
           </a:p>
@@ -1392,7 +1393,7 @@
           <a:p>
             <a:fld id="{B52AA6F2-AEE1-4FE6-B3E2-3509488F5D07}" type="datetimeFigureOut">
               <a:rPr lang="pl-PL" smtClean="0"/>
-              <a:t>26.06.2019</a:t>
+              <a:t>05.07.2019</a:t>
             </a:fld>
             <a:endParaRPr lang="pl-PL"/>
           </a:p>
@@ -1814,7 +1815,7 @@
           <a:p>
             <a:fld id="{B52AA6F2-AEE1-4FE6-B3E2-3509488F5D07}" type="datetimeFigureOut">
               <a:rPr lang="pl-PL" smtClean="0"/>
-              <a:t>26.06.2019</a:t>
+              <a:t>05.07.2019</a:t>
             </a:fld>
             <a:endParaRPr lang="pl-PL"/>
           </a:p>
@@ -1932,7 +1933,7 @@
           <a:p>
             <a:fld id="{B52AA6F2-AEE1-4FE6-B3E2-3509488F5D07}" type="datetimeFigureOut">
               <a:rPr lang="pl-PL" smtClean="0"/>
-              <a:t>26.06.2019</a:t>
+              <a:t>05.07.2019</a:t>
             </a:fld>
             <a:endParaRPr lang="pl-PL"/>
           </a:p>
@@ -2027,7 +2028,7 @@
           <a:p>
             <a:fld id="{B52AA6F2-AEE1-4FE6-B3E2-3509488F5D07}" type="datetimeFigureOut">
               <a:rPr lang="pl-PL" smtClean="0"/>
-              <a:t>26.06.2019</a:t>
+              <a:t>05.07.2019</a:t>
             </a:fld>
             <a:endParaRPr lang="pl-PL"/>
           </a:p>
@@ -2304,7 +2305,7 @@
           <a:p>
             <a:fld id="{B52AA6F2-AEE1-4FE6-B3E2-3509488F5D07}" type="datetimeFigureOut">
               <a:rPr lang="pl-PL" smtClean="0"/>
-              <a:t>26.06.2019</a:t>
+              <a:t>05.07.2019</a:t>
             </a:fld>
             <a:endParaRPr lang="pl-PL"/>
           </a:p>
@@ -2557,7 +2558,7 @@
           <a:p>
             <a:fld id="{B52AA6F2-AEE1-4FE6-B3E2-3509488F5D07}" type="datetimeFigureOut">
               <a:rPr lang="pl-PL" smtClean="0"/>
-              <a:t>26.06.2019</a:t>
+              <a:t>05.07.2019</a:t>
             </a:fld>
             <a:endParaRPr lang="pl-PL"/>
           </a:p>
@@ -2770,7 +2771,7 @@
           <a:p>
             <a:fld id="{B52AA6F2-AEE1-4FE6-B3E2-3509488F5D07}" type="datetimeFigureOut">
               <a:rPr lang="pl-PL" smtClean="0"/>
-              <a:t>26.06.2019</a:t>
+              <a:t>05.07.2019</a:t>
             </a:fld>
             <a:endParaRPr lang="pl-PL"/>
           </a:p>
@@ -11399,6 +11400,596 @@
           <a:chExt cx="0" cy="0"/>
         </a:xfrm>
       </p:grpSpPr>
+      <p:sp>
+        <p:nvSpPr>
+          <p:cNvPr id="26" name="AutoShape 5" descr="Znalezione obrazy dla zapytania strzałka"/>
+          <p:cNvSpPr>
+            <a:spLocks noChangeAspect="1" noChangeArrowheads="1"/>
+          </p:cNvSpPr>
+          <p:nvPr/>
+        </p:nvSpPr>
+        <p:spPr bwMode="auto">
+          <a:xfrm>
+            <a:off x="155575" y="-2079625"/>
+            <a:ext cx="4333875" cy="4333875"/>
+          </a:xfrm>
+          <a:prstGeom prst="rect">
+            <a:avLst/>
+          </a:prstGeom>
+          <a:noFill/>
+          <a:extLst>
+            <a:ext uri="{909E8E84-426E-40DD-AFC4-6F175D3DCCD1}">
+              <a14:hiddenFill xmlns:a14="http://schemas.microsoft.com/office/drawing/2010/main">
+                <a:solidFill>
+                  <a:srgbClr val="FFFFFF"/>
+                </a:solidFill>
+              </a14:hiddenFill>
+            </a:ext>
+          </a:extLst>
+        </p:spPr>
+        <p:txBody>
+          <a:bodyPr vert="horz" wrap="square" lIns="91440" tIns="45720" rIns="91440" bIns="45720" numCol="1" anchor="t" anchorCtr="0" compatLnSpc="1">
+            <a:prstTxWarp prst="textNoShape">
+              <a:avLst/>
+            </a:prstTxWarp>
+          </a:bodyPr>
+          <a:lstStyle/>
+          <a:p>
+            <a:endParaRPr lang="pl-PL"/>
+          </a:p>
+        </p:txBody>
+      </p:sp>
+      <p:sp>
+        <p:nvSpPr>
+          <p:cNvPr id="27" name="AutoShape 7" descr="Znalezione obrazy dla zapytania strzałka"/>
+          <p:cNvSpPr>
+            <a:spLocks noChangeAspect="1" noChangeArrowheads="1"/>
+          </p:cNvSpPr>
+          <p:nvPr/>
+        </p:nvSpPr>
+        <p:spPr bwMode="auto">
+          <a:xfrm>
+            <a:off x="307975" y="-1927225"/>
+            <a:ext cx="4333875" cy="4333875"/>
+          </a:xfrm>
+          <a:prstGeom prst="rect">
+            <a:avLst/>
+          </a:prstGeom>
+          <a:noFill/>
+          <a:extLst>
+            <a:ext uri="{909E8E84-426E-40DD-AFC4-6F175D3DCCD1}">
+              <a14:hiddenFill xmlns:a14="http://schemas.microsoft.com/office/drawing/2010/main">
+                <a:solidFill>
+                  <a:srgbClr val="FFFFFF"/>
+                </a:solidFill>
+              </a14:hiddenFill>
+            </a:ext>
+          </a:extLst>
+        </p:spPr>
+        <p:txBody>
+          <a:bodyPr vert="horz" wrap="square" lIns="91440" tIns="45720" rIns="91440" bIns="45720" numCol="1" anchor="t" anchorCtr="0" compatLnSpc="1">
+            <a:prstTxWarp prst="textNoShape">
+              <a:avLst/>
+            </a:prstTxWarp>
+          </a:bodyPr>
+          <a:lstStyle/>
+          <a:p>
+            <a:endParaRPr lang="pl-PL"/>
+          </a:p>
+        </p:txBody>
+      </p:sp>
+      <p:pic>
+        <p:nvPicPr>
+          <p:cNvPr id="1034" name="Picture 10"/>
+          <p:cNvPicPr>
+            <a:picLocks noChangeAspect="1" noChangeArrowheads="1"/>
+          </p:cNvPicPr>
+          <p:nvPr/>
+        </p:nvPicPr>
+        <p:blipFill>
+          <a:blip r:embed="rId2">
+            <a:extLst>
+              <a:ext uri="{28A0092B-C50C-407E-A947-70E740481C1C}">
+                <a14:useLocalDpi xmlns:a14="http://schemas.microsoft.com/office/drawing/2010/main" val="0"/>
+              </a:ext>
+            </a:extLst>
+          </a:blip>
+          <a:srcRect/>
+          <a:stretch>
+            <a:fillRect/>
+          </a:stretch>
+        </p:blipFill>
+        <p:spPr bwMode="auto">
+          <a:xfrm>
+            <a:off x="-324544" y="-295751"/>
+            <a:ext cx="4429125" cy="3038475"/>
+          </a:xfrm>
+          <a:prstGeom prst="rect">
+            <a:avLst/>
+          </a:prstGeom>
+          <a:noFill/>
+          <a:ln>
+            <a:noFill/>
+          </a:ln>
+          <a:effectLst/>
+          <a:extLst>
+            <a:ext uri="{909E8E84-426E-40DD-AFC4-6F175D3DCCD1}">
+              <a14:hiddenFill xmlns:a14="http://schemas.microsoft.com/office/drawing/2010/main">
+                <a:solidFill>
+                  <a:schemeClr val="accent1"/>
+                </a:solidFill>
+              </a14:hiddenFill>
+            </a:ext>
+            <a:ext uri="{91240B29-F687-4F45-9708-019B960494DF}">
+              <a14:hiddenLine xmlns:a14="http://schemas.microsoft.com/office/drawing/2010/main" w="9525">
+                <a:solidFill>
+                  <a:schemeClr val="tx1"/>
+                </a:solidFill>
+                <a:miter lim="800000"/>
+                <a:headEnd/>
+                <a:tailEnd/>
+              </a14:hiddenLine>
+            </a:ext>
+            <a:ext uri="{AF507438-7753-43E0-B8FC-AC1667EBCBE1}">
+              <a14:hiddenEffects xmlns:a14="http://schemas.microsoft.com/office/drawing/2010/main">
+                <a:effectLst>
+                  <a:outerShdw dist="35921" dir="2700000" algn="ctr" rotWithShape="0">
+                    <a:schemeClr val="bg2"/>
+                  </a:outerShdw>
+                </a:effectLst>
+              </a14:hiddenEffects>
+            </a:ext>
+          </a:extLst>
+        </p:spPr>
+      </p:pic>
+      <p:sp>
+        <p:nvSpPr>
+          <p:cNvPr id="28" name="pole tekstowe 27"/>
+          <p:cNvSpPr txBox="1"/>
+          <p:nvPr/>
+        </p:nvSpPr>
+        <p:spPr>
+          <a:xfrm>
+            <a:off x="1596508" y="1527295"/>
+            <a:ext cx="583814" cy="369332"/>
+          </a:xfrm>
+          <a:prstGeom prst="rect">
+            <a:avLst/>
+          </a:prstGeom>
+          <a:noFill/>
+        </p:spPr>
+        <p:txBody>
+          <a:bodyPr wrap="none" rtlCol="0">
+            <a:spAutoFit/>
+          </a:bodyPr>
+          <a:lstStyle/>
+          <a:p>
+            <a:r>
+              <a:rPr lang="pl-PL" b="1" dirty="0" smtClean="0"/>
+              <a:t>75%</a:t>
+            </a:r>
+            <a:endParaRPr lang="pl-PL" b="1" dirty="0"/>
+          </a:p>
+        </p:txBody>
+      </p:sp>
+      <p:sp>
+        <p:nvSpPr>
+          <p:cNvPr id="34" name="pole tekstowe 33"/>
+          <p:cNvSpPr txBox="1"/>
+          <p:nvPr/>
+        </p:nvSpPr>
+        <p:spPr>
+          <a:xfrm>
+            <a:off x="1594905" y="598037"/>
+            <a:ext cx="587020" cy="369332"/>
+          </a:xfrm>
+          <a:prstGeom prst="rect">
+            <a:avLst/>
+          </a:prstGeom>
+          <a:noFill/>
+        </p:spPr>
+        <p:txBody>
+          <a:bodyPr wrap="none" rtlCol="0">
+            <a:spAutoFit/>
+          </a:bodyPr>
+          <a:lstStyle/>
+          <a:p>
+            <a:r>
+              <a:rPr lang="pl-PL" b="1" dirty="0"/>
+              <a:t>2</a:t>
+            </a:r>
+            <a:r>
+              <a:rPr lang="pl-PL" b="1" dirty="0" smtClean="0"/>
+              <a:t>5%</a:t>
+            </a:r>
+            <a:endParaRPr lang="pl-PL" b="1" dirty="0"/>
+          </a:p>
+        </p:txBody>
+      </p:sp>
+      <p:pic>
+        <p:nvPicPr>
+          <p:cNvPr id="1037" name="Picture 13"/>
+          <p:cNvPicPr>
+            <a:picLocks noChangeAspect="1" noChangeArrowheads="1"/>
+          </p:cNvPicPr>
+          <p:nvPr/>
+        </p:nvPicPr>
+        <p:blipFill>
+          <a:blip r:embed="rId3">
+            <a:extLst>
+              <a:ext uri="{28A0092B-C50C-407E-A947-70E740481C1C}">
+                <a14:useLocalDpi xmlns:a14="http://schemas.microsoft.com/office/drawing/2010/main" val="0"/>
+              </a:ext>
+            </a:extLst>
+          </a:blip>
+          <a:srcRect/>
+          <a:stretch>
+            <a:fillRect/>
+          </a:stretch>
+        </p:blipFill>
+        <p:spPr bwMode="auto">
+          <a:xfrm>
+            <a:off x="5292080" y="-57626"/>
+            <a:ext cx="4181475" cy="2800350"/>
+          </a:xfrm>
+          <a:prstGeom prst="rect">
+            <a:avLst/>
+          </a:prstGeom>
+          <a:noFill/>
+          <a:ln>
+            <a:noFill/>
+          </a:ln>
+          <a:effectLst/>
+          <a:extLst>
+            <a:ext uri="{909E8E84-426E-40DD-AFC4-6F175D3DCCD1}">
+              <a14:hiddenFill xmlns:a14="http://schemas.microsoft.com/office/drawing/2010/main">
+                <a:solidFill>
+                  <a:schemeClr val="accent1"/>
+                </a:solidFill>
+              </a14:hiddenFill>
+            </a:ext>
+            <a:ext uri="{91240B29-F687-4F45-9708-019B960494DF}">
+              <a14:hiddenLine xmlns:a14="http://schemas.microsoft.com/office/drawing/2010/main" w="9525">
+                <a:solidFill>
+                  <a:schemeClr val="tx1"/>
+                </a:solidFill>
+                <a:miter lim="800000"/>
+                <a:headEnd/>
+                <a:tailEnd/>
+              </a14:hiddenLine>
+            </a:ext>
+            <a:ext uri="{AF507438-7753-43E0-B8FC-AC1667EBCBE1}">
+              <a14:hiddenEffects xmlns:a14="http://schemas.microsoft.com/office/drawing/2010/main">
+                <a:effectLst>
+                  <a:outerShdw dist="35921" dir="2700000" algn="ctr" rotWithShape="0">
+                    <a:schemeClr val="bg2"/>
+                  </a:outerShdw>
+                </a:effectLst>
+              </a14:hiddenEffects>
+            </a:ext>
+          </a:extLst>
+        </p:spPr>
+      </p:pic>
+      <p:sp>
+        <p:nvSpPr>
+          <p:cNvPr id="41" name="pole tekstowe 40"/>
+          <p:cNvSpPr txBox="1"/>
+          <p:nvPr/>
+        </p:nvSpPr>
+        <p:spPr>
+          <a:xfrm>
+            <a:off x="7064533" y="1527295"/>
+            <a:ext cx="583814" cy="369332"/>
+          </a:xfrm>
+          <a:prstGeom prst="rect">
+            <a:avLst/>
+          </a:prstGeom>
+          <a:noFill/>
+        </p:spPr>
+        <p:txBody>
+          <a:bodyPr wrap="none" rtlCol="0">
+            <a:spAutoFit/>
+          </a:bodyPr>
+          <a:lstStyle/>
+          <a:p>
+            <a:r>
+              <a:rPr lang="pl-PL" b="1" dirty="0" smtClean="0"/>
+              <a:t>75%</a:t>
+            </a:r>
+            <a:endParaRPr lang="pl-PL" b="1" dirty="0"/>
+          </a:p>
+        </p:txBody>
+      </p:sp>
+      <p:sp>
+        <p:nvSpPr>
+          <p:cNvPr id="42" name="pole tekstowe 41"/>
+          <p:cNvSpPr txBox="1"/>
+          <p:nvPr/>
+        </p:nvSpPr>
+        <p:spPr>
+          <a:xfrm>
+            <a:off x="7089307" y="750437"/>
+            <a:ext cx="587020" cy="369332"/>
+          </a:xfrm>
+          <a:prstGeom prst="rect">
+            <a:avLst/>
+          </a:prstGeom>
+          <a:noFill/>
+        </p:spPr>
+        <p:txBody>
+          <a:bodyPr wrap="none" rtlCol="0">
+            <a:spAutoFit/>
+          </a:bodyPr>
+          <a:lstStyle/>
+          <a:p>
+            <a:r>
+              <a:rPr lang="pl-PL" b="1" dirty="0"/>
+              <a:t>2</a:t>
+            </a:r>
+            <a:r>
+              <a:rPr lang="pl-PL" b="1" dirty="0" smtClean="0"/>
+              <a:t>5%</a:t>
+            </a:r>
+            <a:endParaRPr lang="pl-PL" b="1" dirty="0"/>
+          </a:p>
+        </p:txBody>
+      </p:sp>
+      <p:pic>
+        <p:nvPicPr>
+          <p:cNvPr id="1038" name="Picture 14"/>
+          <p:cNvPicPr>
+            <a:picLocks noChangeAspect="1" noChangeArrowheads="1"/>
+          </p:cNvPicPr>
+          <p:nvPr/>
+        </p:nvPicPr>
+        <p:blipFill>
+          <a:blip r:embed="rId4">
+            <a:extLst>
+              <a:ext uri="{28A0092B-C50C-407E-A947-70E740481C1C}">
+                <a14:useLocalDpi xmlns:a14="http://schemas.microsoft.com/office/drawing/2010/main" val="0"/>
+              </a:ext>
+            </a:extLst>
+          </a:blip>
+          <a:srcRect/>
+          <a:stretch>
+            <a:fillRect/>
+          </a:stretch>
+        </p:blipFill>
+        <p:spPr bwMode="auto">
+          <a:xfrm>
+            <a:off x="-324544" y="3573016"/>
+            <a:ext cx="4210050" cy="2914650"/>
+          </a:xfrm>
+          <a:prstGeom prst="rect">
+            <a:avLst/>
+          </a:prstGeom>
+          <a:noFill/>
+          <a:ln>
+            <a:noFill/>
+          </a:ln>
+          <a:effectLst/>
+          <a:extLst>
+            <a:ext uri="{909E8E84-426E-40DD-AFC4-6F175D3DCCD1}">
+              <a14:hiddenFill xmlns:a14="http://schemas.microsoft.com/office/drawing/2010/main">
+                <a:solidFill>
+                  <a:schemeClr val="accent1"/>
+                </a:solidFill>
+              </a14:hiddenFill>
+            </a:ext>
+            <a:ext uri="{91240B29-F687-4F45-9708-019B960494DF}">
+              <a14:hiddenLine xmlns:a14="http://schemas.microsoft.com/office/drawing/2010/main" w="9525">
+                <a:solidFill>
+                  <a:schemeClr val="tx1"/>
+                </a:solidFill>
+                <a:miter lim="800000"/>
+                <a:headEnd/>
+                <a:tailEnd/>
+              </a14:hiddenLine>
+            </a:ext>
+            <a:ext uri="{AF507438-7753-43E0-B8FC-AC1667EBCBE1}">
+              <a14:hiddenEffects xmlns:a14="http://schemas.microsoft.com/office/drawing/2010/main">
+                <a:effectLst>
+                  <a:outerShdw dist="35921" dir="2700000" algn="ctr" rotWithShape="0">
+                    <a:schemeClr val="bg2"/>
+                  </a:outerShdw>
+                </a:effectLst>
+              </a14:hiddenEffects>
+            </a:ext>
+          </a:extLst>
+        </p:spPr>
+      </p:pic>
+      <p:pic>
+        <p:nvPicPr>
+          <p:cNvPr id="1039" name="Picture 15"/>
+          <p:cNvPicPr>
+            <a:picLocks noChangeAspect="1" noChangeArrowheads="1"/>
+          </p:cNvPicPr>
+          <p:nvPr/>
+        </p:nvPicPr>
+        <p:blipFill>
+          <a:blip r:embed="rId5">
+            <a:extLst>
+              <a:ext uri="{28A0092B-C50C-407E-A947-70E740481C1C}">
+                <a14:useLocalDpi xmlns:a14="http://schemas.microsoft.com/office/drawing/2010/main" val="0"/>
+              </a:ext>
+            </a:extLst>
+          </a:blip>
+          <a:srcRect/>
+          <a:stretch>
+            <a:fillRect/>
+          </a:stretch>
+        </p:blipFill>
+        <p:spPr bwMode="auto">
+          <a:xfrm>
+            <a:off x="4905375" y="3706366"/>
+            <a:ext cx="4238625" cy="2781300"/>
+          </a:xfrm>
+          <a:prstGeom prst="rect">
+            <a:avLst/>
+          </a:prstGeom>
+          <a:noFill/>
+          <a:ln>
+            <a:noFill/>
+          </a:ln>
+          <a:effectLst/>
+          <a:extLst>
+            <a:ext uri="{909E8E84-426E-40DD-AFC4-6F175D3DCCD1}">
+              <a14:hiddenFill xmlns:a14="http://schemas.microsoft.com/office/drawing/2010/main">
+                <a:solidFill>
+                  <a:schemeClr val="accent1"/>
+                </a:solidFill>
+              </a14:hiddenFill>
+            </a:ext>
+            <a:ext uri="{91240B29-F687-4F45-9708-019B960494DF}">
+              <a14:hiddenLine xmlns:a14="http://schemas.microsoft.com/office/drawing/2010/main" w="9525">
+                <a:solidFill>
+                  <a:schemeClr val="tx1"/>
+                </a:solidFill>
+                <a:miter lim="800000"/>
+                <a:headEnd/>
+                <a:tailEnd/>
+              </a14:hiddenLine>
+            </a:ext>
+            <a:ext uri="{AF507438-7753-43E0-B8FC-AC1667EBCBE1}">
+              <a14:hiddenEffects xmlns:a14="http://schemas.microsoft.com/office/drawing/2010/main">
+                <a:effectLst>
+                  <a:outerShdw dist="35921" dir="2700000" algn="ctr" rotWithShape="0">
+                    <a:schemeClr val="bg2"/>
+                  </a:outerShdw>
+                </a:effectLst>
+              </a14:hiddenEffects>
+            </a:ext>
+          </a:extLst>
+        </p:spPr>
+      </p:pic>
+      <p:sp>
+        <p:nvSpPr>
+          <p:cNvPr id="45" name="pole tekstowe 44"/>
+          <p:cNvSpPr txBox="1"/>
+          <p:nvPr/>
+        </p:nvSpPr>
+        <p:spPr>
+          <a:xfrm>
+            <a:off x="1488574" y="5366370"/>
+            <a:ext cx="583814" cy="369332"/>
+          </a:xfrm>
+          <a:prstGeom prst="rect">
+            <a:avLst/>
+          </a:prstGeom>
+          <a:noFill/>
+        </p:spPr>
+        <p:txBody>
+          <a:bodyPr wrap="none" rtlCol="0">
+            <a:spAutoFit/>
+          </a:bodyPr>
+          <a:lstStyle/>
+          <a:p>
+            <a:r>
+              <a:rPr lang="pl-PL" b="1" dirty="0" smtClean="0"/>
+              <a:t>75%</a:t>
+            </a:r>
+            <a:endParaRPr lang="pl-PL" b="1" dirty="0"/>
+          </a:p>
+        </p:txBody>
+      </p:sp>
+      <p:sp>
+        <p:nvSpPr>
+          <p:cNvPr id="46" name="pole tekstowe 45"/>
+          <p:cNvSpPr txBox="1"/>
+          <p:nvPr/>
+        </p:nvSpPr>
+        <p:spPr>
+          <a:xfrm>
+            <a:off x="1486971" y="4437112"/>
+            <a:ext cx="587020" cy="369332"/>
+          </a:xfrm>
+          <a:prstGeom prst="rect">
+            <a:avLst/>
+          </a:prstGeom>
+          <a:noFill/>
+        </p:spPr>
+        <p:txBody>
+          <a:bodyPr wrap="none" rtlCol="0">
+            <a:spAutoFit/>
+          </a:bodyPr>
+          <a:lstStyle/>
+          <a:p>
+            <a:r>
+              <a:rPr lang="pl-PL" b="1" dirty="0"/>
+              <a:t>2</a:t>
+            </a:r>
+            <a:r>
+              <a:rPr lang="pl-PL" b="1" dirty="0" smtClean="0"/>
+              <a:t>5%</a:t>
+            </a:r>
+            <a:endParaRPr lang="pl-PL" b="1" dirty="0"/>
+          </a:p>
+        </p:txBody>
+      </p:sp>
+      <p:sp>
+        <p:nvSpPr>
+          <p:cNvPr id="47" name="pole tekstowe 46"/>
+          <p:cNvSpPr txBox="1"/>
+          <p:nvPr/>
+        </p:nvSpPr>
+        <p:spPr>
+          <a:xfrm>
+            <a:off x="6732780" y="5396097"/>
+            <a:ext cx="583814" cy="369332"/>
+          </a:xfrm>
+          <a:prstGeom prst="rect">
+            <a:avLst/>
+          </a:prstGeom>
+          <a:noFill/>
+        </p:spPr>
+        <p:txBody>
+          <a:bodyPr wrap="none" rtlCol="0">
+            <a:spAutoFit/>
+          </a:bodyPr>
+          <a:lstStyle/>
+          <a:p>
+            <a:r>
+              <a:rPr lang="pl-PL" b="1" dirty="0" smtClean="0"/>
+              <a:t>75%</a:t>
+            </a:r>
+            <a:endParaRPr lang="pl-PL" b="1" dirty="0"/>
+          </a:p>
+        </p:txBody>
+      </p:sp>
+      <p:sp>
+        <p:nvSpPr>
+          <p:cNvPr id="48" name="pole tekstowe 47"/>
+          <p:cNvSpPr txBox="1"/>
+          <p:nvPr/>
+        </p:nvSpPr>
+        <p:spPr>
+          <a:xfrm>
+            <a:off x="6731177" y="4472683"/>
+            <a:ext cx="587020" cy="369332"/>
+          </a:xfrm>
+          <a:prstGeom prst="rect">
+            <a:avLst/>
+          </a:prstGeom>
+          <a:noFill/>
+        </p:spPr>
+        <p:txBody>
+          <a:bodyPr wrap="none" rtlCol="0">
+            <a:spAutoFit/>
+          </a:bodyPr>
+          <a:lstStyle/>
+          <a:p>
+            <a:r>
+              <a:rPr lang="pl-PL" b="1" dirty="0"/>
+              <a:t>2</a:t>
+            </a:r>
+            <a:r>
+              <a:rPr lang="pl-PL" b="1" dirty="0" smtClean="0"/>
+              <a:t>5%</a:t>
+            </a:r>
+            <a:endParaRPr lang="pl-PL" b="1" dirty="0"/>
+          </a:p>
+        </p:txBody>
+      </p:sp>
     </p:spTree>
     <p:extLst>
       <p:ext uri="{BB962C8B-B14F-4D97-AF65-F5344CB8AC3E}">
@@ -11413,6 +12004,121 @@
 </file>
 
 <file path=ppt/slides/slide17.xml><?xml version="1.0" encoding="utf-8"?>
+<p:sld xmlns:a="http://schemas.openxmlformats.org/drawingml/2006/main" xmlns:r="http://schemas.openxmlformats.org/officeDocument/2006/relationships" xmlns:p="http://schemas.openxmlformats.org/presentationml/2006/main">
+  <p:cSld>
+    <p:spTree>
+      <p:nvGrpSpPr>
+        <p:cNvPr id="1" name=""/>
+        <p:cNvGrpSpPr/>
+        <p:nvPr/>
+      </p:nvGrpSpPr>
+      <p:grpSpPr>
+        <a:xfrm>
+          <a:off x="0" y="0"/>
+          <a:ext cx="0" cy="0"/>
+          <a:chOff x="0" y="0"/>
+          <a:chExt cx="0" cy="0"/>
+        </a:xfrm>
+      </p:grpSpPr>
+      <p:sp>
+        <p:nvSpPr>
+          <p:cNvPr id="2" name="Tytuł 1"/>
+          <p:cNvSpPr>
+            <a:spLocks noGrp="1"/>
+          </p:cNvSpPr>
+          <p:nvPr>
+            <p:ph type="title"/>
+          </p:nvPr>
+        </p:nvSpPr>
+        <p:spPr/>
+        <p:txBody>
+          <a:bodyPr/>
+          <a:lstStyle/>
+          <a:p>
+            <a:endParaRPr lang="pl-PL"/>
+          </a:p>
+        </p:txBody>
+      </p:sp>
+      <p:pic>
+        <p:nvPicPr>
+          <p:cNvPr id="4" name="Picture 10"/>
+          <p:cNvPicPr>
+            <a:picLocks noGrp="1" noChangeAspect="1" noChangeArrowheads="1"/>
+          </p:cNvPicPr>
+          <p:nvPr>
+            <p:ph idx="1"/>
+          </p:nvPr>
+        </p:nvPicPr>
+        <p:blipFill>
+          <a:blip r:embed="rId2">
+            <a:extLst>
+              <a:ext uri="{28A0092B-C50C-407E-A947-70E740481C1C}">
+                <a14:useLocalDpi xmlns:a14="http://schemas.microsoft.com/office/drawing/2010/main" val="0"/>
+              </a:ext>
+            </a:extLst>
+          </a:blip>
+          <a:srcRect/>
+          <a:stretch>
+            <a:fillRect/>
+          </a:stretch>
+        </p:blipFill>
+        <p:spPr bwMode="auto">
+          <a:xfrm>
+            <a:off x="2357128" y="2343732"/>
+            <a:ext cx="4429743" cy="3038899"/>
+          </a:xfrm>
+          <a:prstGeom prst="rect">
+            <a:avLst/>
+          </a:prstGeom>
+          <a:noFill/>
+          <a:ln>
+            <a:noFill/>
+          </a:ln>
+          <a:effectLst/>
+          <a:extLst>
+            <a:ext uri="{909E8E84-426E-40DD-AFC4-6F175D3DCCD1}">
+              <a14:hiddenFill xmlns:a14="http://schemas.microsoft.com/office/drawing/2010/main">
+                <a:solidFill>
+                  <a:schemeClr val="accent1"/>
+                </a:solidFill>
+              </a14:hiddenFill>
+            </a:ext>
+            <a:ext uri="{91240B29-F687-4F45-9708-019B960494DF}">
+              <a14:hiddenLine xmlns:a14="http://schemas.microsoft.com/office/drawing/2010/main" w="9525">
+                <a:solidFill>
+                  <a:schemeClr val="tx1"/>
+                </a:solidFill>
+                <a:miter lim="800000"/>
+                <a:headEnd/>
+                <a:tailEnd/>
+              </a14:hiddenLine>
+            </a:ext>
+            <a:ext uri="{AF507438-7753-43E0-B8FC-AC1667EBCBE1}">
+              <a14:hiddenEffects xmlns:a14="http://schemas.microsoft.com/office/drawing/2010/main">
+                <a:effectLst>
+                  <a:outerShdw dist="35921" dir="2700000" algn="ctr" rotWithShape="0">
+                    <a:schemeClr val="bg2"/>
+                  </a:outerShdw>
+                </a:effectLst>
+              </a14:hiddenEffects>
+            </a:ext>
+          </a:extLst>
+        </p:spPr>
+      </p:pic>
+    </p:spTree>
+    <p:extLst>
+      <p:ext uri="{BB962C8B-B14F-4D97-AF65-F5344CB8AC3E}">
+        <p14:creationId xmlns:p14="http://schemas.microsoft.com/office/powerpoint/2010/main" val="4004583749"/>
+      </p:ext>
+    </p:extLst>
+  </p:cSld>
+  <p:clrMapOvr>
+    <a:masterClrMapping/>
+  </p:clrMapOvr>
+</p:sld>
+</file>
+
+<file path=ppt/slides/slide18.xml><?xml version="1.0" encoding="utf-8"?>
 <p:sld xmlns:a="http://schemas.openxmlformats.org/drawingml/2006/main" xmlns:r="http://schemas.openxmlformats.org/officeDocument/2006/relationships" xmlns:p="http://schemas.openxmlformats.org/presentationml/2006/main">
   <p:cSld>
     <p:spTree>
@@ -12807,7 +13513,7 @@
 </p:sld>
 </file>
 
-<file path=ppt/slides/slide18.xml><?xml version="1.0" encoding="utf-8"?>
+<file path=ppt/slides/slide19.xml><?xml version="1.0" encoding="utf-8"?>
 <p:sld xmlns:a="http://schemas.openxmlformats.org/drawingml/2006/main" xmlns:r="http://schemas.openxmlformats.org/officeDocument/2006/relationships" xmlns:p="http://schemas.openxmlformats.org/presentationml/2006/main">
   <p:cSld>
     <p:spTree>
@@ -15019,7 +15725,139 @@
 </p:sld>
 </file>
 
-<file path=ppt/slides/slide19.xml><?xml version="1.0" encoding="utf-8"?>
+<file path=ppt/slides/slide2.xml><?xml version="1.0" encoding="utf-8"?>
+<p:sld xmlns:a="http://schemas.openxmlformats.org/drawingml/2006/main" xmlns:r="http://schemas.openxmlformats.org/officeDocument/2006/relationships" xmlns:p="http://schemas.openxmlformats.org/presentationml/2006/main">
+  <p:cSld>
+    <p:spTree>
+      <p:nvGrpSpPr>
+        <p:cNvPr id="1" name=""/>
+        <p:cNvGrpSpPr/>
+        <p:nvPr/>
+      </p:nvGrpSpPr>
+      <p:grpSpPr>
+        <a:xfrm>
+          <a:off x="0" y="0"/>
+          <a:ext cx="0" cy="0"/>
+          <a:chOff x="0" y="0"/>
+          <a:chExt cx="0" cy="0"/>
+        </a:xfrm>
+      </p:grpSpPr>
+      <p:pic>
+        <p:nvPicPr>
+          <p:cNvPr id="1026" name="Picture 2"/>
+          <p:cNvPicPr>
+            <a:picLocks noChangeAspect="1" noChangeArrowheads="1"/>
+          </p:cNvPicPr>
+          <p:nvPr/>
+        </p:nvPicPr>
+        <p:blipFill>
+          <a:blip r:embed="rId2">
+            <a:extLst>
+              <a:ext uri="{28A0092B-C50C-407E-A947-70E740481C1C}">
+                <a14:useLocalDpi xmlns:a14="http://schemas.microsoft.com/office/drawing/2010/main" val="0"/>
+              </a:ext>
+            </a:extLst>
+          </a:blip>
+          <a:srcRect/>
+          <a:stretch>
+            <a:fillRect/>
+          </a:stretch>
+        </p:blipFill>
+        <p:spPr bwMode="auto">
+          <a:xfrm>
+            <a:off x="1835696" y="1007371"/>
+            <a:ext cx="4641304" cy="4107554"/>
+          </a:xfrm>
+          <a:prstGeom prst="rect">
+            <a:avLst/>
+          </a:prstGeom>
+          <a:noFill/>
+          <a:ln>
+            <a:noFill/>
+          </a:ln>
+          <a:effectLst/>
+          <a:extLst>
+            <a:ext uri="{909E8E84-426E-40DD-AFC4-6F175D3DCCD1}">
+              <a14:hiddenFill xmlns:a14="http://schemas.microsoft.com/office/drawing/2010/main">
+                <a:solidFill>
+                  <a:schemeClr val="accent1"/>
+                </a:solidFill>
+              </a14:hiddenFill>
+            </a:ext>
+            <a:ext uri="{91240B29-F687-4F45-9708-019B960494DF}">
+              <a14:hiddenLine xmlns:a14="http://schemas.microsoft.com/office/drawing/2010/main" w="9525">
+                <a:solidFill>
+                  <a:schemeClr val="tx1"/>
+                </a:solidFill>
+                <a:miter lim="800000"/>
+                <a:headEnd/>
+                <a:tailEnd/>
+              </a14:hiddenLine>
+            </a:ext>
+            <a:ext uri="{AF507438-7753-43E0-B8FC-AC1667EBCBE1}">
+              <a14:hiddenEffects xmlns:a14="http://schemas.microsoft.com/office/drawing/2010/main">
+                <a:effectLst>
+                  <a:outerShdw dist="35921" dir="2700000" algn="ctr" rotWithShape="0">
+                    <a:schemeClr val="bg2"/>
+                  </a:outerShdw>
+                </a:effectLst>
+              </a14:hiddenEffects>
+            </a:ext>
+          </a:extLst>
+        </p:spPr>
+      </p:pic>
+      <p:sp>
+        <p:nvSpPr>
+          <p:cNvPr id="4" name="pole tekstowe 3"/>
+          <p:cNvSpPr txBox="1"/>
+          <p:nvPr/>
+        </p:nvSpPr>
+        <p:spPr>
+          <a:xfrm>
+            <a:off x="2195736" y="1957482"/>
+            <a:ext cx="981551" cy="369332"/>
+          </a:xfrm>
+          <a:prstGeom prst="rect">
+            <a:avLst/>
+          </a:prstGeom>
+          <a:noFill/>
+        </p:spPr>
+        <p:txBody>
+          <a:bodyPr wrap="none" rtlCol="0">
+            <a:spAutoFit/>
+          </a:bodyPr>
+          <a:lstStyle/>
+          <a:p>
+            <a:r>
+              <a:rPr lang="pl-PL" b="1" dirty="0" smtClean="0">
+                <a:solidFill>
+                  <a:srgbClr val="FF0000"/>
+                </a:solidFill>
+              </a:rPr>
+              <a:t>Agent: 0</a:t>
+            </a:r>
+            <a:endParaRPr lang="pl-PL" b="1" dirty="0">
+              <a:solidFill>
+                <a:srgbClr val="FF0000"/>
+              </a:solidFill>
+            </a:endParaRPr>
+          </a:p>
+        </p:txBody>
+      </p:sp>
+    </p:spTree>
+    <p:extLst>
+      <p:ext uri="{BB962C8B-B14F-4D97-AF65-F5344CB8AC3E}">
+        <p14:creationId xmlns:p14="http://schemas.microsoft.com/office/powerpoint/2010/main" val="1547074451"/>
+      </p:ext>
+    </p:extLst>
+  </p:cSld>
+  <p:clrMapOvr>
+    <a:masterClrMapping/>
+  </p:clrMapOvr>
+</p:sld>
+</file>
+
+<file path=ppt/slides/slide20.xml><?xml version="1.0" encoding="utf-8"?>
 <p:sld xmlns:a="http://schemas.openxmlformats.org/drawingml/2006/main" xmlns:r="http://schemas.openxmlformats.org/officeDocument/2006/relationships" xmlns:p="http://schemas.openxmlformats.org/presentationml/2006/main">
   <p:cSld>
     <p:spTree>
@@ -17231,139 +18069,7 @@
 </p:sld>
 </file>
 
-<file path=ppt/slides/slide2.xml><?xml version="1.0" encoding="utf-8"?>
-<p:sld xmlns:a="http://schemas.openxmlformats.org/drawingml/2006/main" xmlns:r="http://schemas.openxmlformats.org/officeDocument/2006/relationships" xmlns:p="http://schemas.openxmlformats.org/presentationml/2006/main">
-  <p:cSld>
-    <p:spTree>
-      <p:nvGrpSpPr>
-        <p:cNvPr id="1" name=""/>
-        <p:cNvGrpSpPr/>
-        <p:nvPr/>
-      </p:nvGrpSpPr>
-      <p:grpSpPr>
-        <a:xfrm>
-          <a:off x="0" y="0"/>
-          <a:ext cx="0" cy="0"/>
-          <a:chOff x="0" y="0"/>
-          <a:chExt cx="0" cy="0"/>
-        </a:xfrm>
-      </p:grpSpPr>
-      <p:pic>
-        <p:nvPicPr>
-          <p:cNvPr id="1026" name="Picture 2"/>
-          <p:cNvPicPr>
-            <a:picLocks noChangeAspect="1" noChangeArrowheads="1"/>
-          </p:cNvPicPr>
-          <p:nvPr/>
-        </p:nvPicPr>
-        <p:blipFill>
-          <a:blip r:embed="rId2">
-            <a:extLst>
-              <a:ext uri="{28A0092B-C50C-407E-A947-70E740481C1C}">
-                <a14:useLocalDpi xmlns:a14="http://schemas.microsoft.com/office/drawing/2010/main" val="0"/>
-              </a:ext>
-            </a:extLst>
-          </a:blip>
-          <a:srcRect/>
-          <a:stretch>
-            <a:fillRect/>
-          </a:stretch>
-        </p:blipFill>
-        <p:spPr bwMode="auto">
-          <a:xfrm>
-            <a:off x="1835696" y="1007371"/>
-            <a:ext cx="4641304" cy="4107554"/>
-          </a:xfrm>
-          <a:prstGeom prst="rect">
-            <a:avLst/>
-          </a:prstGeom>
-          <a:noFill/>
-          <a:ln>
-            <a:noFill/>
-          </a:ln>
-          <a:effectLst/>
-          <a:extLst>
-            <a:ext uri="{909E8E84-426E-40DD-AFC4-6F175D3DCCD1}">
-              <a14:hiddenFill xmlns:a14="http://schemas.microsoft.com/office/drawing/2010/main">
-                <a:solidFill>
-                  <a:schemeClr val="accent1"/>
-                </a:solidFill>
-              </a14:hiddenFill>
-            </a:ext>
-            <a:ext uri="{91240B29-F687-4F45-9708-019B960494DF}">
-              <a14:hiddenLine xmlns:a14="http://schemas.microsoft.com/office/drawing/2010/main" w="9525">
-                <a:solidFill>
-                  <a:schemeClr val="tx1"/>
-                </a:solidFill>
-                <a:miter lim="800000"/>
-                <a:headEnd/>
-                <a:tailEnd/>
-              </a14:hiddenLine>
-            </a:ext>
-            <a:ext uri="{AF507438-7753-43E0-B8FC-AC1667EBCBE1}">
-              <a14:hiddenEffects xmlns:a14="http://schemas.microsoft.com/office/drawing/2010/main">
-                <a:effectLst>
-                  <a:outerShdw dist="35921" dir="2700000" algn="ctr" rotWithShape="0">
-                    <a:schemeClr val="bg2"/>
-                  </a:outerShdw>
-                </a:effectLst>
-              </a14:hiddenEffects>
-            </a:ext>
-          </a:extLst>
-        </p:spPr>
-      </p:pic>
-      <p:sp>
-        <p:nvSpPr>
-          <p:cNvPr id="4" name="pole tekstowe 3"/>
-          <p:cNvSpPr txBox="1"/>
-          <p:nvPr/>
-        </p:nvSpPr>
-        <p:spPr>
-          <a:xfrm>
-            <a:off x="2195736" y="1957482"/>
-            <a:ext cx="981551" cy="369332"/>
-          </a:xfrm>
-          <a:prstGeom prst="rect">
-            <a:avLst/>
-          </a:prstGeom>
-          <a:noFill/>
-        </p:spPr>
-        <p:txBody>
-          <a:bodyPr wrap="none" rtlCol="0">
-            <a:spAutoFit/>
-          </a:bodyPr>
-          <a:lstStyle/>
-          <a:p>
-            <a:r>
-              <a:rPr lang="pl-PL" b="1" dirty="0" smtClean="0">
-                <a:solidFill>
-                  <a:srgbClr val="FF0000"/>
-                </a:solidFill>
-              </a:rPr>
-              <a:t>Agent: 0</a:t>
-            </a:r>
-            <a:endParaRPr lang="pl-PL" b="1" dirty="0">
-              <a:solidFill>
-                <a:srgbClr val="FF0000"/>
-              </a:solidFill>
-            </a:endParaRPr>
-          </a:p>
-        </p:txBody>
-      </p:sp>
-    </p:spTree>
-    <p:extLst>
-      <p:ext uri="{BB962C8B-B14F-4D97-AF65-F5344CB8AC3E}">
-        <p14:creationId xmlns:p14="http://schemas.microsoft.com/office/powerpoint/2010/main" val="1547074451"/>
-      </p:ext>
-    </p:extLst>
-  </p:cSld>
-  <p:clrMapOvr>
-    <a:masterClrMapping/>
-  </p:clrMapOvr>
-</p:sld>
-</file>
-
-<file path=ppt/slides/slide20.xml><?xml version="1.0" encoding="utf-8"?>
+<file path=ppt/slides/slide21.xml><?xml version="1.0" encoding="utf-8"?>
 <p:sld xmlns:a="http://schemas.openxmlformats.org/drawingml/2006/main" xmlns:r="http://schemas.openxmlformats.org/officeDocument/2006/relationships" xmlns:p="http://schemas.openxmlformats.org/presentationml/2006/main">
   <p:cSld>
     <p:spTree>
@@ -19575,7 +20281,7 @@
 </p:sld>
 </file>
 
-<file path=ppt/slides/slide21.xml><?xml version="1.0" encoding="utf-8"?>
+<file path=ppt/slides/slide22.xml><?xml version="1.0" encoding="utf-8"?>
 <p:sld xmlns:a="http://schemas.openxmlformats.org/drawingml/2006/main" xmlns:r="http://schemas.openxmlformats.org/officeDocument/2006/relationships" xmlns:p="http://schemas.openxmlformats.org/presentationml/2006/main">
   <p:cSld>
     <p:spTree>
@@ -21849,7 +22555,7 @@
 </p:sld>
 </file>
 
-<file path=ppt/slides/slide22.xml><?xml version="1.0" encoding="utf-8"?>
+<file path=ppt/slides/slide23.xml><?xml version="1.0" encoding="utf-8"?>
 <p:sld xmlns:a="http://schemas.openxmlformats.org/drawingml/2006/main" xmlns:r="http://schemas.openxmlformats.org/officeDocument/2006/relationships" xmlns:p="http://schemas.openxmlformats.org/presentationml/2006/main">
   <p:cSld>
     <p:spTree>
@@ -22135,7 +22841,7 @@
 </p:sld>
 </file>
 
-<file path=ppt/slides/slide23.xml><?xml version="1.0" encoding="utf-8"?>
+<file path=ppt/slides/slide24.xml><?xml version="1.0" encoding="utf-8"?>
 <p:sld xmlns:a="http://schemas.openxmlformats.org/drawingml/2006/main" xmlns:r="http://schemas.openxmlformats.org/officeDocument/2006/relationships" xmlns:p="http://schemas.openxmlformats.org/presentationml/2006/main">
   <p:cSld>
     <p:spTree>
@@ -23269,7 +23975,7 @@
 </p:sld>
 </file>
 
-<file path=ppt/slides/slide24.xml><?xml version="1.0" encoding="utf-8"?>
+<file path=ppt/slides/slide25.xml><?xml version="1.0" encoding="utf-8"?>
 <p:sld xmlns:a="http://schemas.openxmlformats.org/drawingml/2006/main" xmlns:r="http://schemas.openxmlformats.org/officeDocument/2006/relationships" xmlns:p="http://schemas.openxmlformats.org/presentationml/2006/main">
   <p:cSld>
     <p:spTree>
@@ -24403,7 +25109,7 @@
 </p:sld>
 </file>
 
-<file path=ppt/slides/slide25.xml><?xml version="1.0" encoding="utf-8"?>
+<file path=ppt/slides/slide26.xml><?xml version="1.0" encoding="utf-8"?>
 <p:sld xmlns:a="http://schemas.openxmlformats.org/drawingml/2006/main" xmlns:r="http://schemas.openxmlformats.org/officeDocument/2006/relationships" xmlns:p="http://schemas.openxmlformats.org/presentationml/2006/main">
   <p:cSld>
     <p:spTree>
@@ -25537,7 +26243,7 @@
 </p:sld>
 </file>
 
-<file path=ppt/slides/slide26.xml><?xml version="1.0" encoding="utf-8"?>
+<file path=ppt/slides/slide27.xml><?xml version="1.0" encoding="utf-8"?>
 <p:sld xmlns:a="http://schemas.openxmlformats.org/drawingml/2006/main" xmlns:r="http://schemas.openxmlformats.org/officeDocument/2006/relationships" xmlns:p="http://schemas.openxmlformats.org/presentationml/2006/main">
   <p:cSld>
     <p:spTree>
@@ -26671,7 +27377,7 @@
 </p:sld>
 </file>
 
-<file path=ppt/slides/slide27.xml><?xml version="1.0" encoding="utf-8"?>
+<file path=ppt/slides/slide28.xml><?xml version="1.0" encoding="utf-8"?>
 <p:sld xmlns:a="http://schemas.openxmlformats.org/drawingml/2006/main" xmlns:r="http://schemas.openxmlformats.org/officeDocument/2006/relationships" xmlns:p="http://schemas.openxmlformats.org/presentationml/2006/main">
   <p:cSld>
     <p:spTree>
@@ -27805,7 +28511,7 @@
 </p:sld>
 </file>
 
-<file path=ppt/slides/slide28.xml><?xml version="1.0" encoding="utf-8"?>
+<file path=ppt/slides/slide29.xml><?xml version="1.0" encoding="utf-8"?>
 <p:sld xmlns:a="http://schemas.openxmlformats.org/drawingml/2006/main" xmlns:r="http://schemas.openxmlformats.org/officeDocument/2006/relationships" xmlns:p="http://schemas.openxmlformats.org/presentationml/2006/main">
   <p:cSld>
     <p:spTree>
@@ -28939,7 +29645,139 @@
 </p:sld>
 </file>
 
-<file path=ppt/slides/slide29.xml><?xml version="1.0" encoding="utf-8"?>
+<file path=ppt/slides/slide3.xml><?xml version="1.0" encoding="utf-8"?>
+<p:sld xmlns:a="http://schemas.openxmlformats.org/drawingml/2006/main" xmlns:r="http://schemas.openxmlformats.org/officeDocument/2006/relationships" xmlns:p="http://schemas.openxmlformats.org/presentationml/2006/main">
+  <p:cSld>
+    <p:spTree>
+      <p:nvGrpSpPr>
+        <p:cNvPr id="1" name=""/>
+        <p:cNvGrpSpPr/>
+        <p:nvPr/>
+      </p:nvGrpSpPr>
+      <p:grpSpPr>
+        <a:xfrm>
+          <a:off x="0" y="0"/>
+          <a:ext cx="0" cy="0"/>
+          <a:chOff x="0" y="0"/>
+          <a:chExt cx="0" cy="0"/>
+        </a:xfrm>
+      </p:grpSpPr>
+      <p:pic>
+        <p:nvPicPr>
+          <p:cNvPr id="2050" name="Picture 2"/>
+          <p:cNvPicPr>
+            <a:picLocks noChangeAspect="1" noChangeArrowheads="1"/>
+          </p:cNvPicPr>
+          <p:nvPr/>
+        </p:nvPicPr>
+        <p:blipFill>
+          <a:blip r:embed="rId2">
+            <a:extLst>
+              <a:ext uri="{28A0092B-C50C-407E-A947-70E740481C1C}">
+                <a14:useLocalDpi xmlns:a14="http://schemas.microsoft.com/office/drawing/2010/main" val="0"/>
+              </a:ext>
+            </a:extLst>
+          </a:blip>
+          <a:srcRect/>
+          <a:stretch>
+            <a:fillRect/>
+          </a:stretch>
+        </p:blipFill>
+        <p:spPr bwMode="auto">
+          <a:xfrm>
+            <a:off x="2614613" y="1966913"/>
+            <a:ext cx="3914775" cy="2924175"/>
+          </a:xfrm>
+          <a:prstGeom prst="rect">
+            <a:avLst/>
+          </a:prstGeom>
+          <a:noFill/>
+          <a:ln>
+            <a:noFill/>
+          </a:ln>
+          <a:effectLst/>
+          <a:extLst>
+            <a:ext uri="{909E8E84-426E-40DD-AFC4-6F175D3DCCD1}">
+              <a14:hiddenFill xmlns:a14="http://schemas.microsoft.com/office/drawing/2010/main">
+                <a:solidFill>
+                  <a:schemeClr val="accent1"/>
+                </a:solidFill>
+              </a14:hiddenFill>
+            </a:ext>
+            <a:ext uri="{91240B29-F687-4F45-9708-019B960494DF}">
+              <a14:hiddenLine xmlns:a14="http://schemas.microsoft.com/office/drawing/2010/main" w="9525">
+                <a:solidFill>
+                  <a:schemeClr val="tx1"/>
+                </a:solidFill>
+                <a:miter lim="800000"/>
+                <a:headEnd/>
+                <a:tailEnd/>
+              </a14:hiddenLine>
+            </a:ext>
+            <a:ext uri="{AF507438-7753-43E0-B8FC-AC1667EBCBE1}">
+              <a14:hiddenEffects xmlns:a14="http://schemas.microsoft.com/office/drawing/2010/main">
+                <a:effectLst>
+                  <a:outerShdw dist="35921" dir="2700000" algn="ctr" rotWithShape="0">
+                    <a:schemeClr val="bg2"/>
+                  </a:outerShdw>
+                </a:effectLst>
+              </a14:hiddenEffects>
+            </a:ext>
+          </a:extLst>
+        </p:spPr>
+      </p:pic>
+      <p:sp>
+        <p:nvSpPr>
+          <p:cNvPr id="5" name="pole tekstowe 4"/>
+          <p:cNvSpPr txBox="1"/>
+          <p:nvPr/>
+        </p:nvSpPr>
+        <p:spPr>
+          <a:xfrm>
+            <a:off x="3173120" y="2420888"/>
+            <a:ext cx="981551" cy="369332"/>
+          </a:xfrm>
+          <a:prstGeom prst="rect">
+            <a:avLst/>
+          </a:prstGeom>
+          <a:noFill/>
+        </p:spPr>
+        <p:txBody>
+          <a:bodyPr wrap="none" rtlCol="0">
+            <a:spAutoFit/>
+          </a:bodyPr>
+          <a:lstStyle/>
+          <a:p>
+            <a:r>
+              <a:rPr lang="pl-PL" b="1" dirty="0" smtClean="0">
+                <a:solidFill>
+                  <a:srgbClr val="FF0000"/>
+                </a:solidFill>
+              </a:rPr>
+              <a:t>Agent: 0</a:t>
+            </a:r>
+            <a:endParaRPr lang="pl-PL" b="1" dirty="0">
+              <a:solidFill>
+                <a:srgbClr val="FF0000"/>
+              </a:solidFill>
+            </a:endParaRPr>
+          </a:p>
+        </p:txBody>
+      </p:sp>
+    </p:spTree>
+    <p:extLst>
+      <p:ext uri="{BB962C8B-B14F-4D97-AF65-F5344CB8AC3E}">
+        <p14:creationId xmlns:p14="http://schemas.microsoft.com/office/powerpoint/2010/main" val="4275086764"/>
+      </p:ext>
+    </p:extLst>
+  </p:cSld>
+  <p:clrMapOvr>
+    <a:masterClrMapping/>
+  </p:clrMapOvr>
+</p:sld>
+</file>
+
+<file path=ppt/slides/slide30.xml><?xml version="1.0" encoding="utf-8"?>
 <p:sld xmlns:a="http://schemas.openxmlformats.org/drawingml/2006/main" xmlns:r="http://schemas.openxmlformats.org/officeDocument/2006/relationships" xmlns:p="http://schemas.openxmlformats.org/presentationml/2006/main">
   <p:cSld>
     <p:spTree>
@@ -29713,139 +30551,7 @@
 </p:sld>
 </file>
 
-<file path=ppt/slides/slide3.xml><?xml version="1.0" encoding="utf-8"?>
-<p:sld xmlns:a="http://schemas.openxmlformats.org/drawingml/2006/main" xmlns:r="http://schemas.openxmlformats.org/officeDocument/2006/relationships" xmlns:p="http://schemas.openxmlformats.org/presentationml/2006/main">
-  <p:cSld>
-    <p:spTree>
-      <p:nvGrpSpPr>
-        <p:cNvPr id="1" name=""/>
-        <p:cNvGrpSpPr/>
-        <p:nvPr/>
-      </p:nvGrpSpPr>
-      <p:grpSpPr>
-        <a:xfrm>
-          <a:off x="0" y="0"/>
-          <a:ext cx="0" cy="0"/>
-          <a:chOff x="0" y="0"/>
-          <a:chExt cx="0" cy="0"/>
-        </a:xfrm>
-      </p:grpSpPr>
-      <p:pic>
-        <p:nvPicPr>
-          <p:cNvPr id="2050" name="Picture 2"/>
-          <p:cNvPicPr>
-            <a:picLocks noChangeAspect="1" noChangeArrowheads="1"/>
-          </p:cNvPicPr>
-          <p:nvPr/>
-        </p:nvPicPr>
-        <p:blipFill>
-          <a:blip r:embed="rId2">
-            <a:extLst>
-              <a:ext uri="{28A0092B-C50C-407E-A947-70E740481C1C}">
-                <a14:useLocalDpi xmlns:a14="http://schemas.microsoft.com/office/drawing/2010/main" val="0"/>
-              </a:ext>
-            </a:extLst>
-          </a:blip>
-          <a:srcRect/>
-          <a:stretch>
-            <a:fillRect/>
-          </a:stretch>
-        </p:blipFill>
-        <p:spPr bwMode="auto">
-          <a:xfrm>
-            <a:off x="2614613" y="1966913"/>
-            <a:ext cx="3914775" cy="2924175"/>
-          </a:xfrm>
-          <a:prstGeom prst="rect">
-            <a:avLst/>
-          </a:prstGeom>
-          <a:noFill/>
-          <a:ln>
-            <a:noFill/>
-          </a:ln>
-          <a:effectLst/>
-          <a:extLst>
-            <a:ext uri="{909E8E84-426E-40DD-AFC4-6F175D3DCCD1}">
-              <a14:hiddenFill xmlns:a14="http://schemas.microsoft.com/office/drawing/2010/main">
-                <a:solidFill>
-                  <a:schemeClr val="accent1"/>
-                </a:solidFill>
-              </a14:hiddenFill>
-            </a:ext>
-            <a:ext uri="{91240B29-F687-4F45-9708-019B960494DF}">
-              <a14:hiddenLine xmlns:a14="http://schemas.microsoft.com/office/drawing/2010/main" w="9525">
-                <a:solidFill>
-                  <a:schemeClr val="tx1"/>
-                </a:solidFill>
-                <a:miter lim="800000"/>
-                <a:headEnd/>
-                <a:tailEnd/>
-              </a14:hiddenLine>
-            </a:ext>
-            <a:ext uri="{AF507438-7753-43E0-B8FC-AC1667EBCBE1}">
-              <a14:hiddenEffects xmlns:a14="http://schemas.microsoft.com/office/drawing/2010/main">
-                <a:effectLst>
-                  <a:outerShdw dist="35921" dir="2700000" algn="ctr" rotWithShape="0">
-                    <a:schemeClr val="bg2"/>
-                  </a:outerShdw>
-                </a:effectLst>
-              </a14:hiddenEffects>
-            </a:ext>
-          </a:extLst>
-        </p:spPr>
-      </p:pic>
-      <p:sp>
-        <p:nvSpPr>
-          <p:cNvPr id="5" name="pole tekstowe 4"/>
-          <p:cNvSpPr txBox="1"/>
-          <p:nvPr/>
-        </p:nvSpPr>
-        <p:spPr>
-          <a:xfrm>
-            <a:off x="3173120" y="2420888"/>
-            <a:ext cx="981551" cy="369332"/>
-          </a:xfrm>
-          <a:prstGeom prst="rect">
-            <a:avLst/>
-          </a:prstGeom>
-          <a:noFill/>
-        </p:spPr>
-        <p:txBody>
-          <a:bodyPr wrap="none" rtlCol="0">
-            <a:spAutoFit/>
-          </a:bodyPr>
-          <a:lstStyle/>
-          <a:p>
-            <a:r>
-              <a:rPr lang="pl-PL" b="1" dirty="0" smtClean="0">
-                <a:solidFill>
-                  <a:srgbClr val="FF0000"/>
-                </a:solidFill>
-              </a:rPr>
-              <a:t>Agent: 0</a:t>
-            </a:r>
-            <a:endParaRPr lang="pl-PL" b="1" dirty="0">
-              <a:solidFill>
-                <a:srgbClr val="FF0000"/>
-              </a:solidFill>
-            </a:endParaRPr>
-          </a:p>
-        </p:txBody>
-      </p:sp>
-    </p:spTree>
-    <p:extLst>
-      <p:ext uri="{BB962C8B-B14F-4D97-AF65-F5344CB8AC3E}">
-        <p14:creationId xmlns:p14="http://schemas.microsoft.com/office/powerpoint/2010/main" val="4275086764"/>
-      </p:ext>
-    </p:extLst>
-  </p:cSld>
-  <p:clrMapOvr>
-    <a:masterClrMapping/>
-  </p:clrMapOvr>
-</p:sld>
-</file>
-
-<file path=ppt/slides/slide30.xml><?xml version="1.0" encoding="utf-8"?>
+<file path=ppt/slides/slide31.xml><?xml version="1.0" encoding="utf-8"?>
 <p:sld xmlns:a="http://schemas.openxmlformats.org/drawingml/2006/main" xmlns:r="http://schemas.openxmlformats.org/officeDocument/2006/relationships" xmlns:p="http://schemas.openxmlformats.org/presentationml/2006/main">
   <p:cSld>
     <p:spTree>
@@ -30619,7 +31325,7 @@
 </p:sld>
 </file>
 
-<file path=ppt/slides/slide31.xml><?xml version="1.0" encoding="utf-8"?>
+<file path=ppt/slides/slide32.xml><?xml version="1.0" encoding="utf-8"?>
 <p:sld xmlns:a="http://schemas.openxmlformats.org/drawingml/2006/main" xmlns:r="http://schemas.openxmlformats.org/officeDocument/2006/relationships" xmlns:p="http://schemas.openxmlformats.org/presentationml/2006/main">
   <p:cSld>
     <p:spTree>
@@ -31393,7 +32099,7 @@
 </p:sld>
 </file>
 
-<file path=ppt/slides/slide32.xml><?xml version="1.0" encoding="utf-8"?>
+<file path=ppt/slides/slide33.xml><?xml version="1.0" encoding="utf-8"?>
 <p:sld xmlns:a="http://schemas.openxmlformats.org/drawingml/2006/main" xmlns:r="http://schemas.openxmlformats.org/officeDocument/2006/relationships" xmlns:p="http://schemas.openxmlformats.org/presentationml/2006/main">
   <p:cSld>
     <p:spTree>
@@ -31487,7 +32193,7 @@
 </p:sld>
 </file>
 
-<file path=ppt/slides/slide33.xml><?xml version="1.0" encoding="utf-8"?>
+<file path=ppt/slides/slide34.xml><?xml version="1.0" encoding="utf-8"?>
 <p:sld xmlns:a="http://schemas.openxmlformats.org/drawingml/2006/main" xmlns:r="http://schemas.openxmlformats.org/officeDocument/2006/relationships" xmlns:p="http://schemas.openxmlformats.org/presentationml/2006/main">
   <p:cSld>
     <p:spTree>
@@ -33483,7 +34189,7 @@
 </p:sld>
 </file>
 
-<file path=ppt/slides/slide34.xml><?xml version="1.0" encoding="utf-8"?>
+<file path=ppt/slides/slide35.xml><?xml version="1.0" encoding="utf-8"?>
 <p:sld xmlns:a="http://schemas.openxmlformats.org/drawingml/2006/main" xmlns:r="http://schemas.openxmlformats.org/officeDocument/2006/relationships" xmlns:p="http://schemas.openxmlformats.org/presentationml/2006/main">
   <p:cSld>
     <p:spTree>
@@ -35318,7 +36024,7 @@
 </p:sld>
 </file>
 
-<file path=ppt/slides/slide35.xml><?xml version="1.0" encoding="utf-8"?>
+<file path=ppt/slides/slide36.xml><?xml version="1.0" encoding="utf-8"?>
 <p:sld xmlns:a="http://schemas.openxmlformats.org/drawingml/2006/main" xmlns:r="http://schemas.openxmlformats.org/officeDocument/2006/relationships" xmlns:p="http://schemas.openxmlformats.org/presentationml/2006/main">
   <p:cSld>
     <p:spTree>

</xml_diff>

<commit_message>
podrobiona praca wprowadzony env_14 + na froncie jest
</commit_message>
<xml_diff>
--- a/obrazy.pptx
+++ b/obrazy.pptx
@@ -5,7 +5,7 @@
     <p:sldMasterId id="2147483648" r:id="rId1"/>
   </p:sldMasterIdLst>
   <p:notesMasterIdLst>
-    <p:notesMasterId r:id="rId39"/>
+    <p:notesMasterId r:id="rId44"/>
   </p:notesMasterIdLst>
   <p:sldIdLst>
     <p:sldId id="286" r:id="rId2"/>
@@ -45,6 +45,11 @@
     <p:sldId id="283" r:id="rId36"/>
     <p:sldId id="284" r:id="rId37"/>
     <p:sldId id="285" r:id="rId38"/>
+    <p:sldId id="298" r:id="rId39"/>
+    <p:sldId id="297" r:id="rId40"/>
+    <p:sldId id="299" r:id="rId41"/>
+    <p:sldId id="300" r:id="rId42"/>
+    <p:sldId id="301" r:id="rId43"/>
   </p:sldIdLst>
   <p:sldSz cx="9144000" cy="6858000" type="screen4x3"/>
   <p:notesSz cx="6858000" cy="9144000"/>
@@ -145,7 +150,7 @@
   </p:defaultTextStyle>
   <p:extLst>
     <p:ext uri="{EFAFB233-063F-42B5-8137-9DF3F51BA10A}">
-      <p15:sldGuideLst xmlns:p15="http://schemas.microsoft.com/office/powerpoint/2012/main" xmlns="">
+      <p15:sldGuideLst xmlns="" xmlns:p15="http://schemas.microsoft.com/office/powerpoint/2012/main">
         <p15:guide id="1" orient="horz" pos="2160">
           <p15:clr>
             <a:srgbClr val="A4A3A4"/>
@@ -244,7 +249,7 @@
           <a:p>
             <a:fld id="{826F3446-B3C4-4F0B-B165-9A7A4323BEDE}" type="datetimeFigureOut">
               <a:rPr lang="pl-PL" smtClean="0"/>
-              <a:t>06.07.2019</a:t>
+              <a:t>17.07.2019</a:t>
             </a:fld>
             <a:endParaRPr lang="pl-PL"/>
           </a:p>
@@ -596,6 +601,90 @@
 </p:notes>
 </file>
 
+<file path=ppt/notesSlides/notesSlide2.xml><?xml version="1.0" encoding="utf-8"?>
+<p:notes xmlns:a="http://schemas.openxmlformats.org/drawingml/2006/main" xmlns:r="http://schemas.openxmlformats.org/officeDocument/2006/relationships" xmlns:p="http://schemas.openxmlformats.org/presentationml/2006/main">
+  <p:cSld>
+    <p:spTree>
+      <p:nvGrpSpPr>
+        <p:cNvPr id="1" name=""/>
+        <p:cNvGrpSpPr/>
+        <p:nvPr/>
+      </p:nvGrpSpPr>
+      <p:grpSpPr>
+        <a:xfrm>
+          <a:off x="0" y="0"/>
+          <a:ext cx="0" cy="0"/>
+          <a:chOff x="0" y="0"/>
+          <a:chExt cx="0" cy="0"/>
+        </a:xfrm>
+      </p:grpSpPr>
+      <p:sp>
+        <p:nvSpPr>
+          <p:cNvPr id="2" name="Symbol zastępczy obrazu slajdu 1"/>
+          <p:cNvSpPr>
+            <a:spLocks noGrp="1" noRot="1" noChangeAspect="1"/>
+          </p:cNvSpPr>
+          <p:nvPr>
+            <p:ph type="sldImg"/>
+          </p:nvPr>
+        </p:nvSpPr>
+        <p:spPr/>
+      </p:sp>
+      <p:sp>
+        <p:nvSpPr>
+          <p:cNvPr id="3" name="Symbol zastępczy notatek 2"/>
+          <p:cNvSpPr>
+            <a:spLocks noGrp="1"/>
+          </p:cNvSpPr>
+          <p:nvPr>
+            <p:ph type="body" idx="1"/>
+          </p:nvPr>
+        </p:nvSpPr>
+        <p:spPr/>
+        <p:txBody>
+          <a:bodyPr/>
+          <a:lstStyle/>
+          <a:p>
+            <a:endParaRPr lang="pl-PL" dirty="0"/>
+          </a:p>
+        </p:txBody>
+      </p:sp>
+      <p:sp>
+        <p:nvSpPr>
+          <p:cNvPr id="4" name="Symbol zastępczy numeru slajdu 3"/>
+          <p:cNvSpPr>
+            <a:spLocks noGrp="1"/>
+          </p:cNvSpPr>
+          <p:nvPr>
+            <p:ph type="sldNum" sz="quarter" idx="10"/>
+          </p:nvPr>
+        </p:nvSpPr>
+        <p:spPr/>
+        <p:txBody>
+          <a:bodyPr/>
+          <a:lstStyle/>
+          <a:p>
+            <a:fld id="{28EA90D6-C195-4C49-B551-7E3FBAF9D1C2}" type="slidenum">
+              <a:rPr lang="pl-PL" smtClean="0"/>
+              <a:t>42</a:t>
+            </a:fld>
+            <a:endParaRPr lang="pl-PL"/>
+          </a:p>
+        </p:txBody>
+      </p:sp>
+    </p:spTree>
+    <p:extLst>
+      <p:ext uri="{BB962C8B-B14F-4D97-AF65-F5344CB8AC3E}">
+        <p14:creationId xmlns:p14="http://schemas.microsoft.com/office/powerpoint/2010/main" val="1223486202"/>
+      </p:ext>
+    </p:extLst>
+  </p:cSld>
+  <p:clrMapOvr>
+    <a:masterClrMapping/>
+  </p:clrMapOvr>
+</p:notes>
+</file>
+
 <file path=ppt/slideLayouts/slideLayout1.xml><?xml version="1.0" encoding="utf-8"?>
 <p:sldLayout xmlns:a="http://schemas.openxmlformats.org/drawingml/2006/main" xmlns:r="http://schemas.openxmlformats.org/officeDocument/2006/relationships" xmlns:p="http://schemas.openxmlformats.org/presentationml/2006/main" type="title" preserve="1">
   <p:cSld name="Title Slide">
@@ -777,7 +866,7 @@
           <a:p>
             <a:fld id="{B52AA6F2-AEE1-4FE6-B3E2-3509488F5D07}" type="datetimeFigureOut">
               <a:rPr lang="pl-PL" smtClean="0"/>
-              <a:t>06.07.2019</a:t>
+              <a:t>17.07.2019</a:t>
             </a:fld>
             <a:endParaRPr lang="pl-PL"/>
           </a:p>
@@ -947,7 +1036,7 @@
           <a:p>
             <a:fld id="{B52AA6F2-AEE1-4FE6-B3E2-3509488F5D07}" type="datetimeFigureOut">
               <a:rPr lang="pl-PL" smtClean="0"/>
-              <a:t>06.07.2019</a:t>
+              <a:t>17.07.2019</a:t>
             </a:fld>
             <a:endParaRPr lang="pl-PL"/>
           </a:p>
@@ -1127,7 +1216,7 @@
           <a:p>
             <a:fld id="{B52AA6F2-AEE1-4FE6-B3E2-3509488F5D07}" type="datetimeFigureOut">
               <a:rPr lang="pl-PL" smtClean="0"/>
-              <a:t>06.07.2019</a:t>
+              <a:t>17.07.2019</a:t>
             </a:fld>
             <a:endParaRPr lang="pl-PL"/>
           </a:p>
@@ -1297,7 +1386,7 @@
           <a:p>
             <a:fld id="{B52AA6F2-AEE1-4FE6-B3E2-3509488F5D07}" type="datetimeFigureOut">
               <a:rPr lang="pl-PL" smtClean="0"/>
-              <a:t>06.07.2019</a:t>
+              <a:t>17.07.2019</a:t>
             </a:fld>
             <a:endParaRPr lang="pl-PL"/>
           </a:p>
@@ -1543,7 +1632,7 @@
           <a:p>
             <a:fld id="{B52AA6F2-AEE1-4FE6-B3E2-3509488F5D07}" type="datetimeFigureOut">
               <a:rPr lang="pl-PL" smtClean="0"/>
-              <a:t>06.07.2019</a:t>
+              <a:t>17.07.2019</a:t>
             </a:fld>
             <a:endParaRPr lang="pl-PL"/>
           </a:p>
@@ -1831,7 +1920,7 @@
           <a:p>
             <a:fld id="{B52AA6F2-AEE1-4FE6-B3E2-3509488F5D07}" type="datetimeFigureOut">
               <a:rPr lang="pl-PL" smtClean="0"/>
-              <a:t>06.07.2019</a:t>
+              <a:t>17.07.2019</a:t>
             </a:fld>
             <a:endParaRPr lang="pl-PL"/>
           </a:p>
@@ -2253,7 +2342,7 @@
           <a:p>
             <a:fld id="{B52AA6F2-AEE1-4FE6-B3E2-3509488F5D07}" type="datetimeFigureOut">
               <a:rPr lang="pl-PL" smtClean="0"/>
-              <a:t>06.07.2019</a:t>
+              <a:t>17.07.2019</a:t>
             </a:fld>
             <a:endParaRPr lang="pl-PL"/>
           </a:p>
@@ -2371,7 +2460,7 @@
           <a:p>
             <a:fld id="{B52AA6F2-AEE1-4FE6-B3E2-3509488F5D07}" type="datetimeFigureOut">
               <a:rPr lang="pl-PL" smtClean="0"/>
-              <a:t>06.07.2019</a:t>
+              <a:t>17.07.2019</a:t>
             </a:fld>
             <a:endParaRPr lang="pl-PL"/>
           </a:p>
@@ -2466,7 +2555,7 @@
           <a:p>
             <a:fld id="{B52AA6F2-AEE1-4FE6-B3E2-3509488F5D07}" type="datetimeFigureOut">
               <a:rPr lang="pl-PL" smtClean="0"/>
-              <a:t>06.07.2019</a:t>
+              <a:t>17.07.2019</a:t>
             </a:fld>
             <a:endParaRPr lang="pl-PL"/>
           </a:p>
@@ -2743,7 +2832,7 @@
           <a:p>
             <a:fld id="{B52AA6F2-AEE1-4FE6-B3E2-3509488F5D07}" type="datetimeFigureOut">
               <a:rPr lang="pl-PL" smtClean="0"/>
-              <a:t>06.07.2019</a:t>
+              <a:t>17.07.2019</a:t>
             </a:fld>
             <a:endParaRPr lang="pl-PL"/>
           </a:p>
@@ -2996,7 +3085,7 @@
           <a:p>
             <a:fld id="{B52AA6F2-AEE1-4FE6-B3E2-3509488F5D07}" type="datetimeFigureOut">
               <a:rPr lang="pl-PL" smtClean="0"/>
-              <a:t>06.07.2019</a:t>
+              <a:t>17.07.2019</a:t>
             </a:fld>
             <a:endParaRPr lang="pl-PL"/>
           </a:p>
@@ -3209,7 +3298,7 @@
           <a:p>
             <a:fld id="{B52AA6F2-AEE1-4FE6-B3E2-3509488F5D07}" type="datetimeFigureOut">
               <a:rPr lang="pl-PL" smtClean="0"/>
-              <a:t>06.07.2019</a:t>
+              <a:t>17.07.2019</a:t>
             </a:fld>
             <a:endParaRPr lang="pl-PL"/>
           </a:p>
@@ -38809,6 +38898,419 @@
 </p:sld>
 </file>
 
+<file path=ppt/slides/slide38.xml><?xml version="1.0" encoding="utf-8"?>
+<p:sld xmlns:a="http://schemas.openxmlformats.org/drawingml/2006/main" xmlns:r="http://schemas.openxmlformats.org/officeDocument/2006/relationships" xmlns:p="http://schemas.openxmlformats.org/presentationml/2006/main">
+  <p:cSld>
+    <p:spTree>
+      <p:nvGrpSpPr>
+        <p:cNvPr id="1" name=""/>
+        <p:cNvGrpSpPr/>
+        <p:nvPr/>
+      </p:nvGrpSpPr>
+      <p:grpSpPr>
+        <a:xfrm>
+          <a:off x="0" y="0"/>
+          <a:ext cx="0" cy="0"/>
+          <a:chOff x="0" y="0"/>
+          <a:chExt cx="0" cy="0"/>
+        </a:xfrm>
+      </p:grpSpPr>
+      <p:sp>
+        <p:nvSpPr>
+          <p:cNvPr id="3" name="Symbol zastępczy zawartości 2"/>
+          <p:cNvSpPr>
+            <a:spLocks noGrp="1"/>
+          </p:cNvSpPr>
+          <p:nvPr>
+            <p:ph idx="1"/>
+          </p:nvPr>
+        </p:nvSpPr>
+        <p:spPr/>
+        <p:txBody>
+          <a:bodyPr/>
+          <a:lstStyle/>
+          <a:p>
+            <a:endParaRPr lang="pl-PL" dirty="0"/>
+          </a:p>
+        </p:txBody>
+      </p:sp>
+      <p:sp>
+        <p:nvSpPr>
+          <p:cNvPr id="4" name="Podtytuł 2"/>
+          <p:cNvSpPr txBox="1">
+            <a:spLocks/>
+          </p:cNvSpPr>
+          <p:nvPr/>
+        </p:nvSpPr>
+        <p:spPr>
+          <a:xfrm>
+            <a:off x="1371600" y="3886200"/>
+            <a:ext cx="6400800" cy="1752600"/>
+          </a:xfrm>
+          <a:prstGeom prst="rect">
+            <a:avLst/>
+          </a:prstGeom>
+        </p:spPr>
+        <p:txBody>
+          <a:bodyPr vert="horz" lIns="91440" tIns="45720" rIns="91440" bIns="45720" rtlCol="0">
+            <a:normAutofit fontScale="77500" lnSpcReduction="20000"/>
+          </a:bodyPr>
+          <a:lstStyle>
+            <a:lvl1pPr marL="342900" indent="-342900" algn="l" defTabSz="914400" rtl="0" eaLnBrk="1" latinLnBrk="0" hangingPunct="1">
+              <a:spcBef>
+                <a:spcPct val="20000"/>
+              </a:spcBef>
+              <a:buFont typeface="Arial" pitchFamily="34" charset="0"/>
+              <a:buChar char="•"/>
+              <a:defRPr sz="3200" kern="1200">
+                <a:solidFill>
+                  <a:schemeClr val="tx1"/>
+                </a:solidFill>
+                <a:latin typeface="+mn-lt"/>
+                <a:ea typeface="+mn-ea"/>
+                <a:cs typeface="+mn-cs"/>
+              </a:defRPr>
+            </a:lvl1pPr>
+            <a:lvl2pPr marL="742950" indent="-285750" algn="l" defTabSz="914400" rtl="0" eaLnBrk="1" latinLnBrk="0" hangingPunct="1">
+              <a:spcBef>
+                <a:spcPct val="20000"/>
+              </a:spcBef>
+              <a:buFont typeface="Arial" pitchFamily="34" charset="0"/>
+              <a:buChar char="–"/>
+              <a:defRPr sz="2800" kern="1200">
+                <a:solidFill>
+                  <a:schemeClr val="tx1"/>
+                </a:solidFill>
+                <a:latin typeface="+mn-lt"/>
+                <a:ea typeface="+mn-ea"/>
+                <a:cs typeface="+mn-cs"/>
+              </a:defRPr>
+            </a:lvl2pPr>
+            <a:lvl3pPr marL="1143000" indent="-228600" algn="l" defTabSz="914400" rtl="0" eaLnBrk="1" latinLnBrk="0" hangingPunct="1">
+              <a:spcBef>
+                <a:spcPct val="20000"/>
+              </a:spcBef>
+              <a:buFont typeface="Arial" pitchFamily="34" charset="0"/>
+              <a:buChar char="•"/>
+              <a:defRPr sz="2400" kern="1200">
+                <a:solidFill>
+                  <a:schemeClr val="tx1"/>
+                </a:solidFill>
+                <a:latin typeface="+mn-lt"/>
+                <a:ea typeface="+mn-ea"/>
+                <a:cs typeface="+mn-cs"/>
+              </a:defRPr>
+            </a:lvl3pPr>
+            <a:lvl4pPr marL="1600200" indent="-228600" algn="l" defTabSz="914400" rtl="0" eaLnBrk="1" latinLnBrk="0" hangingPunct="1">
+              <a:spcBef>
+                <a:spcPct val="20000"/>
+              </a:spcBef>
+              <a:buFont typeface="Arial" pitchFamily="34" charset="0"/>
+              <a:buChar char="–"/>
+              <a:defRPr sz="2000" kern="1200">
+                <a:solidFill>
+                  <a:schemeClr val="tx1"/>
+                </a:solidFill>
+                <a:latin typeface="+mn-lt"/>
+                <a:ea typeface="+mn-ea"/>
+                <a:cs typeface="+mn-cs"/>
+              </a:defRPr>
+            </a:lvl4pPr>
+            <a:lvl5pPr marL="2057400" indent="-228600" algn="l" defTabSz="914400" rtl="0" eaLnBrk="1" latinLnBrk="0" hangingPunct="1">
+              <a:spcBef>
+                <a:spcPct val="20000"/>
+              </a:spcBef>
+              <a:buFont typeface="Arial" pitchFamily="34" charset="0"/>
+              <a:buChar char="»"/>
+              <a:defRPr sz="2000" kern="1200">
+                <a:solidFill>
+                  <a:schemeClr val="tx1"/>
+                </a:solidFill>
+                <a:latin typeface="+mn-lt"/>
+                <a:ea typeface="+mn-ea"/>
+                <a:cs typeface="+mn-cs"/>
+              </a:defRPr>
+            </a:lvl5pPr>
+            <a:lvl6pPr marL="2514600" indent="-228600" algn="l" defTabSz="914400" rtl="0" eaLnBrk="1" latinLnBrk="0" hangingPunct="1">
+              <a:spcBef>
+                <a:spcPct val="20000"/>
+              </a:spcBef>
+              <a:buFont typeface="Arial" pitchFamily="34" charset="0"/>
+              <a:buChar char="•"/>
+              <a:defRPr sz="2000" kern="1200">
+                <a:solidFill>
+                  <a:schemeClr val="tx1"/>
+                </a:solidFill>
+                <a:latin typeface="+mn-lt"/>
+                <a:ea typeface="+mn-ea"/>
+                <a:cs typeface="+mn-cs"/>
+              </a:defRPr>
+            </a:lvl6pPr>
+            <a:lvl7pPr marL="2971800" indent="-228600" algn="l" defTabSz="914400" rtl="0" eaLnBrk="1" latinLnBrk="0" hangingPunct="1">
+              <a:spcBef>
+                <a:spcPct val="20000"/>
+              </a:spcBef>
+              <a:buFont typeface="Arial" pitchFamily="34" charset="0"/>
+              <a:buChar char="•"/>
+              <a:defRPr sz="2000" kern="1200">
+                <a:solidFill>
+                  <a:schemeClr val="tx1"/>
+                </a:solidFill>
+                <a:latin typeface="+mn-lt"/>
+                <a:ea typeface="+mn-ea"/>
+                <a:cs typeface="+mn-cs"/>
+              </a:defRPr>
+            </a:lvl7pPr>
+            <a:lvl8pPr marL="3429000" indent="-228600" algn="l" defTabSz="914400" rtl="0" eaLnBrk="1" latinLnBrk="0" hangingPunct="1">
+              <a:spcBef>
+                <a:spcPct val="20000"/>
+              </a:spcBef>
+              <a:buFont typeface="Arial" pitchFamily="34" charset="0"/>
+              <a:buChar char="•"/>
+              <a:defRPr sz="2000" kern="1200">
+                <a:solidFill>
+                  <a:schemeClr val="tx1"/>
+                </a:solidFill>
+                <a:latin typeface="+mn-lt"/>
+                <a:ea typeface="+mn-ea"/>
+                <a:cs typeface="+mn-cs"/>
+              </a:defRPr>
+            </a:lvl8pPr>
+            <a:lvl9pPr marL="3886200" indent="-228600" algn="l" defTabSz="914400" rtl="0" eaLnBrk="1" latinLnBrk="0" hangingPunct="1">
+              <a:spcBef>
+                <a:spcPct val="20000"/>
+              </a:spcBef>
+              <a:buFont typeface="Arial" pitchFamily="34" charset="0"/>
+              <a:buChar char="•"/>
+              <a:defRPr sz="2000" kern="1200">
+                <a:solidFill>
+                  <a:schemeClr val="tx1"/>
+                </a:solidFill>
+                <a:latin typeface="+mn-lt"/>
+                <a:ea typeface="+mn-ea"/>
+                <a:cs typeface="+mn-cs"/>
+              </a:defRPr>
+            </a:lvl9pPr>
+          </a:lstStyle>
+          <a:p>
+            <a:r>
+              <a:rPr lang="pl-PL" smtClean="0"/>
+              <a:t>from tensorflow.python.keras.models import load_model</a:t>
+            </a:r>
+          </a:p>
+          <a:p>
+            <a:r>
+              <a:rPr lang="pl-PL" smtClean="0"/>
+              <a:t>load_model('static_files/model-agent0.h5').weights</a:t>
+            </a:r>
+            <a:br>
+              <a:rPr lang="pl-PL" smtClean="0"/>
+            </a:br>
+            <a:endParaRPr lang="pl-PL" dirty="0"/>
+          </a:p>
+        </p:txBody>
+      </p:sp>
+      <p:pic>
+        <p:nvPicPr>
+          <p:cNvPr id="5" name="Picture 2"/>
+          <p:cNvPicPr>
+            <a:picLocks noChangeAspect="1" noChangeArrowheads="1"/>
+          </p:cNvPicPr>
+          <p:nvPr/>
+        </p:nvPicPr>
+        <p:blipFill>
+          <a:blip r:embed="rId2">
+            <a:extLst>
+              <a:ext uri="{28A0092B-C50C-407E-A947-70E740481C1C}">
+                <a14:useLocalDpi xmlns:a14="http://schemas.microsoft.com/office/drawing/2010/main" val="0"/>
+              </a:ext>
+            </a:extLst>
+          </a:blip>
+          <a:srcRect/>
+          <a:stretch>
+            <a:fillRect/>
+          </a:stretch>
+        </p:blipFill>
+        <p:spPr bwMode="auto">
+          <a:xfrm>
+            <a:off x="-212179" y="260648"/>
+            <a:ext cx="9168547" cy="3240360"/>
+          </a:xfrm>
+          <a:prstGeom prst="rect">
+            <a:avLst/>
+          </a:prstGeom>
+          <a:noFill/>
+          <a:ln>
+            <a:noFill/>
+          </a:ln>
+          <a:effectLst/>
+          <a:extLst>
+            <a:ext uri="{909E8E84-426E-40DD-AFC4-6F175D3DCCD1}">
+              <a14:hiddenFill xmlns:a14="http://schemas.microsoft.com/office/drawing/2010/main">
+                <a:solidFill>
+                  <a:schemeClr val="accent1"/>
+                </a:solidFill>
+              </a14:hiddenFill>
+            </a:ext>
+            <a:ext uri="{91240B29-F687-4F45-9708-019B960494DF}">
+              <a14:hiddenLine xmlns:a14="http://schemas.microsoft.com/office/drawing/2010/main" w="9525">
+                <a:solidFill>
+                  <a:schemeClr val="tx1"/>
+                </a:solidFill>
+                <a:miter lim="800000"/>
+                <a:headEnd/>
+                <a:tailEnd/>
+              </a14:hiddenLine>
+            </a:ext>
+            <a:ext uri="{AF507438-7753-43E0-B8FC-AC1667EBCBE1}">
+              <a14:hiddenEffects xmlns:a14="http://schemas.microsoft.com/office/drawing/2010/main">
+                <a:effectLst>
+                  <a:outerShdw dist="35921" dir="2700000" algn="ctr" rotWithShape="0">
+                    <a:schemeClr val="bg2"/>
+                  </a:outerShdw>
+                </a:effectLst>
+              </a14:hiddenEffects>
+            </a:ext>
+          </a:extLst>
+        </p:spPr>
+      </p:pic>
+    </p:spTree>
+    <p:extLst>
+      <p:ext uri="{BB962C8B-B14F-4D97-AF65-F5344CB8AC3E}">
+        <p14:creationId xmlns:p14="http://schemas.microsoft.com/office/powerpoint/2010/main" val="1714579862"/>
+      </p:ext>
+    </p:extLst>
+  </p:cSld>
+  <p:clrMapOvr>
+    <a:masterClrMapping/>
+  </p:clrMapOvr>
+</p:sld>
+</file>
+
+<file path=ppt/slides/slide39.xml><?xml version="1.0" encoding="utf-8"?>
+<p:sld xmlns:a="http://schemas.openxmlformats.org/drawingml/2006/main" xmlns:r="http://schemas.openxmlformats.org/officeDocument/2006/relationships" xmlns:p="http://schemas.openxmlformats.org/presentationml/2006/main">
+  <p:cSld>
+    <p:spTree>
+      <p:nvGrpSpPr>
+        <p:cNvPr id="1" name=""/>
+        <p:cNvGrpSpPr/>
+        <p:nvPr/>
+      </p:nvGrpSpPr>
+      <p:grpSpPr>
+        <a:xfrm>
+          <a:off x="0" y="0"/>
+          <a:ext cx="0" cy="0"/>
+          <a:chOff x="0" y="0"/>
+          <a:chExt cx="0" cy="0"/>
+        </a:xfrm>
+      </p:grpSpPr>
+      <p:sp>
+        <p:nvSpPr>
+          <p:cNvPr id="4" name="pole tekstowe 3"/>
+          <p:cNvSpPr txBox="1"/>
+          <p:nvPr/>
+        </p:nvSpPr>
+        <p:spPr>
+          <a:xfrm>
+            <a:off x="323528" y="260648"/>
+            <a:ext cx="705642" cy="369332"/>
+          </a:xfrm>
+          <a:prstGeom prst="rect">
+            <a:avLst/>
+          </a:prstGeom>
+          <a:noFill/>
+        </p:spPr>
+        <p:txBody>
+          <a:bodyPr wrap="none" rtlCol="0">
+            <a:spAutoFit/>
+          </a:bodyPr>
+          <a:lstStyle/>
+          <a:p>
+            <a:r>
+              <a:rPr lang="pl-PL" dirty="0" smtClean="0"/>
+              <a:t>En 14</a:t>
+            </a:r>
+            <a:endParaRPr lang="pl-PL" dirty="0"/>
+          </a:p>
+        </p:txBody>
+      </p:sp>
+      <p:pic>
+        <p:nvPicPr>
+          <p:cNvPr id="1026" name="Picture 2"/>
+          <p:cNvPicPr>
+            <a:picLocks noChangeAspect="1" noChangeArrowheads="1"/>
+          </p:cNvPicPr>
+          <p:nvPr/>
+        </p:nvPicPr>
+        <p:blipFill>
+          <a:blip r:embed="rId2">
+            <a:extLst>
+              <a:ext uri="{28A0092B-C50C-407E-A947-70E740481C1C}">
+                <a14:useLocalDpi xmlns:a14="http://schemas.microsoft.com/office/drawing/2010/main" val="0"/>
+              </a:ext>
+            </a:extLst>
+          </a:blip>
+          <a:srcRect/>
+          <a:stretch>
+            <a:fillRect/>
+          </a:stretch>
+        </p:blipFill>
+        <p:spPr bwMode="auto">
+          <a:xfrm>
+            <a:off x="2347913" y="2386013"/>
+            <a:ext cx="4448175" cy="2085975"/>
+          </a:xfrm>
+          <a:prstGeom prst="rect">
+            <a:avLst/>
+          </a:prstGeom>
+          <a:noFill/>
+          <a:ln>
+            <a:noFill/>
+          </a:ln>
+          <a:effectLst/>
+          <a:extLst>
+            <a:ext uri="{909E8E84-426E-40DD-AFC4-6F175D3DCCD1}">
+              <a14:hiddenFill xmlns:a14="http://schemas.microsoft.com/office/drawing/2010/main">
+                <a:solidFill>
+                  <a:schemeClr val="accent1"/>
+                </a:solidFill>
+              </a14:hiddenFill>
+            </a:ext>
+            <a:ext uri="{91240B29-F687-4F45-9708-019B960494DF}">
+              <a14:hiddenLine xmlns:a14="http://schemas.microsoft.com/office/drawing/2010/main" w="9525">
+                <a:solidFill>
+                  <a:schemeClr val="tx1"/>
+                </a:solidFill>
+                <a:miter lim="800000"/>
+                <a:headEnd/>
+                <a:tailEnd/>
+              </a14:hiddenLine>
+            </a:ext>
+            <a:ext uri="{AF507438-7753-43E0-B8FC-AC1667EBCBE1}">
+              <a14:hiddenEffects xmlns:a14="http://schemas.microsoft.com/office/drawing/2010/main">
+                <a:effectLst>
+                  <a:outerShdw dist="35921" dir="2700000" algn="ctr" rotWithShape="0">
+                    <a:schemeClr val="bg2"/>
+                  </a:outerShdw>
+                </a:effectLst>
+              </a14:hiddenEffects>
+            </a:ext>
+          </a:extLst>
+        </p:spPr>
+      </p:pic>
+    </p:spTree>
+    <p:extLst>
+      <p:ext uri="{BB962C8B-B14F-4D97-AF65-F5344CB8AC3E}">
+        <p14:creationId xmlns:p14="http://schemas.microsoft.com/office/powerpoint/2010/main" val="1413487145"/>
+      </p:ext>
+    </p:extLst>
+  </p:cSld>
+  <p:clrMapOvr>
+    <a:masterClrMapping/>
+  </p:clrMapOvr>
+</p:sld>
+</file>
+
 <file path=ppt/slides/slide4.xml><?xml version="1.0" encoding="utf-8"?>
 <p:sld xmlns:a="http://schemas.openxmlformats.org/drawingml/2006/main" xmlns:r="http://schemas.openxmlformats.org/officeDocument/2006/relationships" xmlns:p="http://schemas.openxmlformats.org/presentationml/2006/main">
   <p:cSld>
@@ -39610,6 +40112,2107 @@
     <p:extLst>
       <p:ext uri="{BB962C8B-B14F-4D97-AF65-F5344CB8AC3E}">
         <p14:creationId xmlns:p14="http://schemas.microsoft.com/office/powerpoint/2010/main" val="2522164605"/>
+      </p:ext>
+    </p:extLst>
+  </p:cSld>
+  <p:clrMapOvr>
+    <a:masterClrMapping/>
+  </p:clrMapOvr>
+</p:sld>
+</file>
+
+<file path=ppt/slides/slide40.xml><?xml version="1.0" encoding="utf-8"?>
+<p:sld xmlns:a="http://schemas.openxmlformats.org/drawingml/2006/main" xmlns:r="http://schemas.openxmlformats.org/officeDocument/2006/relationships" xmlns:p="http://schemas.openxmlformats.org/presentationml/2006/main">
+  <p:cSld>
+    <p:spTree>
+      <p:nvGrpSpPr>
+        <p:cNvPr id="1" name=""/>
+        <p:cNvGrpSpPr/>
+        <p:nvPr/>
+      </p:nvGrpSpPr>
+      <p:grpSpPr>
+        <a:xfrm>
+          <a:off x="0" y="0"/>
+          <a:ext cx="0" cy="0"/>
+          <a:chOff x="0" y="0"/>
+          <a:chExt cx="0" cy="0"/>
+        </a:xfrm>
+      </p:grpSpPr>
+      <p:pic>
+        <p:nvPicPr>
+          <p:cNvPr id="2050" name="Picture 2"/>
+          <p:cNvPicPr>
+            <a:picLocks noChangeAspect="1" noChangeArrowheads="1"/>
+          </p:cNvPicPr>
+          <p:nvPr/>
+        </p:nvPicPr>
+        <p:blipFill>
+          <a:blip r:embed="rId2">
+            <a:extLst>
+              <a:ext uri="{28A0092B-C50C-407E-A947-70E740481C1C}">
+                <a14:useLocalDpi xmlns:a14="http://schemas.microsoft.com/office/drawing/2010/main" val="0"/>
+              </a:ext>
+            </a:extLst>
+          </a:blip>
+          <a:srcRect/>
+          <a:stretch>
+            <a:fillRect/>
+          </a:stretch>
+        </p:blipFill>
+        <p:spPr bwMode="auto">
+          <a:xfrm>
+            <a:off x="537022" y="-315416"/>
+            <a:ext cx="4457700" cy="2209800"/>
+          </a:xfrm>
+          <a:prstGeom prst="rect">
+            <a:avLst/>
+          </a:prstGeom>
+          <a:noFill/>
+          <a:ln>
+            <a:noFill/>
+          </a:ln>
+          <a:effectLst/>
+          <a:extLst>
+            <a:ext uri="{909E8E84-426E-40DD-AFC4-6F175D3DCCD1}">
+              <a14:hiddenFill xmlns:a14="http://schemas.microsoft.com/office/drawing/2010/main">
+                <a:solidFill>
+                  <a:schemeClr val="accent1"/>
+                </a:solidFill>
+              </a14:hiddenFill>
+            </a:ext>
+            <a:ext uri="{91240B29-F687-4F45-9708-019B960494DF}">
+              <a14:hiddenLine xmlns:a14="http://schemas.microsoft.com/office/drawing/2010/main" w="9525">
+                <a:solidFill>
+                  <a:schemeClr val="tx1"/>
+                </a:solidFill>
+                <a:miter lim="800000"/>
+                <a:headEnd/>
+                <a:tailEnd/>
+              </a14:hiddenLine>
+            </a:ext>
+            <a:ext uri="{AF507438-7753-43E0-B8FC-AC1667EBCBE1}">
+              <a14:hiddenEffects xmlns:a14="http://schemas.microsoft.com/office/drawing/2010/main">
+                <a:effectLst>
+                  <a:outerShdw dist="35921" dir="2700000" algn="ctr" rotWithShape="0">
+                    <a:schemeClr val="bg2"/>
+                  </a:outerShdw>
+                </a:effectLst>
+              </a14:hiddenEffects>
+            </a:ext>
+          </a:extLst>
+        </p:spPr>
+      </p:pic>
+      <p:pic>
+        <p:nvPicPr>
+          <p:cNvPr id="2051" name="Picture 3"/>
+          <p:cNvPicPr>
+            <a:picLocks noChangeAspect="1" noChangeArrowheads="1"/>
+          </p:cNvPicPr>
+          <p:nvPr/>
+        </p:nvPicPr>
+        <p:blipFill>
+          <a:blip r:embed="rId3">
+            <a:extLst>
+              <a:ext uri="{28A0092B-C50C-407E-A947-70E740481C1C}">
+                <a14:useLocalDpi xmlns:a14="http://schemas.microsoft.com/office/drawing/2010/main" val="0"/>
+              </a:ext>
+            </a:extLst>
+          </a:blip>
+          <a:srcRect/>
+          <a:stretch>
+            <a:fillRect/>
+          </a:stretch>
+        </p:blipFill>
+        <p:spPr bwMode="auto">
+          <a:xfrm>
+            <a:off x="537022" y="2038524"/>
+            <a:ext cx="4562475" cy="2276475"/>
+          </a:xfrm>
+          <a:prstGeom prst="rect">
+            <a:avLst/>
+          </a:prstGeom>
+          <a:noFill/>
+          <a:ln>
+            <a:noFill/>
+          </a:ln>
+          <a:effectLst/>
+          <a:extLst>
+            <a:ext uri="{909E8E84-426E-40DD-AFC4-6F175D3DCCD1}">
+              <a14:hiddenFill xmlns:a14="http://schemas.microsoft.com/office/drawing/2010/main">
+                <a:solidFill>
+                  <a:schemeClr val="accent1"/>
+                </a:solidFill>
+              </a14:hiddenFill>
+            </a:ext>
+            <a:ext uri="{91240B29-F687-4F45-9708-019B960494DF}">
+              <a14:hiddenLine xmlns:a14="http://schemas.microsoft.com/office/drawing/2010/main" w="9525">
+                <a:solidFill>
+                  <a:schemeClr val="tx1"/>
+                </a:solidFill>
+                <a:miter lim="800000"/>
+                <a:headEnd/>
+                <a:tailEnd/>
+              </a14:hiddenLine>
+            </a:ext>
+            <a:ext uri="{AF507438-7753-43E0-B8FC-AC1667EBCBE1}">
+              <a14:hiddenEffects xmlns:a14="http://schemas.microsoft.com/office/drawing/2010/main">
+                <a:effectLst>
+                  <a:outerShdw dist="35921" dir="2700000" algn="ctr" rotWithShape="0">
+                    <a:schemeClr val="bg2"/>
+                  </a:outerShdw>
+                </a:effectLst>
+              </a14:hiddenEffects>
+            </a:ext>
+          </a:extLst>
+        </p:spPr>
+      </p:pic>
+      <p:pic>
+        <p:nvPicPr>
+          <p:cNvPr id="2052" name="Picture 4"/>
+          <p:cNvPicPr>
+            <a:picLocks noChangeAspect="1" noChangeArrowheads="1"/>
+          </p:cNvPicPr>
+          <p:nvPr/>
+        </p:nvPicPr>
+        <p:blipFill>
+          <a:blip r:embed="rId4">
+            <a:extLst>
+              <a:ext uri="{28A0092B-C50C-407E-A947-70E740481C1C}">
+                <a14:useLocalDpi xmlns:a14="http://schemas.microsoft.com/office/drawing/2010/main" val="0"/>
+              </a:ext>
+            </a:extLst>
+          </a:blip>
+          <a:srcRect/>
+          <a:stretch>
+            <a:fillRect/>
+          </a:stretch>
+        </p:blipFill>
+        <p:spPr bwMode="auto">
+          <a:xfrm>
+            <a:off x="537022" y="4638164"/>
+            <a:ext cx="4572000" cy="2247900"/>
+          </a:xfrm>
+          <a:prstGeom prst="rect">
+            <a:avLst/>
+          </a:prstGeom>
+          <a:noFill/>
+          <a:ln>
+            <a:noFill/>
+          </a:ln>
+          <a:effectLst/>
+          <a:extLst>
+            <a:ext uri="{909E8E84-426E-40DD-AFC4-6F175D3DCCD1}">
+              <a14:hiddenFill xmlns:a14="http://schemas.microsoft.com/office/drawing/2010/main">
+                <a:solidFill>
+                  <a:schemeClr val="accent1"/>
+                </a:solidFill>
+              </a14:hiddenFill>
+            </a:ext>
+            <a:ext uri="{91240B29-F687-4F45-9708-019B960494DF}">
+              <a14:hiddenLine xmlns:a14="http://schemas.microsoft.com/office/drawing/2010/main" w="9525">
+                <a:solidFill>
+                  <a:schemeClr val="tx1"/>
+                </a:solidFill>
+                <a:miter lim="800000"/>
+                <a:headEnd/>
+                <a:tailEnd/>
+              </a14:hiddenLine>
+            </a:ext>
+            <a:ext uri="{AF507438-7753-43E0-B8FC-AC1667EBCBE1}">
+              <a14:hiddenEffects xmlns:a14="http://schemas.microsoft.com/office/drawing/2010/main">
+                <a:effectLst>
+                  <a:outerShdw dist="35921" dir="2700000" algn="ctr" rotWithShape="0">
+                    <a:schemeClr val="bg2"/>
+                  </a:outerShdw>
+                </a:effectLst>
+              </a14:hiddenEffects>
+            </a:ext>
+          </a:extLst>
+        </p:spPr>
+      </p:pic>
+      <p:sp>
+        <p:nvSpPr>
+          <p:cNvPr id="7" name="TextBox 33"/>
+          <p:cNvSpPr txBox="1"/>
+          <p:nvPr/>
+        </p:nvSpPr>
+        <p:spPr>
+          <a:xfrm>
+            <a:off x="2765872" y="-310480"/>
+            <a:ext cx="418704" cy="646331"/>
+          </a:xfrm>
+          <a:prstGeom prst="rect">
+            <a:avLst/>
+          </a:prstGeom>
+          <a:noFill/>
+        </p:spPr>
+        <p:txBody>
+          <a:bodyPr wrap="none" rtlCol="0">
+            <a:spAutoFit/>
+          </a:bodyPr>
+          <a:lstStyle/>
+          <a:p>
+            <a:r>
+              <a:rPr lang="pl-PL" sz="3600" b="1" dirty="0"/>
+              <a:t>0</a:t>
+            </a:r>
+          </a:p>
+        </p:txBody>
+      </p:sp>
+      <p:sp>
+        <p:nvSpPr>
+          <p:cNvPr id="8" name="TextBox 33"/>
+          <p:cNvSpPr txBox="1"/>
+          <p:nvPr/>
+        </p:nvSpPr>
+        <p:spPr>
+          <a:xfrm>
+            <a:off x="2823022" y="1894508"/>
+            <a:ext cx="418704" cy="646331"/>
+          </a:xfrm>
+          <a:prstGeom prst="rect">
+            <a:avLst/>
+          </a:prstGeom>
+          <a:noFill/>
+        </p:spPr>
+        <p:txBody>
+          <a:bodyPr wrap="none" rtlCol="0">
+            <a:spAutoFit/>
+          </a:bodyPr>
+          <a:lstStyle/>
+          <a:p>
+            <a:r>
+              <a:rPr lang="pl-PL" sz="3600" b="1" dirty="0" smtClean="0"/>
+              <a:t>1</a:t>
+            </a:r>
+            <a:endParaRPr lang="pl-PL" sz="3600" b="1" dirty="0"/>
+          </a:p>
+        </p:txBody>
+      </p:sp>
+      <p:sp>
+        <p:nvSpPr>
+          <p:cNvPr id="9" name="TextBox 33"/>
+          <p:cNvSpPr txBox="1"/>
+          <p:nvPr/>
+        </p:nvSpPr>
+        <p:spPr>
+          <a:xfrm>
+            <a:off x="2477145" y="4437112"/>
+            <a:ext cx="1116909" cy="646331"/>
+          </a:xfrm>
+          <a:prstGeom prst="rect">
+            <a:avLst/>
+          </a:prstGeom>
+          <a:noFill/>
+        </p:spPr>
+        <p:txBody>
+          <a:bodyPr wrap="none" rtlCol="0">
+            <a:spAutoFit/>
+          </a:bodyPr>
+          <a:lstStyle/>
+          <a:p>
+            <a:r>
+              <a:rPr lang="pl-PL" sz="3600" b="1" dirty="0" smtClean="0"/>
+              <a:t>żółte</a:t>
+            </a:r>
+            <a:endParaRPr lang="pl-PL" sz="3600" b="1" dirty="0"/>
+          </a:p>
+        </p:txBody>
+      </p:sp>
+    </p:spTree>
+    <p:extLst>
+      <p:ext uri="{BB962C8B-B14F-4D97-AF65-F5344CB8AC3E}">
+        <p14:creationId xmlns:p14="http://schemas.microsoft.com/office/powerpoint/2010/main" val="1196874"/>
+      </p:ext>
+    </p:extLst>
+  </p:cSld>
+  <p:clrMapOvr>
+    <a:masterClrMapping/>
+  </p:clrMapOvr>
+</p:sld>
+</file>
+
+<file path=ppt/slides/slide41.xml><?xml version="1.0" encoding="utf-8"?>
+<p:sld xmlns:a="http://schemas.openxmlformats.org/drawingml/2006/main" xmlns:r="http://schemas.openxmlformats.org/officeDocument/2006/relationships" xmlns:p="http://schemas.openxmlformats.org/presentationml/2006/main">
+  <p:cSld>
+    <p:spTree>
+      <p:nvGrpSpPr>
+        <p:cNvPr id="1" name=""/>
+        <p:cNvGrpSpPr/>
+        <p:nvPr/>
+      </p:nvGrpSpPr>
+      <p:grpSpPr>
+        <a:xfrm>
+          <a:off x="0" y="0"/>
+          <a:ext cx="0" cy="0"/>
+          <a:chOff x="0" y="0"/>
+          <a:chExt cx="0" cy="0"/>
+        </a:xfrm>
+      </p:grpSpPr>
+      <p:pic>
+        <p:nvPicPr>
+          <p:cNvPr id="4" name="Picture 2"/>
+          <p:cNvPicPr>
+            <a:picLocks noChangeAspect="1" noChangeArrowheads="1"/>
+          </p:cNvPicPr>
+          <p:nvPr/>
+        </p:nvPicPr>
+        <p:blipFill>
+          <a:blip r:embed="rId2">
+            <a:extLst>
+              <a:ext uri="{28A0092B-C50C-407E-A947-70E740481C1C}">
+                <a14:useLocalDpi xmlns:a14="http://schemas.microsoft.com/office/drawing/2010/main" val="0"/>
+              </a:ext>
+            </a:extLst>
+          </a:blip>
+          <a:srcRect/>
+          <a:stretch>
+            <a:fillRect/>
+          </a:stretch>
+        </p:blipFill>
+        <p:spPr bwMode="auto">
+          <a:xfrm>
+            <a:off x="-2003537" y="1467901"/>
+            <a:ext cx="4662413" cy="2311282"/>
+          </a:xfrm>
+          <a:prstGeom prst="rect">
+            <a:avLst/>
+          </a:prstGeom>
+          <a:noFill/>
+          <a:ln w="38100">
+            <a:noFill/>
+            <a:miter lim="800000"/>
+            <a:headEnd/>
+            <a:tailEnd/>
+          </a:ln>
+          <a:effectLst/>
+          <a:extLst>
+            <a:ext uri="{909E8E84-426E-40DD-AFC4-6F175D3DCCD1}">
+              <a14:hiddenFill xmlns:a14="http://schemas.microsoft.com/office/drawing/2010/main">
+                <a:solidFill>
+                  <a:schemeClr val="accent1"/>
+                </a:solidFill>
+              </a14:hiddenFill>
+            </a:ext>
+            <a:ext uri="{AF507438-7753-43E0-B8FC-AC1667EBCBE1}">
+              <a14:hiddenEffects xmlns:a14="http://schemas.microsoft.com/office/drawing/2010/main">
+                <a:effectLst>
+                  <a:outerShdw dist="35921" dir="2700000" algn="ctr" rotWithShape="0">
+                    <a:schemeClr val="bg2"/>
+                  </a:outerShdw>
+                </a:effectLst>
+              </a14:hiddenEffects>
+            </a:ext>
+          </a:extLst>
+        </p:spPr>
+      </p:pic>
+      <p:pic>
+        <p:nvPicPr>
+          <p:cNvPr id="5" name="Picture 3"/>
+          <p:cNvPicPr>
+            <a:picLocks noChangeAspect="1" noChangeArrowheads="1"/>
+          </p:cNvPicPr>
+          <p:nvPr/>
+        </p:nvPicPr>
+        <p:blipFill>
+          <a:blip r:embed="rId3">
+            <a:extLst>
+              <a:ext uri="{28A0092B-C50C-407E-A947-70E740481C1C}">
+                <a14:useLocalDpi xmlns:a14="http://schemas.microsoft.com/office/drawing/2010/main" val="0"/>
+              </a:ext>
+            </a:extLst>
+          </a:blip>
+          <a:srcRect/>
+          <a:stretch>
+            <a:fillRect/>
+          </a:stretch>
+        </p:blipFill>
+        <p:spPr bwMode="auto">
+          <a:xfrm>
+            <a:off x="2970585" y="1485305"/>
+            <a:ext cx="4562475" cy="2276475"/>
+          </a:xfrm>
+          <a:prstGeom prst="rect">
+            <a:avLst/>
+          </a:prstGeom>
+          <a:noFill/>
+          <a:ln w="38100">
+            <a:noFill/>
+            <a:miter lim="800000"/>
+            <a:headEnd/>
+            <a:tailEnd/>
+          </a:ln>
+          <a:effectLst/>
+          <a:extLst>
+            <a:ext uri="{909E8E84-426E-40DD-AFC4-6F175D3DCCD1}">
+              <a14:hiddenFill xmlns:a14="http://schemas.microsoft.com/office/drawing/2010/main">
+                <a:solidFill>
+                  <a:schemeClr val="accent1"/>
+                </a:solidFill>
+              </a14:hiddenFill>
+            </a:ext>
+            <a:ext uri="{AF507438-7753-43E0-B8FC-AC1667EBCBE1}">
+              <a14:hiddenEffects xmlns:a14="http://schemas.microsoft.com/office/drawing/2010/main">
+                <a:effectLst>
+                  <a:outerShdw dist="35921" dir="2700000" algn="ctr" rotWithShape="0">
+                    <a:schemeClr val="bg2"/>
+                  </a:outerShdw>
+                </a:effectLst>
+              </a14:hiddenEffects>
+            </a:ext>
+          </a:extLst>
+        </p:spPr>
+      </p:pic>
+      <p:pic>
+        <p:nvPicPr>
+          <p:cNvPr id="6" name="Picture 4"/>
+          <p:cNvPicPr>
+            <a:picLocks noChangeAspect="1" noChangeArrowheads="1"/>
+          </p:cNvPicPr>
+          <p:nvPr/>
+        </p:nvPicPr>
+        <p:blipFill>
+          <a:blip r:embed="rId4">
+            <a:extLst>
+              <a:ext uri="{28A0092B-C50C-407E-A947-70E740481C1C}">
+                <a14:useLocalDpi xmlns:a14="http://schemas.microsoft.com/office/drawing/2010/main" val="0"/>
+              </a:ext>
+            </a:extLst>
+          </a:blip>
+          <a:srcRect/>
+          <a:stretch>
+            <a:fillRect/>
+          </a:stretch>
+        </p:blipFill>
+        <p:spPr bwMode="auto">
+          <a:xfrm>
+            <a:off x="7812360" y="1467901"/>
+            <a:ext cx="4751945" cy="2336373"/>
+          </a:xfrm>
+          <a:prstGeom prst="rect">
+            <a:avLst/>
+          </a:prstGeom>
+          <a:noFill/>
+          <a:ln w="38100">
+            <a:noFill/>
+            <a:miter lim="800000"/>
+            <a:headEnd/>
+            <a:tailEnd/>
+          </a:ln>
+          <a:effectLst/>
+          <a:extLst>
+            <a:ext uri="{909E8E84-426E-40DD-AFC4-6F175D3DCCD1}">
+              <a14:hiddenFill xmlns:a14="http://schemas.microsoft.com/office/drawing/2010/main">
+                <a:solidFill>
+                  <a:schemeClr val="accent1"/>
+                </a:solidFill>
+              </a14:hiddenFill>
+            </a:ext>
+            <a:ext uri="{AF507438-7753-43E0-B8FC-AC1667EBCBE1}">
+              <a14:hiddenEffects xmlns:a14="http://schemas.microsoft.com/office/drawing/2010/main">
+                <a:effectLst>
+                  <a:outerShdw dist="35921" dir="2700000" algn="ctr" rotWithShape="0">
+                    <a:schemeClr val="bg2"/>
+                  </a:outerShdw>
+                </a:effectLst>
+              </a14:hiddenEffects>
+            </a:ext>
+          </a:extLst>
+        </p:spPr>
+      </p:pic>
+      <p:sp>
+        <p:nvSpPr>
+          <p:cNvPr id="7" name="TextBox 33"/>
+          <p:cNvSpPr txBox="1"/>
+          <p:nvPr/>
+        </p:nvSpPr>
+        <p:spPr>
+          <a:xfrm>
+            <a:off x="327670" y="1573778"/>
+            <a:ext cx="571922" cy="707886"/>
+          </a:xfrm>
+          <a:prstGeom prst="rect">
+            <a:avLst/>
+          </a:prstGeom>
+          <a:noFill/>
+        </p:spPr>
+        <p:txBody>
+          <a:bodyPr wrap="square" rtlCol="0">
+            <a:spAutoFit/>
+          </a:bodyPr>
+          <a:lstStyle/>
+          <a:p>
+            <a:r>
+              <a:rPr lang="pl-PL" sz="4000" b="1" dirty="0" smtClean="0"/>
+              <a:t>0</a:t>
+            </a:r>
+            <a:endParaRPr lang="pl-PL" sz="4000" b="1" dirty="0"/>
+          </a:p>
+        </p:txBody>
+      </p:sp>
+      <p:sp>
+        <p:nvSpPr>
+          <p:cNvPr id="8" name="TextBox 33"/>
+          <p:cNvSpPr txBox="1"/>
+          <p:nvPr/>
+        </p:nvSpPr>
+        <p:spPr>
+          <a:xfrm>
+            <a:off x="5029646" y="1500213"/>
+            <a:ext cx="444352" cy="707886"/>
+          </a:xfrm>
+          <a:prstGeom prst="rect">
+            <a:avLst/>
+          </a:prstGeom>
+          <a:noFill/>
+        </p:spPr>
+        <p:txBody>
+          <a:bodyPr wrap="none" rtlCol="0">
+            <a:spAutoFit/>
+          </a:bodyPr>
+          <a:lstStyle/>
+          <a:p>
+            <a:r>
+              <a:rPr lang="pl-PL" sz="4000" b="1" dirty="0" smtClean="0"/>
+              <a:t>1</a:t>
+            </a:r>
+            <a:endParaRPr lang="pl-PL" sz="3600" b="1" dirty="0"/>
+          </a:p>
+        </p:txBody>
+      </p:sp>
+      <p:sp>
+        <p:nvSpPr>
+          <p:cNvPr id="9" name="TextBox 33"/>
+          <p:cNvSpPr txBox="1"/>
+          <p:nvPr/>
+        </p:nvSpPr>
+        <p:spPr>
+          <a:xfrm>
+            <a:off x="9752483" y="1501339"/>
+            <a:ext cx="1116909" cy="646331"/>
+          </a:xfrm>
+          <a:prstGeom prst="rect">
+            <a:avLst/>
+          </a:prstGeom>
+          <a:noFill/>
+        </p:spPr>
+        <p:txBody>
+          <a:bodyPr wrap="none" rtlCol="0">
+            <a:spAutoFit/>
+          </a:bodyPr>
+          <a:lstStyle/>
+          <a:p>
+            <a:r>
+              <a:rPr lang="pl-PL" sz="3600" b="1" dirty="0" smtClean="0"/>
+              <a:t>żółte</a:t>
+            </a:r>
+            <a:endParaRPr lang="pl-PL" sz="3600" b="1" dirty="0"/>
+          </a:p>
+        </p:txBody>
+      </p:sp>
+      <p:pic>
+        <p:nvPicPr>
+          <p:cNvPr id="3074" name="Picture 2"/>
+          <p:cNvPicPr>
+            <a:picLocks noChangeAspect="1" noChangeArrowheads="1"/>
+          </p:cNvPicPr>
+          <p:nvPr/>
+        </p:nvPicPr>
+        <p:blipFill>
+          <a:blip r:embed="rId5">
+            <a:extLst>
+              <a:ext uri="{28A0092B-C50C-407E-A947-70E740481C1C}">
+                <a14:useLocalDpi xmlns:a14="http://schemas.microsoft.com/office/drawing/2010/main" val="0"/>
+              </a:ext>
+            </a:extLst>
+          </a:blip>
+          <a:srcRect/>
+          <a:stretch>
+            <a:fillRect/>
+          </a:stretch>
+        </p:blipFill>
+        <p:spPr bwMode="auto">
+          <a:xfrm>
+            <a:off x="335260" y="4293096"/>
+            <a:ext cx="7847013" cy="2266950"/>
+          </a:xfrm>
+          <a:prstGeom prst="rect">
+            <a:avLst/>
+          </a:prstGeom>
+          <a:noFill/>
+          <a:ln>
+            <a:noFill/>
+          </a:ln>
+          <a:effectLst/>
+          <a:extLst>
+            <a:ext uri="{909E8E84-426E-40DD-AFC4-6F175D3DCCD1}">
+              <a14:hiddenFill xmlns:a14="http://schemas.microsoft.com/office/drawing/2010/main">
+                <a:solidFill>
+                  <a:schemeClr val="accent1"/>
+                </a:solidFill>
+              </a14:hiddenFill>
+            </a:ext>
+            <a:ext uri="{91240B29-F687-4F45-9708-019B960494DF}">
+              <a14:hiddenLine xmlns:a14="http://schemas.microsoft.com/office/drawing/2010/main" w="9525">
+                <a:solidFill>
+                  <a:schemeClr val="tx1"/>
+                </a:solidFill>
+                <a:miter lim="800000"/>
+                <a:headEnd/>
+                <a:tailEnd/>
+              </a14:hiddenLine>
+            </a:ext>
+            <a:ext uri="{AF507438-7753-43E0-B8FC-AC1667EBCBE1}">
+              <a14:hiddenEffects xmlns:a14="http://schemas.microsoft.com/office/drawing/2010/main">
+                <a:effectLst>
+                  <a:outerShdw dist="35921" dir="2700000" algn="ctr" rotWithShape="0">
+                    <a:schemeClr val="bg2"/>
+                  </a:outerShdw>
+                </a:effectLst>
+              </a14:hiddenEffects>
+            </a:ext>
+          </a:extLst>
+        </p:spPr>
+      </p:pic>
+    </p:spTree>
+    <p:extLst>
+      <p:ext uri="{BB962C8B-B14F-4D97-AF65-F5344CB8AC3E}">
+        <p14:creationId xmlns:p14="http://schemas.microsoft.com/office/powerpoint/2010/main" val="2951369922"/>
+      </p:ext>
+    </p:extLst>
+  </p:cSld>
+  <p:clrMapOvr>
+    <a:masterClrMapping/>
+  </p:clrMapOvr>
+</p:sld>
+</file>
+
+<file path=ppt/slides/slide42.xml><?xml version="1.0" encoding="utf-8"?>
+<p:sld xmlns:a="http://schemas.openxmlformats.org/drawingml/2006/main" xmlns:r="http://schemas.openxmlformats.org/officeDocument/2006/relationships" xmlns:p="http://schemas.openxmlformats.org/presentationml/2006/main">
+  <p:cSld>
+    <p:spTree>
+      <p:nvGrpSpPr>
+        <p:cNvPr id="1" name=""/>
+        <p:cNvGrpSpPr/>
+        <p:nvPr/>
+      </p:nvGrpSpPr>
+      <p:grpSpPr>
+        <a:xfrm>
+          <a:off x="0" y="0"/>
+          <a:ext cx="0" cy="0"/>
+          <a:chOff x="0" y="0"/>
+          <a:chExt cx="0" cy="0"/>
+        </a:xfrm>
+      </p:grpSpPr>
+      <p:graphicFrame>
+        <p:nvGraphicFramePr>
+          <p:cNvPr id="4" name="Tabela 3"/>
+          <p:cNvGraphicFramePr>
+            <a:graphicFrameLocks noGrp="1"/>
+          </p:cNvGraphicFramePr>
+          <p:nvPr>
+            <p:extLst>
+              <p:ext uri="{D42A27DB-BD31-4B8C-83A1-F6EECF244321}">
+                <p14:modId xmlns:p14="http://schemas.microsoft.com/office/powerpoint/2010/main" val="3609188259"/>
+              </p:ext>
+            </p:extLst>
+          </p:nvPr>
+        </p:nvGraphicFramePr>
+        <p:xfrm>
+          <a:off x="683568" y="476672"/>
+          <a:ext cx="7992888" cy="5211621"/>
+        </p:xfrm>
+        <a:graphic>
+          <a:graphicData uri="http://schemas.openxmlformats.org/drawingml/2006/table">
+            <a:tbl>
+              <a:tblPr firstRow="1" bandRow="1">
+                <a:tableStyleId>{2D5ABB26-0587-4C30-8999-92F81FD0307C}</a:tableStyleId>
+              </a:tblPr>
+              <a:tblGrid>
+                <a:gridCol w="2664296"/>
+                <a:gridCol w="1332148"/>
+                <a:gridCol w="3996444"/>
+              </a:tblGrid>
+              <a:tr h="720080">
+                <a:tc>
+                  <a:txBody>
+                    <a:bodyPr/>
+                    <a:lstStyle/>
+                    <a:p>
+                      <a:pPr algn="ctr"/>
+                      <a:r>
+                        <a:rPr lang="pl-PL" dirty="0" smtClean="0">
+                          <a:latin typeface="Times New Roman" pitchFamily="18" charset="0"/>
+                          <a:cs typeface="Times New Roman" pitchFamily="18" charset="0"/>
+                        </a:rPr>
+                        <a:t>Obecna faza</a:t>
+                      </a:r>
+                      <a:endParaRPr lang="pl-PL" dirty="0">
+                        <a:latin typeface="Times New Roman" pitchFamily="18" charset="0"/>
+                        <a:cs typeface="Times New Roman" pitchFamily="18" charset="0"/>
+                      </a:endParaRPr>
+                    </a:p>
+                  </a:txBody>
+                  <a:tcPr anchor="ctr">
+                    <a:lnL w="12700" cap="flat" cmpd="sng" algn="ctr">
+                      <a:solidFill>
+                        <a:schemeClr val="tx1"/>
+                      </a:solidFill>
+                      <a:prstDash val="solid"/>
+                      <a:round/>
+                      <a:headEnd type="none" w="med" len="med"/>
+                      <a:tailEnd type="none" w="med" len="med"/>
+                    </a:lnL>
+                    <a:lnR w="12700" cap="flat" cmpd="sng" algn="ctr">
+                      <a:solidFill>
+                        <a:schemeClr val="tx1"/>
+                      </a:solidFill>
+                      <a:prstDash val="solid"/>
+                      <a:round/>
+                      <a:headEnd type="none" w="med" len="med"/>
+                      <a:tailEnd type="none" w="med" len="med"/>
+                    </a:lnR>
+                    <a:lnT w="12700" cap="flat" cmpd="sng" algn="ctr">
+                      <a:solidFill>
+                        <a:schemeClr val="tx1"/>
+                      </a:solidFill>
+                      <a:prstDash val="solid"/>
+                      <a:round/>
+                      <a:headEnd type="none" w="med" len="med"/>
+                      <a:tailEnd type="none" w="med" len="med"/>
+                    </a:lnT>
+                    <a:lnB w="12700" cap="flat" cmpd="sng" algn="ctr">
+                      <a:solidFill>
+                        <a:schemeClr val="tx1"/>
+                      </a:solidFill>
+                      <a:prstDash val="solid"/>
+                      <a:round/>
+                      <a:headEnd type="none" w="med" len="med"/>
+                      <a:tailEnd type="none" w="med" len="med"/>
+                    </a:lnB>
+                  </a:tcPr>
+                </a:tc>
+                <a:tc>
+                  <a:txBody>
+                    <a:bodyPr/>
+                    <a:lstStyle/>
+                    <a:p>
+                      <a:pPr algn="ctr"/>
+                      <a:r>
+                        <a:rPr lang="pl-PL" dirty="0" smtClean="0">
+                          <a:latin typeface="Times New Roman" pitchFamily="18" charset="0"/>
+                          <a:cs typeface="Times New Roman" pitchFamily="18" charset="0"/>
+                        </a:rPr>
+                        <a:t>Możliwe akcje</a:t>
+                      </a:r>
+                      <a:endParaRPr lang="pl-PL" dirty="0">
+                        <a:latin typeface="Times New Roman" pitchFamily="18" charset="0"/>
+                        <a:cs typeface="Times New Roman" pitchFamily="18" charset="0"/>
+                      </a:endParaRPr>
+                    </a:p>
+                  </a:txBody>
+                  <a:tcPr anchor="ctr">
+                    <a:lnL w="12700" cap="flat" cmpd="sng" algn="ctr">
+                      <a:solidFill>
+                        <a:schemeClr val="tx1"/>
+                      </a:solidFill>
+                      <a:prstDash val="solid"/>
+                      <a:round/>
+                      <a:headEnd type="none" w="med" len="med"/>
+                      <a:tailEnd type="none" w="med" len="med"/>
+                    </a:lnL>
+                    <a:lnR w="12700" cap="flat" cmpd="sng" algn="ctr">
+                      <a:solidFill>
+                        <a:schemeClr val="tx1"/>
+                      </a:solidFill>
+                      <a:prstDash val="solid"/>
+                      <a:round/>
+                      <a:headEnd type="none" w="med" len="med"/>
+                      <a:tailEnd type="none" w="med" len="med"/>
+                    </a:lnR>
+                    <a:lnT w="12700" cap="flat" cmpd="sng" algn="ctr">
+                      <a:solidFill>
+                        <a:schemeClr val="tx1"/>
+                      </a:solidFill>
+                      <a:prstDash val="solid"/>
+                      <a:round/>
+                      <a:headEnd type="none" w="med" len="med"/>
+                      <a:tailEnd type="none" w="med" len="med"/>
+                    </a:lnT>
+                    <a:lnB w="12700" cap="flat" cmpd="sng" algn="ctr">
+                      <a:solidFill>
+                        <a:schemeClr val="tx1"/>
+                      </a:solidFill>
+                      <a:prstDash val="solid"/>
+                      <a:round/>
+                      <a:headEnd type="none" w="med" len="med"/>
+                      <a:tailEnd type="none" w="med" len="med"/>
+                    </a:lnB>
+                  </a:tcPr>
+                </a:tc>
+                <a:tc>
+                  <a:txBody>
+                    <a:bodyPr/>
+                    <a:lstStyle/>
+                    <a:p>
+                      <a:pPr algn="ctr"/>
+                      <a:r>
+                        <a:rPr lang="pl-PL" dirty="0" smtClean="0">
+                          <a:latin typeface="Times New Roman" pitchFamily="18" charset="0"/>
+                          <a:cs typeface="Times New Roman" pitchFamily="18" charset="0"/>
+                        </a:rPr>
+                        <a:t>Konsekwencje akcji</a:t>
+                      </a:r>
+                      <a:endParaRPr lang="pl-PL" dirty="0">
+                        <a:latin typeface="Times New Roman" pitchFamily="18" charset="0"/>
+                        <a:cs typeface="Times New Roman" pitchFamily="18" charset="0"/>
+                      </a:endParaRPr>
+                    </a:p>
+                  </a:txBody>
+                  <a:tcPr anchor="ctr">
+                    <a:lnL w="12700" cap="flat" cmpd="sng" algn="ctr">
+                      <a:solidFill>
+                        <a:schemeClr val="tx1"/>
+                      </a:solidFill>
+                      <a:prstDash val="solid"/>
+                      <a:round/>
+                      <a:headEnd type="none" w="med" len="med"/>
+                      <a:tailEnd type="none" w="med" len="med"/>
+                    </a:lnL>
+                    <a:lnR w="12700" cap="flat" cmpd="sng" algn="ctr">
+                      <a:solidFill>
+                        <a:schemeClr val="tx1"/>
+                      </a:solidFill>
+                      <a:prstDash val="solid"/>
+                      <a:round/>
+                      <a:headEnd type="none" w="med" len="med"/>
+                      <a:tailEnd type="none" w="med" len="med"/>
+                    </a:lnR>
+                    <a:lnT w="12700" cap="flat" cmpd="sng" algn="ctr">
+                      <a:solidFill>
+                        <a:schemeClr val="tx1"/>
+                      </a:solidFill>
+                      <a:prstDash val="solid"/>
+                      <a:round/>
+                      <a:headEnd type="none" w="med" len="med"/>
+                      <a:tailEnd type="none" w="med" len="med"/>
+                    </a:lnT>
+                    <a:lnB w="12700" cap="flat" cmpd="sng" algn="ctr">
+                      <a:solidFill>
+                        <a:schemeClr val="tx1"/>
+                      </a:solidFill>
+                      <a:prstDash val="solid"/>
+                      <a:round/>
+                      <a:headEnd type="none" w="med" len="med"/>
+                      <a:tailEnd type="none" w="med" len="med"/>
+                    </a:lnB>
+                  </a:tcPr>
+                </a:tc>
+              </a:tr>
+              <a:tr h="724245">
+                <a:tc rowSpan="2">
+                  <a:txBody>
+                    <a:bodyPr/>
+                    <a:lstStyle/>
+                    <a:p>
+                      <a:pPr algn="ctr"/>
+                      <a:endParaRPr lang="pl-PL" dirty="0">
+                        <a:latin typeface="Times New Roman" pitchFamily="18" charset="0"/>
+                        <a:cs typeface="Times New Roman" pitchFamily="18" charset="0"/>
+                      </a:endParaRPr>
+                    </a:p>
+                  </a:txBody>
+                  <a:tcPr anchor="ctr">
+                    <a:lnL w="12700" cap="flat" cmpd="sng" algn="ctr">
+                      <a:solidFill>
+                        <a:schemeClr val="tx1"/>
+                      </a:solidFill>
+                      <a:prstDash val="solid"/>
+                      <a:round/>
+                      <a:headEnd type="none" w="med" len="med"/>
+                      <a:tailEnd type="none" w="med" len="med"/>
+                    </a:lnL>
+                    <a:lnR w="12700" cap="flat" cmpd="sng" algn="ctr">
+                      <a:solidFill>
+                        <a:schemeClr val="tx1"/>
+                      </a:solidFill>
+                      <a:prstDash val="solid"/>
+                      <a:round/>
+                      <a:headEnd type="none" w="med" len="med"/>
+                      <a:tailEnd type="none" w="med" len="med"/>
+                    </a:lnR>
+                    <a:lnT w="12700" cap="flat" cmpd="sng" algn="ctr">
+                      <a:solidFill>
+                        <a:schemeClr val="tx1"/>
+                      </a:solidFill>
+                      <a:prstDash val="solid"/>
+                      <a:round/>
+                      <a:headEnd type="none" w="med" len="med"/>
+                      <a:tailEnd type="none" w="med" len="med"/>
+                    </a:lnT>
+                    <a:lnB w="12700" cap="flat" cmpd="sng" algn="ctr">
+                      <a:solidFill>
+                        <a:schemeClr val="tx1"/>
+                      </a:solidFill>
+                      <a:prstDash val="solid"/>
+                      <a:round/>
+                      <a:headEnd type="none" w="med" len="med"/>
+                      <a:tailEnd type="none" w="med" len="med"/>
+                    </a:lnB>
+                  </a:tcPr>
+                </a:tc>
+                <a:tc>
+                  <a:txBody>
+                    <a:bodyPr/>
+                    <a:lstStyle/>
+                    <a:p>
+                      <a:pPr marL="0" marR="0" indent="0" algn="ctr" defTabSz="914400" rtl="0" eaLnBrk="1" fontAlgn="auto" latinLnBrk="0" hangingPunct="1">
+                        <a:lnSpc>
+                          <a:spcPct val="100000"/>
+                        </a:lnSpc>
+                        <a:spcBef>
+                          <a:spcPts val="0"/>
+                        </a:spcBef>
+                        <a:spcAft>
+                          <a:spcPts val="0"/>
+                        </a:spcAft>
+                        <a:buClrTx/>
+                        <a:buSzTx/>
+                        <a:buFontTx/>
+                        <a:buNone/>
+                        <a:tabLst/>
+                        <a:defRPr/>
+                      </a:pPr>
+                      <a:r>
+                        <a:rPr lang="pl-PL" dirty="0" smtClean="0">
+                          <a:latin typeface="Times New Roman" pitchFamily="18" charset="0"/>
+                          <a:cs typeface="Times New Roman" pitchFamily="18" charset="0"/>
+                        </a:rPr>
+                        <a:t>0</a:t>
+                      </a:r>
+                    </a:p>
+                    <a:p>
+                      <a:pPr algn="ctr"/>
+                      <a:endParaRPr lang="pl-PL" dirty="0">
+                        <a:latin typeface="Times New Roman" pitchFamily="18" charset="0"/>
+                        <a:cs typeface="Times New Roman" pitchFamily="18" charset="0"/>
+                      </a:endParaRPr>
+                    </a:p>
+                  </a:txBody>
+                  <a:tcPr anchor="b">
+                    <a:lnL w="12700" cap="flat" cmpd="sng" algn="ctr">
+                      <a:solidFill>
+                        <a:schemeClr val="tx1"/>
+                      </a:solidFill>
+                      <a:prstDash val="solid"/>
+                      <a:round/>
+                      <a:headEnd type="none" w="med" len="med"/>
+                      <a:tailEnd type="none" w="med" len="med"/>
+                    </a:lnL>
+                    <a:lnR w="12700" cap="flat" cmpd="sng" algn="ctr">
+                      <a:solidFill>
+                        <a:schemeClr val="tx1"/>
+                      </a:solidFill>
+                      <a:prstDash val="solid"/>
+                      <a:round/>
+                      <a:headEnd type="none" w="med" len="med"/>
+                      <a:tailEnd type="none" w="med" len="med"/>
+                    </a:lnR>
+                    <a:lnT w="12700" cap="flat" cmpd="sng" algn="ctr">
+                      <a:solidFill>
+                        <a:schemeClr val="tx1"/>
+                      </a:solidFill>
+                      <a:prstDash val="solid"/>
+                      <a:round/>
+                      <a:headEnd type="none" w="med" len="med"/>
+                      <a:tailEnd type="none" w="med" len="med"/>
+                    </a:lnT>
+                    <a:lnB w="12700" cap="flat" cmpd="sng" algn="ctr">
+                      <a:solidFill>
+                        <a:schemeClr val="tx1"/>
+                      </a:solidFill>
+                      <a:prstDash val="solid"/>
+                      <a:round/>
+                      <a:headEnd type="none" w="med" len="med"/>
+                      <a:tailEnd type="none" w="med" len="med"/>
+                    </a:lnB>
+                  </a:tcPr>
+                </a:tc>
+                <a:tc>
+                  <a:txBody>
+                    <a:bodyPr/>
+                    <a:lstStyle/>
+                    <a:p>
+                      <a:pPr marL="0" marR="0" indent="0" algn="ctr" defTabSz="914400" rtl="0" eaLnBrk="1" fontAlgn="auto" latinLnBrk="0" hangingPunct="1">
+                        <a:lnSpc>
+                          <a:spcPct val="100000"/>
+                        </a:lnSpc>
+                        <a:spcBef>
+                          <a:spcPts val="0"/>
+                        </a:spcBef>
+                        <a:spcAft>
+                          <a:spcPts val="0"/>
+                        </a:spcAft>
+                        <a:buClrTx/>
+                        <a:buSzTx/>
+                        <a:buFontTx/>
+                        <a:buNone/>
+                        <a:tabLst/>
+                        <a:defRPr/>
+                      </a:pPr>
+                      <a:r>
+                        <a:rPr lang="pl-PL" dirty="0" smtClean="0">
+                          <a:latin typeface="Times New Roman" pitchFamily="18" charset="0"/>
+                          <a:cs typeface="Times New Roman" pitchFamily="18" charset="0"/>
+                        </a:rPr>
+                        <a:t>Podtrzymanie fazy 0</a:t>
+                      </a:r>
+                    </a:p>
+                    <a:p>
+                      <a:pPr algn="ctr"/>
+                      <a:endParaRPr lang="pl-PL" dirty="0" smtClean="0">
+                        <a:latin typeface="Times New Roman" pitchFamily="18" charset="0"/>
+                        <a:cs typeface="Times New Roman" pitchFamily="18" charset="0"/>
+                      </a:endParaRPr>
+                    </a:p>
+                  </a:txBody>
+                  <a:tcPr anchor="b">
+                    <a:lnL w="12700" cap="flat" cmpd="sng" algn="ctr">
+                      <a:solidFill>
+                        <a:schemeClr val="tx1"/>
+                      </a:solidFill>
+                      <a:prstDash val="solid"/>
+                      <a:round/>
+                      <a:headEnd type="none" w="med" len="med"/>
+                      <a:tailEnd type="none" w="med" len="med"/>
+                    </a:lnL>
+                    <a:lnR w="12700" cap="flat" cmpd="sng" algn="ctr">
+                      <a:solidFill>
+                        <a:schemeClr val="tx1"/>
+                      </a:solidFill>
+                      <a:prstDash val="solid"/>
+                      <a:round/>
+                      <a:headEnd type="none" w="med" len="med"/>
+                      <a:tailEnd type="none" w="med" len="med"/>
+                    </a:lnR>
+                    <a:lnT w="12700" cap="flat" cmpd="sng" algn="ctr">
+                      <a:solidFill>
+                        <a:schemeClr val="tx1"/>
+                      </a:solidFill>
+                      <a:prstDash val="solid"/>
+                      <a:round/>
+                      <a:headEnd type="none" w="med" len="med"/>
+                      <a:tailEnd type="none" w="med" len="med"/>
+                    </a:lnT>
+                    <a:lnB w="12700" cap="flat" cmpd="sng" algn="ctr">
+                      <a:solidFill>
+                        <a:schemeClr val="tx1"/>
+                      </a:solidFill>
+                      <a:prstDash val="solid"/>
+                      <a:round/>
+                      <a:headEnd type="none" w="med" len="med"/>
+                      <a:tailEnd type="none" w="med" len="med"/>
+                    </a:lnB>
+                  </a:tcPr>
+                </a:tc>
+              </a:tr>
+              <a:tr h="768377">
+                <a:tc vMerge="1">
+                  <a:txBody>
+                    <a:bodyPr/>
+                    <a:lstStyle/>
+                    <a:p>
+                      <a:endParaRPr lang="pl-PL" dirty="0">
+                        <a:latin typeface="Times New Roman" pitchFamily="18" charset="0"/>
+                        <a:cs typeface="Times New Roman" pitchFamily="18" charset="0"/>
+                      </a:endParaRPr>
+                    </a:p>
+                  </a:txBody>
+                  <a:tcPr>
+                    <a:lnL w="12700" cap="flat" cmpd="sng" algn="ctr">
+                      <a:solidFill>
+                        <a:schemeClr val="tx1"/>
+                      </a:solidFill>
+                      <a:prstDash val="solid"/>
+                      <a:round/>
+                      <a:headEnd type="none" w="med" len="med"/>
+                      <a:tailEnd type="none" w="med" len="med"/>
+                    </a:lnL>
+                    <a:lnR w="12700" cap="flat" cmpd="sng" algn="ctr">
+                      <a:solidFill>
+                        <a:schemeClr val="tx1"/>
+                      </a:solidFill>
+                      <a:prstDash val="solid"/>
+                      <a:round/>
+                      <a:headEnd type="none" w="med" len="med"/>
+                      <a:tailEnd type="none" w="med" len="med"/>
+                    </a:lnR>
+                    <a:lnT w="12700" cap="flat" cmpd="sng" algn="ctr">
+                      <a:solidFill>
+                        <a:schemeClr val="tx1"/>
+                      </a:solidFill>
+                      <a:prstDash val="solid"/>
+                      <a:round/>
+                      <a:headEnd type="none" w="med" len="med"/>
+                      <a:tailEnd type="none" w="med" len="med"/>
+                    </a:lnT>
+                    <a:lnB w="12700" cap="flat" cmpd="sng" algn="ctr">
+                      <a:solidFill>
+                        <a:schemeClr val="tx1"/>
+                      </a:solidFill>
+                      <a:prstDash val="solid"/>
+                      <a:round/>
+                      <a:headEnd type="none" w="med" len="med"/>
+                      <a:tailEnd type="none" w="med" len="med"/>
+                    </a:lnB>
+                  </a:tcPr>
+                </a:tc>
+                <a:tc>
+                  <a:txBody>
+                    <a:bodyPr/>
+                    <a:lstStyle/>
+                    <a:p>
+                      <a:pPr algn="ctr"/>
+                      <a:r>
+                        <a:rPr lang="pl-PL" dirty="0" smtClean="0">
+                          <a:latin typeface="Times New Roman" pitchFamily="18" charset="0"/>
+                          <a:cs typeface="Times New Roman" pitchFamily="18" charset="0"/>
+                        </a:rPr>
+                        <a:t>1</a:t>
+                      </a:r>
+                      <a:endParaRPr lang="pl-PL" dirty="0">
+                        <a:latin typeface="Times New Roman" pitchFamily="18" charset="0"/>
+                        <a:cs typeface="Times New Roman" pitchFamily="18" charset="0"/>
+                      </a:endParaRPr>
+                    </a:p>
+                  </a:txBody>
+                  <a:tcPr anchor="ctr">
+                    <a:lnL w="12700" cap="flat" cmpd="sng" algn="ctr">
+                      <a:solidFill>
+                        <a:schemeClr val="tx1"/>
+                      </a:solidFill>
+                      <a:prstDash val="solid"/>
+                      <a:round/>
+                      <a:headEnd type="none" w="med" len="med"/>
+                      <a:tailEnd type="none" w="med" len="med"/>
+                    </a:lnL>
+                    <a:lnR w="12700" cap="flat" cmpd="sng" algn="ctr">
+                      <a:solidFill>
+                        <a:schemeClr val="tx1"/>
+                      </a:solidFill>
+                      <a:prstDash val="solid"/>
+                      <a:round/>
+                      <a:headEnd type="none" w="med" len="med"/>
+                      <a:tailEnd type="none" w="med" len="med"/>
+                    </a:lnR>
+                    <a:lnT w="12700" cap="flat" cmpd="sng" algn="ctr">
+                      <a:solidFill>
+                        <a:schemeClr val="tx1"/>
+                      </a:solidFill>
+                      <a:prstDash val="solid"/>
+                      <a:round/>
+                      <a:headEnd type="none" w="med" len="med"/>
+                      <a:tailEnd type="none" w="med" len="med"/>
+                    </a:lnT>
+                    <a:lnB w="12700" cap="flat" cmpd="sng" algn="ctr">
+                      <a:solidFill>
+                        <a:schemeClr val="tx1"/>
+                      </a:solidFill>
+                      <a:prstDash val="solid"/>
+                      <a:round/>
+                      <a:headEnd type="none" w="med" len="med"/>
+                      <a:tailEnd type="none" w="med" len="med"/>
+                    </a:lnB>
+                  </a:tcPr>
+                </a:tc>
+                <a:tc>
+                  <a:txBody>
+                    <a:bodyPr/>
+                    <a:lstStyle/>
+                    <a:p>
+                      <a:pPr algn="ctr"/>
+                      <a:r>
+                        <a:rPr lang="pl-PL" dirty="0" smtClean="0">
+                          <a:latin typeface="Times New Roman" pitchFamily="18" charset="0"/>
+                          <a:cs typeface="Times New Roman" pitchFamily="18" charset="0"/>
+                        </a:rPr>
+                        <a:t>2 interwały</a:t>
+                      </a:r>
+                      <a:r>
+                        <a:rPr lang="pl-PL" baseline="0" dirty="0" smtClean="0">
+                          <a:latin typeface="Times New Roman" pitchFamily="18" charset="0"/>
+                          <a:cs typeface="Times New Roman" pitchFamily="18" charset="0"/>
+                        </a:rPr>
+                        <a:t> fazy żółtych świateł, a następnie faza 1</a:t>
+                      </a:r>
+                      <a:endParaRPr lang="pl-PL" dirty="0" smtClean="0">
+                        <a:latin typeface="Times New Roman" pitchFamily="18" charset="0"/>
+                        <a:cs typeface="Times New Roman" pitchFamily="18" charset="0"/>
+                      </a:endParaRPr>
+                    </a:p>
+                  </a:txBody>
+                  <a:tcPr anchor="ctr">
+                    <a:lnL w="12700" cap="flat" cmpd="sng" algn="ctr">
+                      <a:solidFill>
+                        <a:schemeClr val="tx1"/>
+                      </a:solidFill>
+                      <a:prstDash val="solid"/>
+                      <a:round/>
+                      <a:headEnd type="none" w="med" len="med"/>
+                      <a:tailEnd type="none" w="med" len="med"/>
+                    </a:lnL>
+                    <a:lnR w="12700" cap="flat" cmpd="sng" algn="ctr">
+                      <a:solidFill>
+                        <a:schemeClr val="tx1"/>
+                      </a:solidFill>
+                      <a:prstDash val="solid"/>
+                      <a:round/>
+                      <a:headEnd type="none" w="med" len="med"/>
+                      <a:tailEnd type="none" w="med" len="med"/>
+                    </a:lnR>
+                    <a:lnT w="12700" cap="flat" cmpd="sng" algn="ctr">
+                      <a:solidFill>
+                        <a:schemeClr val="tx1"/>
+                      </a:solidFill>
+                      <a:prstDash val="solid"/>
+                      <a:round/>
+                      <a:headEnd type="none" w="med" len="med"/>
+                      <a:tailEnd type="none" w="med" len="med"/>
+                    </a:lnT>
+                    <a:lnB w="12700" cap="flat" cmpd="sng" algn="ctr">
+                      <a:solidFill>
+                        <a:schemeClr val="tx1"/>
+                      </a:solidFill>
+                      <a:prstDash val="solid"/>
+                      <a:round/>
+                      <a:headEnd type="none" w="med" len="med"/>
+                      <a:tailEnd type="none" w="med" len="med"/>
+                    </a:lnB>
+                  </a:tcPr>
+                </a:tc>
+              </a:tr>
+              <a:tr h="887807">
+                <a:tc rowSpan="2">
+                  <a:txBody>
+                    <a:bodyPr/>
+                    <a:lstStyle/>
+                    <a:p>
+                      <a:pPr algn="ctr"/>
+                      <a:endParaRPr lang="pl-PL" dirty="0">
+                        <a:latin typeface="Times New Roman" pitchFamily="18" charset="0"/>
+                        <a:cs typeface="Times New Roman" pitchFamily="18" charset="0"/>
+                      </a:endParaRPr>
+                    </a:p>
+                  </a:txBody>
+                  <a:tcPr anchor="ctr">
+                    <a:lnL w="12700" cap="flat" cmpd="sng" algn="ctr">
+                      <a:solidFill>
+                        <a:schemeClr val="tx1"/>
+                      </a:solidFill>
+                      <a:prstDash val="solid"/>
+                      <a:round/>
+                      <a:headEnd type="none" w="med" len="med"/>
+                      <a:tailEnd type="none" w="med" len="med"/>
+                    </a:lnL>
+                    <a:lnR w="12700" cap="flat" cmpd="sng" algn="ctr">
+                      <a:solidFill>
+                        <a:schemeClr val="tx1"/>
+                      </a:solidFill>
+                      <a:prstDash val="solid"/>
+                      <a:round/>
+                      <a:headEnd type="none" w="med" len="med"/>
+                      <a:tailEnd type="none" w="med" len="med"/>
+                    </a:lnR>
+                    <a:lnT w="12700" cap="flat" cmpd="sng" algn="ctr">
+                      <a:solidFill>
+                        <a:schemeClr val="tx1"/>
+                      </a:solidFill>
+                      <a:prstDash val="solid"/>
+                      <a:round/>
+                      <a:headEnd type="none" w="med" len="med"/>
+                      <a:tailEnd type="none" w="med" len="med"/>
+                    </a:lnT>
+                    <a:lnB w="12700" cap="flat" cmpd="sng" algn="ctr">
+                      <a:solidFill>
+                        <a:schemeClr val="tx1"/>
+                      </a:solidFill>
+                      <a:prstDash val="solid"/>
+                      <a:round/>
+                      <a:headEnd type="none" w="med" len="med"/>
+                      <a:tailEnd type="none" w="med" len="med"/>
+                    </a:lnB>
+                  </a:tcPr>
+                </a:tc>
+                <a:tc>
+                  <a:txBody>
+                    <a:bodyPr/>
+                    <a:lstStyle/>
+                    <a:p>
+                      <a:pPr algn="ctr"/>
+                      <a:r>
+                        <a:rPr lang="pl-PL" dirty="0" smtClean="0">
+                          <a:latin typeface="Times New Roman" pitchFamily="18" charset="0"/>
+                          <a:cs typeface="Times New Roman" pitchFamily="18" charset="0"/>
+                        </a:rPr>
+                        <a:t>0</a:t>
+                      </a:r>
+                      <a:endParaRPr lang="pl-PL" dirty="0" smtClean="0">
+                        <a:latin typeface="Times New Roman" pitchFamily="18" charset="0"/>
+                        <a:cs typeface="Times New Roman" pitchFamily="18" charset="0"/>
+                      </a:endParaRPr>
+                    </a:p>
+                  </a:txBody>
+                  <a:tcPr anchor="ctr">
+                    <a:lnL w="12700" cap="flat" cmpd="sng" algn="ctr">
+                      <a:solidFill>
+                        <a:schemeClr val="tx1"/>
+                      </a:solidFill>
+                      <a:prstDash val="solid"/>
+                      <a:round/>
+                      <a:headEnd type="none" w="med" len="med"/>
+                      <a:tailEnd type="none" w="med" len="med"/>
+                    </a:lnL>
+                    <a:lnR w="12700" cap="flat" cmpd="sng" algn="ctr">
+                      <a:solidFill>
+                        <a:schemeClr val="tx1"/>
+                      </a:solidFill>
+                      <a:prstDash val="solid"/>
+                      <a:round/>
+                      <a:headEnd type="none" w="med" len="med"/>
+                      <a:tailEnd type="none" w="med" len="med"/>
+                    </a:lnR>
+                    <a:lnT w="12700" cap="flat" cmpd="sng" algn="ctr">
+                      <a:solidFill>
+                        <a:schemeClr val="tx1"/>
+                      </a:solidFill>
+                      <a:prstDash val="solid"/>
+                      <a:round/>
+                      <a:headEnd type="none" w="med" len="med"/>
+                      <a:tailEnd type="none" w="med" len="med"/>
+                    </a:lnT>
+                    <a:lnB w="12700" cap="flat" cmpd="sng" algn="ctr">
+                      <a:solidFill>
+                        <a:schemeClr val="tx1"/>
+                      </a:solidFill>
+                      <a:prstDash val="solid"/>
+                      <a:round/>
+                      <a:headEnd type="none" w="med" len="med"/>
+                      <a:tailEnd type="none" w="med" len="med"/>
+                    </a:lnB>
+                  </a:tcPr>
+                </a:tc>
+                <a:tc>
+                  <a:txBody>
+                    <a:bodyPr/>
+                    <a:lstStyle/>
+                    <a:p>
+                      <a:pPr marL="0" marR="0" indent="0" algn="ctr" defTabSz="914400" rtl="0" eaLnBrk="1" fontAlgn="auto" latinLnBrk="0" hangingPunct="1">
+                        <a:lnSpc>
+                          <a:spcPct val="100000"/>
+                        </a:lnSpc>
+                        <a:spcBef>
+                          <a:spcPts val="0"/>
+                        </a:spcBef>
+                        <a:spcAft>
+                          <a:spcPts val="0"/>
+                        </a:spcAft>
+                        <a:buClrTx/>
+                        <a:buSzTx/>
+                        <a:buFontTx/>
+                        <a:buNone/>
+                        <a:tabLst/>
+                        <a:defRPr/>
+                      </a:pPr>
+                      <a:r>
+                        <a:rPr lang="pl-PL" dirty="0" smtClean="0">
+                          <a:latin typeface="Times New Roman" pitchFamily="18" charset="0"/>
+                          <a:cs typeface="Times New Roman" pitchFamily="18" charset="0"/>
+                        </a:rPr>
+                        <a:t>2 interwały</a:t>
+                      </a:r>
+                      <a:r>
+                        <a:rPr lang="pl-PL" baseline="0" dirty="0" smtClean="0">
+                          <a:latin typeface="Times New Roman" pitchFamily="18" charset="0"/>
+                          <a:cs typeface="Times New Roman" pitchFamily="18" charset="0"/>
+                        </a:rPr>
+                        <a:t> fazy żółtych świateł, a następnie faza 0</a:t>
+                      </a:r>
+                    </a:p>
+                  </a:txBody>
+                  <a:tcPr anchor="ctr">
+                    <a:lnL w="12700" cap="flat" cmpd="sng" algn="ctr">
+                      <a:solidFill>
+                        <a:schemeClr val="tx1"/>
+                      </a:solidFill>
+                      <a:prstDash val="solid"/>
+                      <a:round/>
+                      <a:headEnd type="none" w="med" len="med"/>
+                      <a:tailEnd type="none" w="med" len="med"/>
+                    </a:lnL>
+                    <a:lnR w="12700" cap="flat" cmpd="sng" algn="ctr">
+                      <a:solidFill>
+                        <a:schemeClr val="tx1"/>
+                      </a:solidFill>
+                      <a:prstDash val="solid"/>
+                      <a:round/>
+                      <a:headEnd type="none" w="med" len="med"/>
+                      <a:tailEnd type="none" w="med" len="med"/>
+                    </a:lnR>
+                    <a:lnT w="12700" cap="flat" cmpd="sng" algn="ctr">
+                      <a:solidFill>
+                        <a:schemeClr val="tx1"/>
+                      </a:solidFill>
+                      <a:prstDash val="solid"/>
+                      <a:round/>
+                      <a:headEnd type="none" w="med" len="med"/>
+                      <a:tailEnd type="none" w="med" len="med"/>
+                    </a:lnT>
+                    <a:lnB w="12700" cap="flat" cmpd="sng" algn="ctr">
+                      <a:solidFill>
+                        <a:schemeClr val="tx1"/>
+                      </a:solidFill>
+                      <a:prstDash val="solid"/>
+                      <a:round/>
+                      <a:headEnd type="none" w="med" len="med"/>
+                      <a:tailEnd type="none" w="med" len="med"/>
+                    </a:lnB>
+                  </a:tcPr>
+                </a:tc>
+              </a:tr>
+              <a:tr h="648072">
+                <a:tc vMerge="1">
+                  <a:txBody>
+                    <a:bodyPr/>
+                    <a:lstStyle/>
+                    <a:p>
+                      <a:endParaRPr lang="pl-PL" dirty="0">
+                        <a:latin typeface="Times New Roman" pitchFamily="18" charset="0"/>
+                        <a:cs typeface="Times New Roman" pitchFamily="18" charset="0"/>
+                      </a:endParaRPr>
+                    </a:p>
+                  </a:txBody>
+                  <a:tcPr>
+                    <a:lnL w="12700" cap="flat" cmpd="sng" algn="ctr">
+                      <a:solidFill>
+                        <a:schemeClr val="tx1"/>
+                      </a:solidFill>
+                      <a:prstDash val="solid"/>
+                      <a:round/>
+                      <a:headEnd type="none" w="med" len="med"/>
+                      <a:tailEnd type="none" w="med" len="med"/>
+                    </a:lnL>
+                    <a:lnR w="12700" cap="flat" cmpd="sng" algn="ctr">
+                      <a:solidFill>
+                        <a:schemeClr val="tx1"/>
+                      </a:solidFill>
+                      <a:prstDash val="solid"/>
+                      <a:round/>
+                      <a:headEnd type="none" w="med" len="med"/>
+                      <a:tailEnd type="none" w="med" len="med"/>
+                    </a:lnR>
+                    <a:lnT w="12700" cap="flat" cmpd="sng" algn="ctr">
+                      <a:solidFill>
+                        <a:schemeClr val="tx1"/>
+                      </a:solidFill>
+                      <a:prstDash val="solid"/>
+                      <a:round/>
+                      <a:headEnd type="none" w="med" len="med"/>
+                      <a:tailEnd type="none" w="med" len="med"/>
+                    </a:lnT>
+                    <a:lnB w="12700" cap="flat" cmpd="sng" algn="ctr">
+                      <a:solidFill>
+                        <a:schemeClr val="tx1"/>
+                      </a:solidFill>
+                      <a:prstDash val="solid"/>
+                      <a:round/>
+                      <a:headEnd type="none" w="med" len="med"/>
+                      <a:tailEnd type="none" w="med" len="med"/>
+                    </a:lnB>
+                  </a:tcPr>
+                </a:tc>
+                <a:tc>
+                  <a:txBody>
+                    <a:bodyPr/>
+                    <a:lstStyle/>
+                    <a:p>
+                      <a:pPr algn="ctr"/>
+                      <a:r>
+                        <a:rPr lang="pl-PL" dirty="0" smtClean="0">
+                          <a:latin typeface="Times New Roman" pitchFamily="18" charset="0"/>
+                          <a:cs typeface="Times New Roman" pitchFamily="18" charset="0"/>
+                        </a:rPr>
+                        <a:t>1</a:t>
+                      </a:r>
+                    </a:p>
+                  </a:txBody>
+                  <a:tcPr anchor="ctr">
+                    <a:lnL w="12700" cap="flat" cmpd="sng" algn="ctr">
+                      <a:solidFill>
+                        <a:schemeClr val="tx1"/>
+                      </a:solidFill>
+                      <a:prstDash val="solid"/>
+                      <a:round/>
+                      <a:headEnd type="none" w="med" len="med"/>
+                      <a:tailEnd type="none" w="med" len="med"/>
+                    </a:lnL>
+                    <a:lnR w="12700" cap="flat" cmpd="sng" algn="ctr">
+                      <a:solidFill>
+                        <a:schemeClr val="tx1"/>
+                      </a:solidFill>
+                      <a:prstDash val="solid"/>
+                      <a:round/>
+                      <a:headEnd type="none" w="med" len="med"/>
+                      <a:tailEnd type="none" w="med" len="med"/>
+                    </a:lnR>
+                    <a:lnT w="12700" cap="flat" cmpd="sng" algn="ctr">
+                      <a:solidFill>
+                        <a:schemeClr val="tx1"/>
+                      </a:solidFill>
+                      <a:prstDash val="solid"/>
+                      <a:round/>
+                      <a:headEnd type="none" w="med" len="med"/>
+                      <a:tailEnd type="none" w="med" len="med"/>
+                    </a:lnT>
+                    <a:lnB w="12700" cap="flat" cmpd="sng" algn="ctr">
+                      <a:solidFill>
+                        <a:schemeClr val="tx1"/>
+                      </a:solidFill>
+                      <a:prstDash val="solid"/>
+                      <a:round/>
+                      <a:headEnd type="none" w="med" len="med"/>
+                      <a:tailEnd type="none" w="med" len="med"/>
+                    </a:lnB>
+                  </a:tcPr>
+                </a:tc>
+                <a:tc>
+                  <a:txBody>
+                    <a:bodyPr/>
+                    <a:lstStyle/>
+                    <a:p>
+                      <a:pPr marL="0" marR="0" indent="0" algn="ctr" defTabSz="914400" rtl="0" eaLnBrk="1" fontAlgn="auto" latinLnBrk="0" hangingPunct="1">
+                        <a:lnSpc>
+                          <a:spcPct val="100000"/>
+                        </a:lnSpc>
+                        <a:spcBef>
+                          <a:spcPts val="0"/>
+                        </a:spcBef>
+                        <a:spcAft>
+                          <a:spcPts val="0"/>
+                        </a:spcAft>
+                        <a:buClrTx/>
+                        <a:buSzTx/>
+                        <a:buFontTx/>
+                        <a:buNone/>
+                        <a:tabLst/>
+                        <a:defRPr/>
+                      </a:pPr>
+                      <a:r>
+                        <a:rPr lang="pl-PL" dirty="0" smtClean="0">
+                          <a:latin typeface="Times New Roman" pitchFamily="18" charset="0"/>
+                          <a:cs typeface="Times New Roman" pitchFamily="18" charset="0"/>
+                        </a:rPr>
+                        <a:t>Podtrzymanie fazy 1</a:t>
+                      </a:r>
+                    </a:p>
+                  </a:txBody>
+                  <a:tcPr anchor="ctr">
+                    <a:lnL w="12700" cap="flat" cmpd="sng" algn="ctr">
+                      <a:solidFill>
+                        <a:schemeClr val="tx1"/>
+                      </a:solidFill>
+                      <a:prstDash val="solid"/>
+                      <a:round/>
+                      <a:headEnd type="none" w="med" len="med"/>
+                      <a:tailEnd type="none" w="med" len="med"/>
+                    </a:lnL>
+                    <a:lnR w="12700" cap="flat" cmpd="sng" algn="ctr">
+                      <a:solidFill>
+                        <a:schemeClr val="tx1"/>
+                      </a:solidFill>
+                      <a:prstDash val="solid"/>
+                      <a:round/>
+                      <a:headEnd type="none" w="med" len="med"/>
+                      <a:tailEnd type="none" w="med" len="med"/>
+                    </a:lnR>
+                    <a:lnT w="12700" cap="flat" cmpd="sng" algn="ctr">
+                      <a:solidFill>
+                        <a:schemeClr val="tx1"/>
+                      </a:solidFill>
+                      <a:prstDash val="solid"/>
+                      <a:round/>
+                      <a:headEnd type="none" w="med" len="med"/>
+                      <a:tailEnd type="none" w="med" len="med"/>
+                    </a:lnT>
+                    <a:lnB w="12700" cap="flat" cmpd="sng" algn="ctr">
+                      <a:solidFill>
+                        <a:schemeClr val="tx1"/>
+                      </a:solidFill>
+                      <a:prstDash val="solid"/>
+                      <a:round/>
+                      <a:headEnd type="none" w="med" len="med"/>
+                      <a:tailEnd type="none" w="med" len="med"/>
+                    </a:lnB>
+                  </a:tcPr>
+                </a:tc>
+              </a:tr>
+              <a:tr h="845539">
+                <a:tc>
+                  <a:txBody>
+                    <a:bodyPr/>
+                    <a:lstStyle/>
+                    <a:p>
+                      <a:pPr algn="ctr"/>
+                      <a:endParaRPr lang="pl-PL" dirty="0">
+                        <a:latin typeface="Times New Roman" pitchFamily="18" charset="0"/>
+                        <a:cs typeface="Times New Roman" pitchFamily="18" charset="0"/>
+                      </a:endParaRPr>
+                    </a:p>
+                  </a:txBody>
+                  <a:tcPr anchor="ctr">
+                    <a:lnL w="12700" cap="flat" cmpd="sng" algn="ctr">
+                      <a:solidFill>
+                        <a:schemeClr val="tx1"/>
+                      </a:solidFill>
+                      <a:prstDash val="solid"/>
+                      <a:round/>
+                      <a:headEnd type="none" w="med" len="med"/>
+                      <a:tailEnd type="none" w="med" len="med"/>
+                    </a:lnL>
+                    <a:lnR w="12700" cap="flat" cmpd="sng" algn="ctr">
+                      <a:solidFill>
+                        <a:schemeClr val="tx1"/>
+                      </a:solidFill>
+                      <a:prstDash val="solid"/>
+                      <a:round/>
+                      <a:headEnd type="none" w="med" len="med"/>
+                      <a:tailEnd type="none" w="med" len="med"/>
+                    </a:lnR>
+                    <a:lnT w="12700" cap="flat" cmpd="sng" algn="ctr">
+                      <a:solidFill>
+                        <a:schemeClr val="tx1"/>
+                      </a:solidFill>
+                      <a:prstDash val="solid"/>
+                      <a:round/>
+                      <a:headEnd type="none" w="med" len="med"/>
+                      <a:tailEnd type="none" w="med" len="med"/>
+                    </a:lnT>
+                    <a:lnB w="12700" cap="flat" cmpd="sng" algn="ctr">
+                      <a:solidFill>
+                        <a:schemeClr val="tx1"/>
+                      </a:solidFill>
+                      <a:prstDash val="solid"/>
+                      <a:round/>
+                      <a:headEnd type="none" w="med" len="med"/>
+                      <a:tailEnd type="none" w="med" len="med"/>
+                    </a:lnB>
+                  </a:tcPr>
+                </a:tc>
+                <a:tc>
+                  <a:txBody>
+                    <a:bodyPr/>
+                    <a:lstStyle/>
+                    <a:p>
+                      <a:pPr algn="ctr"/>
+                      <a:r>
+                        <a:rPr lang="pl-PL" dirty="0" smtClean="0">
+                          <a:latin typeface="Times New Roman" pitchFamily="18" charset="0"/>
+                          <a:cs typeface="Times New Roman" pitchFamily="18" charset="0"/>
+                        </a:rPr>
+                        <a:t>żółte</a:t>
+                      </a:r>
+                      <a:endParaRPr lang="pl-PL" dirty="0">
+                        <a:latin typeface="Times New Roman" pitchFamily="18" charset="0"/>
+                        <a:cs typeface="Times New Roman" pitchFamily="18" charset="0"/>
+                      </a:endParaRPr>
+                    </a:p>
+                  </a:txBody>
+                  <a:tcPr anchor="ctr">
+                    <a:lnL w="12700" cap="flat" cmpd="sng" algn="ctr">
+                      <a:solidFill>
+                        <a:schemeClr val="tx1"/>
+                      </a:solidFill>
+                      <a:prstDash val="solid"/>
+                      <a:round/>
+                      <a:headEnd type="none" w="med" len="med"/>
+                      <a:tailEnd type="none" w="med" len="med"/>
+                    </a:lnL>
+                    <a:lnR w="12700" cap="flat" cmpd="sng" algn="ctr">
+                      <a:solidFill>
+                        <a:schemeClr val="tx1"/>
+                      </a:solidFill>
+                      <a:prstDash val="solid"/>
+                      <a:round/>
+                      <a:headEnd type="none" w="med" len="med"/>
+                      <a:tailEnd type="none" w="med" len="med"/>
+                    </a:lnR>
+                    <a:lnT w="12700" cap="flat" cmpd="sng" algn="ctr">
+                      <a:solidFill>
+                        <a:schemeClr val="tx1"/>
+                      </a:solidFill>
+                      <a:prstDash val="solid"/>
+                      <a:round/>
+                      <a:headEnd type="none" w="med" len="med"/>
+                      <a:tailEnd type="none" w="med" len="med"/>
+                    </a:lnT>
+                    <a:lnB w="12700" cap="flat" cmpd="sng" algn="ctr">
+                      <a:solidFill>
+                        <a:schemeClr val="tx1"/>
+                      </a:solidFill>
+                      <a:prstDash val="solid"/>
+                      <a:round/>
+                      <a:headEnd type="none" w="med" len="med"/>
+                      <a:tailEnd type="none" w="med" len="med"/>
+                    </a:lnB>
+                  </a:tcPr>
+                </a:tc>
+                <a:tc>
+                  <a:txBody>
+                    <a:bodyPr/>
+                    <a:lstStyle/>
+                    <a:p>
+                      <a:pPr algn="ctr"/>
+                      <a:r>
+                        <a:rPr lang="pl-PL" dirty="0" smtClean="0">
+                          <a:latin typeface="Times New Roman" pitchFamily="18" charset="0"/>
+                          <a:cs typeface="Times New Roman" pitchFamily="18" charset="0"/>
+                        </a:rPr>
+                        <a:t>Podtrzymanie fazy żółtych</a:t>
+                      </a:r>
+                      <a:r>
+                        <a:rPr lang="pl-PL" baseline="0" dirty="0" smtClean="0">
+                          <a:latin typeface="Times New Roman" pitchFamily="18" charset="0"/>
+                          <a:cs typeface="Times New Roman" pitchFamily="18" charset="0"/>
+                        </a:rPr>
+                        <a:t> świateł.</a:t>
+                      </a:r>
+                    </a:p>
+                    <a:p>
+                      <a:pPr algn="ctr"/>
+                      <a:r>
+                        <a:rPr lang="pl-PL" baseline="0" dirty="0" smtClean="0">
+                          <a:latin typeface="Times New Roman" pitchFamily="18" charset="0"/>
+                          <a:cs typeface="Times New Roman" pitchFamily="18" charset="0"/>
+                        </a:rPr>
+                        <a:t>Jeśli żółta faza trwa dłużej niż 2 interwały czasowe – włączenie oczekiwanej fazy 0 lub 1.</a:t>
+                      </a:r>
+                    </a:p>
+                    <a:p>
+                      <a:pPr algn="ctr"/>
+                      <a:endParaRPr lang="pl-PL" dirty="0" smtClean="0">
+                        <a:latin typeface="Times New Roman" pitchFamily="18" charset="0"/>
+                        <a:cs typeface="Times New Roman" pitchFamily="18" charset="0"/>
+                      </a:endParaRPr>
+                    </a:p>
+                  </a:txBody>
+                  <a:tcPr anchor="ctr">
+                    <a:lnL w="12700" cap="flat" cmpd="sng" algn="ctr">
+                      <a:solidFill>
+                        <a:schemeClr val="tx1"/>
+                      </a:solidFill>
+                      <a:prstDash val="solid"/>
+                      <a:round/>
+                      <a:headEnd type="none" w="med" len="med"/>
+                      <a:tailEnd type="none" w="med" len="med"/>
+                    </a:lnL>
+                    <a:lnR w="12700" cap="flat" cmpd="sng" algn="ctr">
+                      <a:solidFill>
+                        <a:schemeClr val="tx1"/>
+                      </a:solidFill>
+                      <a:prstDash val="solid"/>
+                      <a:round/>
+                      <a:headEnd type="none" w="med" len="med"/>
+                      <a:tailEnd type="none" w="med" len="med"/>
+                    </a:lnR>
+                    <a:lnT w="12700" cap="flat" cmpd="sng" algn="ctr">
+                      <a:solidFill>
+                        <a:schemeClr val="tx1"/>
+                      </a:solidFill>
+                      <a:prstDash val="solid"/>
+                      <a:round/>
+                      <a:headEnd type="none" w="med" len="med"/>
+                      <a:tailEnd type="none" w="med" len="med"/>
+                    </a:lnT>
+                    <a:lnB w="12700" cap="flat" cmpd="sng" algn="ctr">
+                      <a:solidFill>
+                        <a:schemeClr val="tx1"/>
+                      </a:solidFill>
+                      <a:prstDash val="solid"/>
+                      <a:round/>
+                      <a:headEnd type="none" w="med" len="med"/>
+                      <a:tailEnd type="none" w="med" len="med"/>
+                    </a:lnB>
+                  </a:tcPr>
+                </a:tc>
+              </a:tr>
+            </a:tbl>
+          </a:graphicData>
+        </a:graphic>
+      </p:graphicFrame>
+      <p:pic>
+        <p:nvPicPr>
+          <p:cNvPr id="8" name="Picture 2"/>
+          <p:cNvPicPr>
+            <a:picLocks noChangeAspect="1" noChangeArrowheads="1"/>
+          </p:cNvPicPr>
+          <p:nvPr/>
+        </p:nvPicPr>
+        <p:blipFill>
+          <a:blip r:embed="rId3">
+            <a:extLst>
+              <a:ext uri="{28A0092B-C50C-407E-A947-70E740481C1C}">
+                <a14:useLocalDpi xmlns:a14="http://schemas.microsoft.com/office/drawing/2010/main" val="0"/>
+              </a:ext>
+            </a:extLst>
+          </a:blip>
+          <a:srcRect/>
+          <a:stretch>
+            <a:fillRect/>
+          </a:stretch>
+        </p:blipFill>
+        <p:spPr bwMode="auto">
+          <a:xfrm>
+            <a:off x="755575" y="1340768"/>
+            <a:ext cx="2520280" cy="1249369"/>
+          </a:xfrm>
+          <a:prstGeom prst="rect">
+            <a:avLst/>
+          </a:prstGeom>
+          <a:noFill/>
+          <a:ln w="38100">
+            <a:noFill/>
+            <a:miter lim="800000"/>
+            <a:headEnd/>
+            <a:tailEnd/>
+          </a:ln>
+          <a:effectLst/>
+          <a:extLst>
+            <a:ext uri="{909E8E84-426E-40DD-AFC4-6F175D3DCCD1}">
+              <a14:hiddenFill xmlns:a14="http://schemas.microsoft.com/office/drawing/2010/main">
+                <a:solidFill>
+                  <a:schemeClr val="accent1"/>
+                </a:solidFill>
+              </a14:hiddenFill>
+            </a:ext>
+            <a:ext uri="{AF507438-7753-43E0-B8FC-AC1667EBCBE1}">
+              <a14:hiddenEffects xmlns:a14="http://schemas.microsoft.com/office/drawing/2010/main">
+                <a:effectLst>
+                  <a:outerShdw dist="35921" dir="2700000" algn="ctr" rotWithShape="0">
+                    <a:schemeClr val="bg2"/>
+                  </a:outerShdw>
+                </a:effectLst>
+              </a14:hiddenEffects>
+            </a:ext>
+          </a:extLst>
+        </p:spPr>
+      </p:pic>
+      <p:pic>
+        <p:nvPicPr>
+          <p:cNvPr id="9" name="Picture 3"/>
+          <p:cNvPicPr>
+            <a:picLocks noChangeAspect="1" noChangeArrowheads="1"/>
+          </p:cNvPicPr>
+          <p:nvPr/>
+        </p:nvPicPr>
+        <p:blipFill>
+          <a:blip r:embed="rId4">
+            <a:extLst>
+              <a:ext uri="{28A0092B-C50C-407E-A947-70E740481C1C}">
+                <a14:useLocalDpi xmlns:a14="http://schemas.microsoft.com/office/drawing/2010/main" val="0"/>
+              </a:ext>
+            </a:extLst>
+          </a:blip>
+          <a:srcRect/>
+          <a:stretch>
+            <a:fillRect/>
+          </a:stretch>
+        </p:blipFill>
+        <p:spPr bwMode="auto">
+          <a:xfrm>
+            <a:off x="791871" y="2743045"/>
+            <a:ext cx="2520280" cy="1257509"/>
+          </a:xfrm>
+          <a:prstGeom prst="rect">
+            <a:avLst/>
+          </a:prstGeom>
+          <a:noFill/>
+          <a:ln w="38100">
+            <a:noFill/>
+            <a:miter lim="800000"/>
+            <a:headEnd/>
+            <a:tailEnd/>
+          </a:ln>
+          <a:effectLst/>
+          <a:extLst>
+            <a:ext uri="{909E8E84-426E-40DD-AFC4-6F175D3DCCD1}">
+              <a14:hiddenFill xmlns:a14="http://schemas.microsoft.com/office/drawing/2010/main">
+                <a:solidFill>
+                  <a:schemeClr val="accent1"/>
+                </a:solidFill>
+              </a14:hiddenFill>
+            </a:ext>
+            <a:ext uri="{AF507438-7753-43E0-B8FC-AC1667EBCBE1}">
+              <a14:hiddenEffects xmlns:a14="http://schemas.microsoft.com/office/drawing/2010/main">
+                <a:effectLst>
+                  <a:outerShdw dist="35921" dir="2700000" algn="ctr" rotWithShape="0">
+                    <a:schemeClr val="bg2"/>
+                  </a:outerShdw>
+                </a:effectLst>
+              </a14:hiddenEffects>
+            </a:ext>
+          </a:extLst>
+        </p:spPr>
+      </p:pic>
+      <p:pic>
+        <p:nvPicPr>
+          <p:cNvPr id="11" name="Picture 4"/>
+          <p:cNvPicPr>
+            <a:picLocks noChangeAspect="1" noChangeArrowheads="1"/>
+          </p:cNvPicPr>
+          <p:nvPr/>
+        </p:nvPicPr>
+        <p:blipFill>
+          <a:blip r:embed="rId5">
+            <a:extLst>
+              <a:ext uri="{28A0092B-C50C-407E-A947-70E740481C1C}">
+                <a14:useLocalDpi xmlns:a14="http://schemas.microsoft.com/office/drawing/2010/main" val="0"/>
+              </a:ext>
+            </a:extLst>
+          </a:blip>
+          <a:srcRect/>
+          <a:stretch>
+            <a:fillRect/>
+          </a:stretch>
+        </p:blipFill>
+        <p:spPr bwMode="auto">
+          <a:xfrm>
+            <a:off x="755575" y="4441069"/>
+            <a:ext cx="2447689" cy="1203447"/>
+          </a:xfrm>
+          <a:prstGeom prst="rect">
+            <a:avLst/>
+          </a:prstGeom>
+          <a:noFill/>
+          <a:ln w="38100">
+            <a:noFill/>
+            <a:miter lim="800000"/>
+            <a:headEnd/>
+            <a:tailEnd/>
+          </a:ln>
+          <a:effectLst/>
+          <a:extLst>
+            <a:ext uri="{909E8E84-426E-40DD-AFC4-6F175D3DCCD1}">
+              <a14:hiddenFill xmlns:a14="http://schemas.microsoft.com/office/drawing/2010/main">
+                <a:solidFill>
+                  <a:schemeClr val="accent1"/>
+                </a:solidFill>
+              </a14:hiddenFill>
+            </a:ext>
+            <a:ext uri="{AF507438-7753-43E0-B8FC-AC1667EBCBE1}">
+              <a14:hiddenEffects xmlns:a14="http://schemas.microsoft.com/office/drawing/2010/main">
+                <a:effectLst>
+                  <a:outerShdw dist="35921" dir="2700000" algn="ctr" rotWithShape="0">
+                    <a:schemeClr val="bg2"/>
+                  </a:outerShdw>
+                </a:effectLst>
+              </a14:hiddenEffects>
+            </a:ext>
+          </a:extLst>
+        </p:spPr>
+      </p:pic>
+      <p:sp>
+        <p:nvSpPr>
+          <p:cNvPr id="7" name="pole tekstowe 6"/>
+          <p:cNvSpPr txBox="1"/>
+          <p:nvPr/>
+        </p:nvSpPr>
+        <p:spPr>
+          <a:xfrm>
+            <a:off x="1881932" y="1331268"/>
+            <a:ext cx="340158" cy="461665"/>
+          </a:xfrm>
+          <a:prstGeom prst="rect">
+            <a:avLst/>
+          </a:prstGeom>
+          <a:noFill/>
+        </p:spPr>
+        <p:txBody>
+          <a:bodyPr wrap="none" rtlCol="0">
+            <a:spAutoFit/>
+          </a:bodyPr>
+          <a:lstStyle/>
+          <a:p>
+            <a:r>
+              <a:rPr lang="pl-PL" sz="2400" b="1" dirty="0" smtClean="0"/>
+              <a:t>0</a:t>
+            </a:r>
+            <a:endParaRPr lang="pl-PL" b="1" dirty="0"/>
+          </a:p>
+        </p:txBody>
+      </p:sp>
+      <p:sp>
+        <p:nvSpPr>
+          <p:cNvPr id="13" name="pole tekstowe 12"/>
+          <p:cNvSpPr txBox="1"/>
+          <p:nvPr/>
+        </p:nvSpPr>
+        <p:spPr>
+          <a:xfrm>
+            <a:off x="1881931" y="2743045"/>
+            <a:ext cx="340158" cy="461665"/>
+          </a:xfrm>
+          <a:prstGeom prst="rect">
+            <a:avLst/>
+          </a:prstGeom>
+          <a:noFill/>
+        </p:spPr>
+        <p:txBody>
+          <a:bodyPr wrap="none" rtlCol="0">
+            <a:spAutoFit/>
+          </a:bodyPr>
+          <a:lstStyle/>
+          <a:p>
+            <a:r>
+              <a:rPr lang="pl-PL" sz="2400" b="1" dirty="0" smtClean="0"/>
+              <a:t>1</a:t>
+            </a:r>
+            <a:endParaRPr lang="pl-PL" b="1" dirty="0"/>
+          </a:p>
+        </p:txBody>
+      </p:sp>
+      <p:sp>
+        <p:nvSpPr>
+          <p:cNvPr id="14" name="pole tekstowe 13"/>
+          <p:cNvSpPr txBox="1"/>
+          <p:nvPr/>
+        </p:nvSpPr>
+        <p:spPr>
+          <a:xfrm>
+            <a:off x="1648405" y="4210236"/>
+            <a:ext cx="807209" cy="461665"/>
+          </a:xfrm>
+          <a:prstGeom prst="rect">
+            <a:avLst/>
+          </a:prstGeom>
+          <a:noFill/>
+        </p:spPr>
+        <p:txBody>
+          <a:bodyPr wrap="none" rtlCol="0">
+            <a:spAutoFit/>
+          </a:bodyPr>
+          <a:lstStyle/>
+          <a:p>
+            <a:r>
+              <a:rPr lang="pl-PL" sz="2400" b="1" dirty="0" smtClean="0"/>
+              <a:t>żółte</a:t>
+            </a:r>
+            <a:endParaRPr lang="pl-PL" b="1" dirty="0"/>
+          </a:p>
+        </p:txBody>
+      </p:sp>
+    </p:spTree>
+    <p:extLst>
+      <p:ext uri="{BB962C8B-B14F-4D97-AF65-F5344CB8AC3E}">
+        <p14:creationId xmlns:p14="http://schemas.microsoft.com/office/powerpoint/2010/main" val="4152549919"/>
       </p:ext>
     </p:extLst>
   </p:cSld>

</xml_diff>